<commit_message>
tweaked the images for fig 2 and 3 again
</commit_message>
<xml_diff>
--- a/RA-L/pictures/pdf/CircleFill.pptx
+++ b/RA-L/pictures/pdf/CircleFill.pptx
@@ -288,7 +288,7 @@
           <a:p>
             <a:fld id="{E4E64FA6-EB03-AE42-9D16-539ACBA29E8E}" type="datetimeFigureOut">
               <a:rPr lang="en-US" smtClean="0"/>
-              <a:t>1/25/16</a:t>
+              <a:t>9/2/16</a:t>
             </a:fld>
             <a:endParaRPr lang="en-US"/>
           </a:p>
@@ -458,7 +458,7 @@
           <a:p>
             <a:fld id="{E4E64FA6-EB03-AE42-9D16-539ACBA29E8E}" type="datetimeFigureOut">
               <a:rPr lang="en-US" smtClean="0"/>
-              <a:t>1/25/16</a:t>
+              <a:t>9/2/16</a:t>
             </a:fld>
             <a:endParaRPr lang="en-US"/>
           </a:p>
@@ -638,7 +638,7 @@
           <a:p>
             <a:fld id="{E4E64FA6-EB03-AE42-9D16-539ACBA29E8E}" type="datetimeFigureOut">
               <a:rPr lang="en-US" smtClean="0"/>
-              <a:t>1/25/16</a:t>
+              <a:t>9/2/16</a:t>
             </a:fld>
             <a:endParaRPr lang="en-US"/>
           </a:p>
@@ -808,7 +808,7 @@
           <a:p>
             <a:fld id="{E4E64FA6-EB03-AE42-9D16-539ACBA29E8E}" type="datetimeFigureOut">
               <a:rPr lang="en-US" smtClean="0"/>
-              <a:t>1/25/16</a:t>
+              <a:t>9/2/16</a:t>
             </a:fld>
             <a:endParaRPr lang="en-US"/>
           </a:p>
@@ -1054,7 +1054,7 @@
           <a:p>
             <a:fld id="{E4E64FA6-EB03-AE42-9D16-539ACBA29E8E}" type="datetimeFigureOut">
               <a:rPr lang="en-US" smtClean="0"/>
-              <a:t>1/25/16</a:t>
+              <a:t>9/2/16</a:t>
             </a:fld>
             <a:endParaRPr lang="en-US"/>
           </a:p>
@@ -1342,7 +1342,7 @@
           <a:p>
             <a:fld id="{E4E64FA6-EB03-AE42-9D16-539ACBA29E8E}" type="datetimeFigureOut">
               <a:rPr lang="en-US" smtClean="0"/>
-              <a:t>1/25/16</a:t>
+              <a:t>9/2/16</a:t>
             </a:fld>
             <a:endParaRPr lang="en-US"/>
           </a:p>
@@ -1764,7 +1764,7 @@
           <a:p>
             <a:fld id="{E4E64FA6-EB03-AE42-9D16-539ACBA29E8E}" type="datetimeFigureOut">
               <a:rPr lang="en-US" smtClean="0"/>
-              <a:t>1/25/16</a:t>
+              <a:t>9/2/16</a:t>
             </a:fld>
             <a:endParaRPr lang="en-US"/>
           </a:p>
@@ -1882,7 +1882,7 @@
           <a:p>
             <a:fld id="{E4E64FA6-EB03-AE42-9D16-539ACBA29E8E}" type="datetimeFigureOut">
               <a:rPr lang="en-US" smtClean="0"/>
-              <a:t>1/25/16</a:t>
+              <a:t>9/2/16</a:t>
             </a:fld>
             <a:endParaRPr lang="en-US"/>
           </a:p>
@@ -1977,7 +1977,7 @@
           <a:p>
             <a:fld id="{E4E64FA6-EB03-AE42-9D16-539ACBA29E8E}" type="datetimeFigureOut">
               <a:rPr lang="en-US" smtClean="0"/>
-              <a:t>1/25/16</a:t>
+              <a:t>9/2/16</a:t>
             </a:fld>
             <a:endParaRPr lang="en-US"/>
           </a:p>
@@ -2254,7 +2254,7 @@
           <a:p>
             <a:fld id="{E4E64FA6-EB03-AE42-9D16-539ACBA29E8E}" type="datetimeFigureOut">
               <a:rPr lang="en-US" smtClean="0"/>
-              <a:t>1/25/16</a:t>
+              <a:t>9/2/16</a:t>
             </a:fld>
             <a:endParaRPr lang="en-US"/>
           </a:p>
@@ -2507,7 +2507,7 @@
           <a:p>
             <a:fld id="{E4E64FA6-EB03-AE42-9D16-539ACBA29E8E}" type="datetimeFigureOut">
               <a:rPr lang="en-US" smtClean="0"/>
-              <a:t>1/25/16</a:t>
+              <a:t>9/2/16</a:t>
             </a:fld>
             <a:endParaRPr lang="en-US"/>
           </a:p>
@@ -2720,7 +2720,7 @@
           <a:p>
             <a:fld id="{E4E64FA6-EB03-AE42-9D16-539ACBA29E8E}" type="datetimeFigureOut">
               <a:rPr lang="en-US" smtClean="0"/>
-              <a:t>1/25/16</a:t>
+              <a:t>9/2/16</a:t>
             </a:fld>
             <a:endParaRPr lang="en-US"/>
           </a:p>
@@ -3095,557 +3095,9 @@
           <a:chExt cx="0" cy="0"/>
         </a:xfrm>
       </p:grpSpPr>
-      <p:grpSp>
-        <p:nvGrpSpPr>
-          <p:cNvPr id="107" name="Group 106"/>
-          <p:cNvGrpSpPr/>
-          <p:nvPr/>
-        </p:nvGrpSpPr>
-        <p:grpSpPr>
-          <a:xfrm>
-            <a:off x="-71766" y="107175"/>
-            <a:ext cx="7781385" cy="6925733"/>
-            <a:chOff x="-3522986" y="0"/>
-            <a:chExt cx="7781385" cy="6925733"/>
-          </a:xfrm>
-        </p:grpSpPr>
-        <p:pic>
-          <p:nvPicPr>
-            <p:cNvPr id="108" name="Picture 107"/>
-            <p:cNvPicPr>
-              <a:picLocks noChangeAspect="1"/>
-            </p:cNvPicPr>
-            <p:nvPr/>
-          </p:nvPicPr>
-          <p:blipFill>
-            <a:blip r:embed="rId2"/>
-            <a:stretch>
-              <a:fillRect/>
-            </a:stretch>
-          </p:blipFill>
-          <p:spPr>
-            <a:xfrm>
-              <a:off x="-3522986" y="0"/>
-              <a:ext cx="5107448" cy="5107448"/>
-            </a:xfrm>
-            <a:prstGeom prst="rect">
-              <a:avLst/>
-            </a:prstGeom>
-          </p:spPr>
-        </p:pic>
-        <p:cxnSp>
-          <p:nvCxnSpPr>
-            <p:cNvPr id="110" name="Straight Connector 109"/>
-            <p:cNvCxnSpPr/>
-            <p:nvPr/>
-          </p:nvCxnSpPr>
-          <p:spPr>
-            <a:xfrm>
-              <a:off x="582083" y="1005417"/>
-              <a:ext cx="2571750" cy="2582333"/>
-            </a:xfrm>
-            <a:prstGeom prst="line">
-              <a:avLst/>
-            </a:prstGeom>
-            <a:ln>
-              <a:solidFill>
-                <a:srgbClr val="FF6600"/>
-              </a:solidFill>
-            </a:ln>
-            <a:effectLst/>
-          </p:spPr>
-          <p:style>
-            <a:lnRef idx="2">
-              <a:schemeClr val="accent1"/>
-            </a:lnRef>
-            <a:fillRef idx="0">
-              <a:schemeClr val="accent1"/>
-            </a:fillRef>
-            <a:effectRef idx="1">
-              <a:schemeClr val="accent1"/>
-            </a:effectRef>
-            <a:fontRef idx="minor">
-              <a:schemeClr val="tx1"/>
-            </a:fontRef>
-          </p:style>
-        </p:cxnSp>
-        <p:cxnSp>
-          <p:nvCxnSpPr>
-            <p:cNvPr id="111" name="Straight Connector 110"/>
-            <p:cNvCxnSpPr/>
-            <p:nvPr/>
-          </p:nvCxnSpPr>
-          <p:spPr>
-            <a:xfrm>
-              <a:off x="1048010" y="1824567"/>
-              <a:ext cx="2571750" cy="2582333"/>
-            </a:xfrm>
-            <a:prstGeom prst="line">
-              <a:avLst/>
-            </a:prstGeom>
-            <a:ln>
-              <a:solidFill>
-                <a:srgbClr val="FF6600"/>
-              </a:solidFill>
-            </a:ln>
-            <a:effectLst/>
-          </p:spPr>
-          <p:style>
-            <a:lnRef idx="2">
-              <a:schemeClr val="accent1"/>
-            </a:lnRef>
-            <a:fillRef idx="0">
-              <a:schemeClr val="accent1"/>
-            </a:fillRef>
-            <a:effectRef idx="1">
-              <a:schemeClr val="accent1"/>
-            </a:effectRef>
-            <a:fontRef idx="minor">
-              <a:schemeClr val="tx1"/>
-            </a:fontRef>
-          </p:style>
-        </p:cxnSp>
-        <p:cxnSp>
-          <p:nvCxnSpPr>
-            <p:cNvPr id="112" name="Straight Connector 111"/>
-            <p:cNvCxnSpPr/>
-            <p:nvPr/>
-          </p:nvCxnSpPr>
-          <p:spPr>
-            <a:xfrm>
-              <a:off x="861204" y="2834698"/>
-              <a:ext cx="2571750" cy="2582333"/>
-            </a:xfrm>
-            <a:prstGeom prst="line">
-              <a:avLst/>
-            </a:prstGeom>
-            <a:ln>
-              <a:solidFill>
-                <a:srgbClr val="FF6600"/>
-              </a:solidFill>
-            </a:ln>
-            <a:effectLst/>
-          </p:spPr>
-          <p:style>
-            <a:lnRef idx="2">
-              <a:schemeClr val="accent1"/>
-            </a:lnRef>
-            <a:fillRef idx="0">
-              <a:schemeClr val="accent1"/>
-            </a:fillRef>
-            <a:effectRef idx="1">
-              <a:schemeClr val="accent1"/>
-            </a:effectRef>
-            <a:fontRef idx="minor">
-              <a:schemeClr val="tx1"/>
-            </a:fontRef>
-          </p:style>
-        </p:cxnSp>
-        <p:cxnSp>
-          <p:nvCxnSpPr>
-            <p:cNvPr id="113" name="Straight Connector 112"/>
-            <p:cNvCxnSpPr/>
-            <p:nvPr/>
-          </p:nvCxnSpPr>
-          <p:spPr>
-            <a:xfrm>
-              <a:off x="76200" y="3581400"/>
-              <a:ext cx="2571750" cy="2582333"/>
-            </a:xfrm>
-            <a:prstGeom prst="line">
-              <a:avLst/>
-            </a:prstGeom>
-            <a:ln>
-              <a:solidFill>
-                <a:srgbClr val="FF6600"/>
-              </a:solidFill>
-            </a:ln>
-            <a:effectLst/>
-          </p:spPr>
-          <p:style>
-            <a:lnRef idx="2">
-              <a:schemeClr val="accent1"/>
-            </a:lnRef>
-            <a:fillRef idx="0">
-              <a:schemeClr val="accent1"/>
-            </a:fillRef>
-            <a:effectRef idx="1">
-              <a:schemeClr val="accent1"/>
-            </a:effectRef>
-            <a:fontRef idx="minor">
-              <a:schemeClr val="tx1"/>
-            </a:fontRef>
-          </p:style>
-        </p:cxnSp>
-        <p:cxnSp>
-          <p:nvCxnSpPr>
-            <p:cNvPr id="114" name="Straight Connector 113"/>
-            <p:cNvCxnSpPr/>
-            <p:nvPr/>
-          </p:nvCxnSpPr>
-          <p:spPr>
-            <a:xfrm>
-              <a:off x="-685800" y="4343400"/>
-              <a:ext cx="2571750" cy="2582333"/>
-            </a:xfrm>
-            <a:prstGeom prst="line">
-              <a:avLst/>
-            </a:prstGeom>
-            <a:ln>
-              <a:solidFill>
-                <a:srgbClr val="FF6600"/>
-              </a:solidFill>
-            </a:ln>
-            <a:effectLst/>
-          </p:spPr>
-          <p:style>
-            <a:lnRef idx="2">
-              <a:schemeClr val="accent1"/>
-            </a:lnRef>
-            <a:fillRef idx="0">
-              <a:schemeClr val="accent1"/>
-            </a:fillRef>
-            <a:effectRef idx="1">
-              <a:schemeClr val="accent1"/>
-            </a:effectRef>
-            <a:fontRef idx="minor">
-              <a:schemeClr val="tx1"/>
-            </a:fontRef>
-          </p:style>
-        </p:cxnSp>
-        <p:sp>
-          <p:nvSpPr>
-            <p:cNvPr id="118" name="Rectangle 117"/>
-            <p:cNvSpPr/>
-            <p:nvPr/>
-          </p:nvSpPr>
-          <p:spPr>
-            <a:xfrm rot="2708122">
-              <a:off x="930055" y="3201460"/>
-              <a:ext cx="3000364" cy="3656325"/>
-            </a:xfrm>
-            <a:prstGeom prst="rect">
-              <a:avLst/>
-            </a:prstGeom>
-            <a:solidFill>
-              <a:schemeClr val="bg1"/>
-            </a:solidFill>
-            <a:ln>
-              <a:noFill/>
-            </a:ln>
-            <a:effectLst/>
-          </p:spPr>
-          <p:style>
-            <a:lnRef idx="1">
-              <a:schemeClr val="accent1"/>
-            </a:lnRef>
-            <a:fillRef idx="3">
-              <a:schemeClr val="accent1"/>
-            </a:fillRef>
-            <a:effectRef idx="2">
-              <a:schemeClr val="accent1"/>
-            </a:effectRef>
-            <a:fontRef idx="minor">
-              <a:schemeClr val="lt1"/>
-            </a:fontRef>
-          </p:style>
-          <p:txBody>
-            <a:bodyPr rtlCol="0" anchor="ctr"/>
-            <a:lstStyle/>
-            <a:p>
-              <a:pPr algn="ctr"/>
-              <a:endParaRPr lang="en-US"/>
-            </a:p>
-          </p:txBody>
-        </p:sp>
-        <p:cxnSp>
-          <p:nvCxnSpPr>
-            <p:cNvPr id="109" name="Straight Arrow Connector 108"/>
-            <p:cNvCxnSpPr/>
-            <p:nvPr/>
-          </p:nvCxnSpPr>
-          <p:spPr>
-            <a:xfrm flipV="1">
-              <a:off x="1377018" y="2565183"/>
-              <a:ext cx="749423" cy="731249"/>
-            </a:xfrm>
-            <a:prstGeom prst="straightConnector1">
-              <a:avLst/>
-            </a:prstGeom>
-            <a:ln>
-              <a:solidFill>
-                <a:schemeClr val="tx1"/>
-              </a:solidFill>
-              <a:headEnd type="stealth" w="med" len="lg"/>
-              <a:tailEnd type="stealth" w="med" len="lg"/>
-            </a:ln>
-          </p:spPr>
-          <p:style>
-            <a:lnRef idx="2">
-              <a:schemeClr val="accent1"/>
-            </a:lnRef>
-            <a:fillRef idx="0">
-              <a:schemeClr val="accent1"/>
-            </a:fillRef>
-            <a:effectRef idx="1">
-              <a:schemeClr val="accent1"/>
-            </a:effectRef>
-            <a:fontRef idx="minor">
-              <a:schemeClr val="tx1"/>
-            </a:fontRef>
-          </p:style>
-        </p:cxnSp>
-        <p:cxnSp>
-          <p:nvCxnSpPr>
-            <p:cNvPr id="115" name="Straight Arrow Connector 114"/>
-            <p:cNvCxnSpPr/>
-            <p:nvPr/>
-          </p:nvCxnSpPr>
-          <p:spPr>
-            <a:xfrm flipV="1">
-              <a:off x="1728881" y="2351959"/>
-              <a:ext cx="218524" cy="213224"/>
-            </a:xfrm>
-            <a:prstGeom prst="straightConnector1">
-              <a:avLst/>
-            </a:prstGeom>
-            <a:ln>
-              <a:solidFill>
-                <a:schemeClr val="tx1"/>
-              </a:solidFill>
-              <a:headEnd type="stealth" w="med" len="lg"/>
-              <a:tailEnd type="stealth" w="med" len="lg"/>
-            </a:ln>
-          </p:spPr>
-          <p:style>
-            <a:lnRef idx="2">
-              <a:schemeClr val="accent1"/>
-            </a:lnRef>
-            <a:fillRef idx="0">
-              <a:schemeClr val="accent1"/>
-            </a:fillRef>
-            <a:effectRef idx="1">
-              <a:schemeClr val="accent1"/>
-            </a:effectRef>
-            <a:fontRef idx="minor">
-              <a:schemeClr val="tx1"/>
-            </a:fontRef>
-          </p:style>
-        </p:cxnSp>
-        <p:cxnSp>
-          <p:nvCxnSpPr>
-            <p:cNvPr id="116" name="Straight Arrow Connector 115"/>
-            <p:cNvCxnSpPr/>
-            <p:nvPr/>
-          </p:nvCxnSpPr>
-          <p:spPr>
-            <a:xfrm flipV="1">
-              <a:off x="804916" y="2778407"/>
-              <a:ext cx="1559091" cy="1521200"/>
-            </a:xfrm>
-            <a:prstGeom prst="straightConnector1">
-              <a:avLst/>
-            </a:prstGeom>
-            <a:ln>
-              <a:solidFill>
-                <a:schemeClr val="tx1"/>
-              </a:solidFill>
-              <a:headEnd type="stealth" w="med" len="lg"/>
-              <a:tailEnd type="stealth" w="med" len="lg"/>
-            </a:ln>
-          </p:spPr>
-          <p:style>
-            <a:lnRef idx="2">
-              <a:schemeClr val="accent1"/>
-            </a:lnRef>
-            <a:fillRef idx="0">
-              <a:schemeClr val="accent1"/>
-            </a:fillRef>
-            <a:effectRef idx="1">
-              <a:schemeClr val="accent1"/>
-            </a:effectRef>
-            <a:fontRef idx="minor">
-              <a:schemeClr val="tx1"/>
-            </a:fontRef>
-          </p:style>
-        </p:cxnSp>
-        <p:cxnSp>
-          <p:nvCxnSpPr>
-            <p:cNvPr id="117" name="Straight Arrow Connector 116"/>
-            <p:cNvCxnSpPr/>
-            <p:nvPr/>
-          </p:nvCxnSpPr>
-          <p:spPr>
-            <a:xfrm flipV="1">
-              <a:off x="207540" y="2864992"/>
-              <a:ext cx="2269067" cy="2242456"/>
-            </a:xfrm>
-            <a:prstGeom prst="straightConnector1">
-              <a:avLst/>
-            </a:prstGeom>
-            <a:ln>
-              <a:solidFill>
-                <a:schemeClr val="tx1"/>
-              </a:solidFill>
-              <a:headEnd type="stealth" w="med" len="lg"/>
-              <a:tailEnd type="stealth" w="med" len="lg"/>
-            </a:ln>
-          </p:spPr>
-          <p:style>
-            <a:lnRef idx="2">
-              <a:schemeClr val="accent1"/>
-            </a:lnRef>
-            <a:fillRef idx="0">
-              <a:schemeClr val="accent1"/>
-            </a:fillRef>
-            <a:effectRef idx="1">
-              <a:schemeClr val="accent1"/>
-            </a:effectRef>
-            <a:fontRef idx="minor">
-              <a:schemeClr val="tx1"/>
-            </a:fontRef>
-          </p:style>
-        </p:cxnSp>
-        <p:sp>
-          <p:nvSpPr>
-            <p:cNvPr id="119" name="TextBox 118"/>
-            <p:cNvSpPr txBox="1"/>
-            <p:nvPr/>
-          </p:nvSpPr>
-          <p:spPr>
-            <a:xfrm rot="2811792">
-              <a:off x="1506823" y="2028261"/>
-              <a:ext cx="924983" cy="369332"/>
-            </a:xfrm>
-            <a:prstGeom prst="rect">
-              <a:avLst/>
-            </a:prstGeom>
-            <a:noFill/>
-          </p:spPr>
-          <p:txBody>
-            <a:bodyPr wrap="square" rtlCol="0">
-              <a:spAutoFit/>
-            </a:bodyPr>
-            <a:lstStyle/>
-            <a:p>
-              <a:r>
-                <a:rPr lang="en-US" i="1" dirty="0" smtClean="0"/>
-                <a:t>h</a:t>
-              </a:r>
-              <a:r>
-                <a:rPr lang="en-US" dirty="0" smtClean="0"/>
-                <a:t>=1/8</a:t>
-              </a:r>
-              <a:endParaRPr lang="en-US" dirty="0"/>
-            </a:p>
-          </p:txBody>
-        </p:sp>
-        <p:sp>
-          <p:nvSpPr>
-            <p:cNvPr id="120" name="TextBox 119"/>
-            <p:cNvSpPr txBox="1"/>
-            <p:nvPr/>
-          </p:nvSpPr>
-          <p:spPr>
-            <a:xfrm rot="2811792">
-              <a:off x="1643820" y="3753408"/>
-              <a:ext cx="762254" cy="369332"/>
-            </a:xfrm>
-            <a:prstGeom prst="rect">
-              <a:avLst/>
-            </a:prstGeom>
-            <a:noFill/>
-          </p:spPr>
-          <p:txBody>
-            <a:bodyPr wrap="square" rtlCol="0">
-              <a:spAutoFit/>
-            </a:bodyPr>
-            <a:lstStyle/>
-            <a:p>
-              <a:r>
-                <a:rPr lang="en-US" i="1" dirty="0" smtClean="0"/>
-                <a:t>h</a:t>
-              </a:r>
-              <a:r>
-                <a:rPr lang="en-US" dirty="0" smtClean="0"/>
-                <a:t>=1/2</a:t>
-              </a:r>
-              <a:endParaRPr lang="en-US" dirty="0"/>
-            </a:p>
-          </p:txBody>
-        </p:sp>
-        <p:sp>
-          <p:nvSpPr>
-            <p:cNvPr id="121" name="TextBox 120"/>
-            <p:cNvSpPr txBox="1"/>
-            <p:nvPr/>
-          </p:nvSpPr>
-          <p:spPr>
-            <a:xfrm rot="2811792">
-              <a:off x="849692" y="4576256"/>
-              <a:ext cx="924983" cy="369332"/>
-            </a:xfrm>
-            <a:prstGeom prst="rect">
-              <a:avLst/>
-            </a:prstGeom>
-            <a:noFill/>
-          </p:spPr>
-          <p:txBody>
-            <a:bodyPr wrap="square" rtlCol="0">
-              <a:spAutoFit/>
-            </a:bodyPr>
-            <a:lstStyle/>
-            <a:p>
-              <a:r>
-                <a:rPr lang="en-US" i="1" dirty="0" smtClean="0"/>
-                <a:t>h</a:t>
-              </a:r>
-              <a:r>
-                <a:rPr lang="en-US" dirty="0" smtClean="0"/>
-                <a:t>=1</a:t>
-              </a:r>
-              <a:endParaRPr lang="en-US" dirty="0"/>
-            </a:p>
-          </p:txBody>
-        </p:sp>
-        <p:sp>
-          <p:nvSpPr>
-            <p:cNvPr id="122" name="TextBox 121"/>
-            <p:cNvSpPr txBox="1"/>
-            <p:nvPr/>
-          </p:nvSpPr>
-          <p:spPr>
-            <a:xfrm rot="2811792">
-              <a:off x="369488" y="5038286"/>
-              <a:ext cx="924983" cy="369332"/>
-            </a:xfrm>
-            <a:prstGeom prst="rect">
-              <a:avLst/>
-            </a:prstGeom>
-            <a:noFill/>
-          </p:spPr>
-          <p:txBody>
-            <a:bodyPr wrap="square" rtlCol="0">
-              <a:spAutoFit/>
-            </a:bodyPr>
-            <a:lstStyle/>
-            <a:p>
-              <a:r>
-                <a:rPr lang="en-US" i="1" dirty="0" smtClean="0"/>
-                <a:t>h</a:t>
-              </a:r>
-              <a:r>
-                <a:rPr lang="en-US" dirty="0" smtClean="0"/>
-                <a:t>=3/2</a:t>
-              </a:r>
-              <a:endParaRPr lang="en-US" dirty="0"/>
-            </a:p>
-          </p:txBody>
-        </p:sp>
-      </p:grpSp>
       <p:pic>
         <p:nvPicPr>
-          <p:cNvPr id="102" name="Picture 101"/>
+          <p:cNvPr id="2" name="Picture 1"/>
           <p:cNvPicPr>
             <a:picLocks noChangeAspect="1"/>
           </p:cNvPicPr>
@@ -3659,8 +3111,8 @@
         </p:blipFill>
         <p:spPr>
           <a:xfrm>
-            <a:off x="-4321327" y="1444907"/>
-            <a:ext cx="3810000" cy="3810000"/>
+            <a:off x="-78950" y="84678"/>
+            <a:ext cx="5142857" cy="5142857"/>
           </a:xfrm>
           <a:prstGeom prst="rect">
             <a:avLst/>
@@ -3669,7 +3121,7 @@
       </p:pic>
       <p:pic>
         <p:nvPicPr>
-          <p:cNvPr id="106" name="Picture 105"/>
+          <p:cNvPr id="108" name="Picture 107"/>
           <p:cNvPicPr>
             <a:picLocks noChangeAspect="1"/>
           </p:cNvPicPr>
@@ -3683,14 +3135,523 @@
         </p:blipFill>
         <p:spPr>
           <a:xfrm>
-            <a:off x="6294741" y="-3918760"/>
-            <a:ext cx="4347757" cy="2693194"/>
+            <a:off x="-6365893" y="-139298"/>
+            <a:ext cx="5107448" cy="5107448"/>
           </a:xfrm>
           <a:prstGeom prst="rect">
             <a:avLst/>
           </a:prstGeom>
         </p:spPr>
       </p:pic>
+      <p:cxnSp>
+        <p:nvCxnSpPr>
+          <p:cNvPr id="110" name="Straight Connector 109"/>
+          <p:cNvCxnSpPr/>
+          <p:nvPr/>
+        </p:nvCxnSpPr>
+        <p:spPr>
+          <a:xfrm>
+            <a:off x="4033303" y="1112592"/>
+            <a:ext cx="2571750" cy="2582333"/>
+          </a:xfrm>
+          <a:prstGeom prst="line">
+            <a:avLst/>
+          </a:prstGeom>
+          <a:ln>
+            <a:solidFill>
+              <a:srgbClr val="FF6600"/>
+            </a:solidFill>
+          </a:ln>
+          <a:effectLst/>
+        </p:spPr>
+        <p:style>
+          <a:lnRef idx="2">
+            <a:schemeClr val="accent1"/>
+          </a:lnRef>
+          <a:fillRef idx="0">
+            <a:schemeClr val="accent1"/>
+          </a:fillRef>
+          <a:effectRef idx="1">
+            <a:schemeClr val="accent1"/>
+          </a:effectRef>
+          <a:fontRef idx="minor">
+            <a:schemeClr val="tx1"/>
+          </a:fontRef>
+        </p:style>
+      </p:cxnSp>
+      <p:cxnSp>
+        <p:nvCxnSpPr>
+          <p:cNvPr id="111" name="Straight Connector 110"/>
+          <p:cNvCxnSpPr/>
+          <p:nvPr/>
+        </p:nvCxnSpPr>
+        <p:spPr>
+          <a:xfrm>
+            <a:off x="4499230" y="1931742"/>
+            <a:ext cx="2571750" cy="2582333"/>
+          </a:xfrm>
+          <a:prstGeom prst="line">
+            <a:avLst/>
+          </a:prstGeom>
+          <a:ln>
+            <a:solidFill>
+              <a:srgbClr val="FF6600"/>
+            </a:solidFill>
+          </a:ln>
+          <a:effectLst/>
+        </p:spPr>
+        <p:style>
+          <a:lnRef idx="2">
+            <a:schemeClr val="accent1"/>
+          </a:lnRef>
+          <a:fillRef idx="0">
+            <a:schemeClr val="accent1"/>
+          </a:fillRef>
+          <a:effectRef idx="1">
+            <a:schemeClr val="accent1"/>
+          </a:effectRef>
+          <a:fontRef idx="minor">
+            <a:schemeClr val="tx1"/>
+          </a:fontRef>
+        </p:style>
+      </p:cxnSp>
+      <p:cxnSp>
+        <p:nvCxnSpPr>
+          <p:cNvPr id="112" name="Straight Connector 111"/>
+          <p:cNvCxnSpPr/>
+          <p:nvPr/>
+        </p:nvCxnSpPr>
+        <p:spPr>
+          <a:xfrm>
+            <a:off x="4312424" y="2941873"/>
+            <a:ext cx="2571750" cy="2582333"/>
+          </a:xfrm>
+          <a:prstGeom prst="line">
+            <a:avLst/>
+          </a:prstGeom>
+          <a:ln>
+            <a:solidFill>
+              <a:srgbClr val="FF6600"/>
+            </a:solidFill>
+          </a:ln>
+          <a:effectLst/>
+        </p:spPr>
+        <p:style>
+          <a:lnRef idx="2">
+            <a:schemeClr val="accent1"/>
+          </a:lnRef>
+          <a:fillRef idx="0">
+            <a:schemeClr val="accent1"/>
+          </a:fillRef>
+          <a:effectRef idx="1">
+            <a:schemeClr val="accent1"/>
+          </a:effectRef>
+          <a:fontRef idx="minor">
+            <a:schemeClr val="tx1"/>
+          </a:fontRef>
+        </p:style>
+      </p:cxnSp>
+      <p:cxnSp>
+        <p:nvCxnSpPr>
+          <p:cNvPr id="113" name="Straight Connector 112"/>
+          <p:cNvCxnSpPr/>
+          <p:nvPr/>
+        </p:nvCxnSpPr>
+        <p:spPr>
+          <a:xfrm>
+            <a:off x="3527420" y="3688575"/>
+            <a:ext cx="2571750" cy="2582333"/>
+          </a:xfrm>
+          <a:prstGeom prst="line">
+            <a:avLst/>
+          </a:prstGeom>
+          <a:ln>
+            <a:solidFill>
+              <a:srgbClr val="FF6600"/>
+            </a:solidFill>
+          </a:ln>
+          <a:effectLst/>
+        </p:spPr>
+        <p:style>
+          <a:lnRef idx="2">
+            <a:schemeClr val="accent1"/>
+          </a:lnRef>
+          <a:fillRef idx="0">
+            <a:schemeClr val="accent1"/>
+          </a:fillRef>
+          <a:effectRef idx="1">
+            <a:schemeClr val="accent1"/>
+          </a:effectRef>
+          <a:fontRef idx="minor">
+            <a:schemeClr val="tx1"/>
+          </a:fontRef>
+        </p:style>
+      </p:cxnSp>
+      <p:cxnSp>
+        <p:nvCxnSpPr>
+          <p:cNvPr id="114" name="Straight Connector 113"/>
+          <p:cNvCxnSpPr/>
+          <p:nvPr/>
+        </p:nvCxnSpPr>
+        <p:spPr>
+          <a:xfrm>
+            <a:off x="2765420" y="4450575"/>
+            <a:ext cx="2571750" cy="2582333"/>
+          </a:xfrm>
+          <a:prstGeom prst="line">
+            <a:avLst/>
+          </a:prstGeom>
+          <a:ln>
+            <a:solidFill>
+              <a:srgbClr val="FF6600"/>
+            </a:solidFill>
+          </a:ln>
+          <a:effectLst/>
+        </p:spPr>
+        <p:style>
+          <a:lnRef idx="2">
+            <a:schemeClr val="accent1"/>
+          </a:lnRef>
+          <a:fillRef idx="0">
+            <a:schemeClr val="accent1"/>
+          </a:fillRef>
+          <a:effectRef idx="1">
+            <a:schemeClr val="accent1"/>
+          </a:effectRef>
+          <a:fontRef idx="minor">
+            <a:schemeClr val="tx1"/>
+          </a:fontRef>
+        </p:style>
+      </p:cxnSp>
+      <p:sp>
+        <p:nvSpPr>
+          <p:cNvPr id="118" name="Rectangle 117"/>
+          <p:cNvSpPr/>
+          <p:nvPr/>
+        </p:nvSpPr>
+        <p:spPr>
+          <a:xfrm rot="2708122">
+            <a:off x="4381275" y="3308635"/>
+            <a:ext cx="3000364" cy="3656325"/>
+          </a:xfrm>
+          <a:prstGeom prst="rect">
+            <a:avLst/>
+          </a:prstGeom>
+          <a:solidFill>
+            <a:schemeClr val="bg1"/>
+          </a:solidFill>
+          <a:ln>
+            <a:noFill/>
+          </a:ln>
+          <a:effectLst/>
+        </p:spPr>
+        <p:style>
+          <a:lnRef idx="1">
+            <a:schemeClr val="accent1"/>
+          </a:lnRef>
+          <a:fillRef idx="3">
+            <a:schemeClr val="accent1"/>
+          </a:fillRef>
+          <a:effectRef idx="2">
+            <a:schemeClr val="accent1"/>
+          </a:effectRef>
+          <a:fontRef idx="minor">
+            <a:schemeClr val="lt1"/>
+          </a:fontRef>
+        </p:style>
+        <p:txBody>
+          <a:bodyPr rtlCol="0" anchor="ctr"/>
+          <a:lstStyle/>
+          <a:p>
+            <a:pPr algn="ctr"/>
+            <a:endParaRPr lang="en-US"/>
+          </a:p>
+        </p:txBody>
+      </p:sp>
+      <p:cxnSp>
+        <p:nvCxnSpPr>
+          <p:cNvPr id="109" name="Straight Arrow Connector 108"/>
+          <p:cNvCxnSpPr/>
+          <p:nvPr/>
+        </p:nvCxnSpPr>
+        <p:spPr>
+          <a:xfrm flipV="1">
+            <a:off x="4828238" y="2672358"/>
+            <a:ext cx="749423" cy="731249"/>
+          </a:xfrm>
+          <a:prstGeom prst="straightConnector1">
+            <a:avLst/>
+          </a:prstGeom>
+          <a:ln>
+            <a:solidFill>
+              <a:schemeClr val="tx1"/>
+            </a:solidFill>
+            <a:headEnd type="stealth" w="med" len="lg"/>
+            <a:tailEnd type="stealth" w="med" len="lg"/>
+          </a:ln>
+        </p:spPr>
+        <p:style>
+          <a:lnRef idx="2">
+            <a:schemeClr val="accent1"/>
+          </a:lnRef>
+          <a:fillRef idx="0">
+            <a:schemeClr val="accent1"/>
+          </a:fillRef>
+          <a:effectRef idx="1">
+            <a:schemeClr val="accent1"/>
+          </a:effectRef>
+          <a:fontRef idx="minor">
+            <a:schemeClr val="tx1"/>
+          </a:fontRef>
+        </p:style>
+      </p:cxnSp>
+      <p:cxnSp>
+        <p:nvCxnSpPr>
+          <p:cNvPr id="115" name="Straight Arrow Connector 114"/>
+          <p:cNvCxnSpPr/>
+          <p:nvPr/>
+        </p:nvCxnSpPr>
+        <p:spPr>
+          <a:xfrm flipV="1">
+            <a:off x="5180101" y="2459134"/>
+            <a:ext cx="218524" cy="213224"/>
+          </a:xfrm>
+          <a:prstGeom prst="straightConnector1">
+            <a:avLst/>
+          </a:prstGeom>
+          <a:ln>
+            <a:solidFill>
+              <a:schemeClr val="tx1"/>
+            </a:solidFill>
+            <a:headEnd type="stealth" w="med" len="lg"/>
+            <a:tailEnd type="stealth" w="med" len="lg"/>
+          </a:ln>
+        </p:spPr>
+        <p:style>
+          <a:lnRef idx="2">
+            <a:schemeClr val="accent1"/>
+          </a:lnRef>
+          <a:fillRef idx="0">
+            <a:schemeClr val="accent1"/>
+          </a:fillRef>
+          <a:effectRef idx="1">
+            <a:schemeClr val="accent1"/>
+          </a:effectRef>
+          <a:fontRef idx="minor">
+            <a:schemeClr val="tx1"/>
+          </a:fontRef>
+        </p:style>
+      </p:cxnSp>
+      <p:cxnSp>
+        <p:nvCxnSpPr>
+          <p:cNvPr id="116" name="Straight Arrow Connector 115"/>
+          <p:cNvCxnSpPr/>
+          <p:nvPr/>
+        </p:nvCxnSpPr>
+        <p:spPr>
+          <a:xfrm flipV="1">
+            <a:off x="4256136" y="2885582"/>
+            <a:ext cx="1559091" cy="1521200"/>
+          </a:xfrm>
+          <a:prstGeom prst="straightConnector1">
+            <a:avLst/>
+          </a:prstGeom>
+          <a:ln>
+            <a:solidFill>
+              <a:schemeClr val="tx1"/>
+            </a:solidFill>
+            <a:headEnd type="stealth" w="med" len="lg"/>
+            <a:tailEnd type="stealth" w="med" len="lg"/>
+          </a:ln>
+        </p:spPr>
+        <p:style>
+          <a:lnRef idx="2">
+            <a:schemeClr val="accent1"/>
+          </a:lnRef>
+          <a:fillRef idx="0">
+            <a:schemeClr val="accent1"/>
+          </a:fillRef>
+          <a:effectRef idx="1">
+            <a:schemeClr val="accent1"/>
+          </a:effectRef>
+          <a:fontRef idx="minor">
+            <a:schemeClr val="tx1"/>
+          </a:fontRef>
+        </p:style>
+      </p:cxnSp>
+      <p:cxnSp>
+        <p:nvCxnSpPr>
+          <p:cNvPr id="117" name="Straight Arrow Connector 116"/>
+          <p:cNvCxnSpPr/>
+          <p:nvPr/>
+        </p:nvCxnSpPr>
+        <p:spPr>
+          <a:xfrm flipV="1">
+            <a:off x="3658760" y="2972167"/>
+            <a:ext cx="2269067" cy="2242456"/>
+          </a:xfrm>
+          <a:prstGeom prst="straightConnector1">
+            <a:avLst/>
+          </a:prstGeom>
+          <a:ln>
+            <a:solidFill>
+              <a:schemeClr val="tx1"/>
+            </a:solidFill>
+            <a:headEnd type="stealth" w="med" len="lg"/>
+            <a:tailEnd type="stealth" w="med" len="lg"/>
+          </a:ln>
+        </p:spPr>
+        <p:style>
+          <a:lnRef idx="2">
+            <a:schemeClr val="accent1"/>
+          </a:lnRef>
+          <a:fillRef idx="0">
+            <a:schemeClr val="accent1"/>
+          </a:fillRef>
+          <a:effectRef idx="1">
+            <a:schemeClr val="accent1"/>
+          </a:effectRef>
+          <a:fontRef idx="minor">
+            <a:schemeClr val="tx1"/>
+          </a:fontRef>
+        </p:style>
+      </p:cxnSp>
+      <p:sp>
+        <p:nvSpPr>
+          <p:cNvPr id="119" name="TextBox 118"/>
+          <p:cNvSpPr txBox="1"/>
+          <p:nvPr/>
+        </p:nvSpPr>
+        <p:spPr>
+          <a:xfrm rot="2811792">
+            <a:off x="4958043" y="2135436"/>
+            <a:ext cx="924983" cy="369332"/>
+          </a:xfrm>
+          <a:prstGeom prst="rect">
+            <a:avLst/>
+          </a:prstGeom>
+          <a:noFill/>
+        </p:spPr>
+        <p:txBody>
+          <a:bodyPr wrap="square" rtlCol="0">
+            <a:spAutoFit/>
+          </a:bodyPr>
+          <a:lstStyle/>
+          <a:p>
+            <a:r>
+              <a:rPr lang="en-US" i="1" dirty="0" smtClean="0"/>
+              <a:t>h</a:t>
+            </a:r>
+            <a:r>
+              <a:rPr lang="en-US" dirty="0" smtClean="0"/>
+              <a:t>=1/8</a:t>
+            </a:r>
+            <a:endParaRPr lang="en-US" dirty="0"/>
+          </a:p>
+        </p:txBody>
+      </p:sp>
+      <p:sp>
+        <p:nvSpPr>
+          <p:cNvPr id="120" name="TextBox 119"/>
+          <p:cNvSpPr txBox="1"/>
+          <p:nvPr/>
+        </p:nvSpPr>
+        <p:spPr>
+          <a:xfrm rot="2811792">
+            <a:off x="5095040" y="3860583"/>
+            <a:ext cx="762254" cy="369332"/>
+          </a:xfrm>
+          <a:prstGeom prst="rect">
+            <a:avLst/>
+          </a:prstGeom>
+          <a:noFill/>
+        </p:spPr>
+        <p:txBody>
+          <a:bodyPr wrap="square" rtlCol="0">
+            <a:spAutoFit/>
+          </a:bodyPr>
+          <a:lstStyle/>
+          <a:p>
+            <a:r>
+              <a:rPr lang="en-US" i="1" dirty="0" smtClean="0"/>
+              <a:t>h</a:t>
+            </a:r>
+            <a:r>
+              <a:rPr lang="en-US" dirty="0" smtClean="0"/>
+              <a:t>=1/2</a:t>
+            </a:r>
+            <a:endParaRPr lang="en-US" dirty="0"/>
+          </a:p>
+        </p:txBody>
+      </p:sp>
+      <p:sp>
+        <p:nvSpPr>
+          <p:cNvPr id="121" name="TextBox 120"/>
+          <p:cNvSpPr txBox="1"/>
+          <p:nvPr/>
+        </p:nvSpPr>
+        <p:spPr>
+          <a:xfrm rot="2811792">
+            <a:off x="4300912" y="4683431"/>
+            <a:ext cx="924983" cy="369332"/>
+          </a:xfrm>
+          <a:prstGeom prst="rect">
+            <a:avLst/>
+          </a:prstGeom>
+          <a:noFill/>
+        </p:spPr>
+        <p:txBody>
+          <a:bodyPr wrap="square" rtlCol="0">
+            <a:spAutoFit/>
+          </a:bodyPr>
+          <a:lstStyle/>
+          <a:p>
+            <a:r>
+              <a:rPr lang="en-US" i="1" dirty="0" smtClean="0"/>
+              <a:t>h</a:t>
+            </a:r>
+            <a:r>
+              <a:rPr lang="en-US" dirty="0" smtClean="0"/>
+              <a:t>=1</a:t>
+            </a:r>
+            <a:endParaRPr lang="en-US" dirty="0"/>
+          </a:p>
+        </p:txBody>
+      </p:sp>
+      <p:sp>
+        <p:nvSpPr>
+          <p:cNvPr id="122" name="TextBox 121"/>
+          <p:cNvSpPr txBox="1"/>
+          <p:nvPr/>
+        </p:nvSpPr>
+        <p:spPr>
+          <a:xfrm rot="2811792">
+            <a:off x="3820708" y="5145461"/>
+            <a:ext cx="924983" cy="369332"/>
+          </a:xfrm>
+          <a:prstGeom prst="rect">
+            <a:avLst/>
+          </a:prstGeom>
+          <a:noFill/>
+        </p:spPr>
+        <p:txBody>
+          <a:bodyPr wrap="square" rtlCol="0">
+            <a:spAutoFit/>
+          </a:bodyPr>
+          <a:lstStyle/>
+          <a:p>
+            <a:r>
+              <a:rPr lang="en-US" i="1" dirty="0" smtClean="0"/>
+              <a:t>h</a:t>
+            </a:r>
+            <a:r>
+              <a:rPr lang="en-US" dirty="0" smtClean="0"/>
+              <a:t>=3/2</a:t>
+            </a:r>
+            <a:endParaRPr lang="en-US" dirty="0"/>
+          </a:p>
+        </p:txBody>
+      </p:sp>
       <p:sp>
         <p:nvSpPr>
           <p:cNvPr id="123" name="Rectangle 122"/>
@@ -3824,30 +3785,537 @@
           </a:fontRef>
         </p:style>
       </p:cxnSp>
+      <p:grpSp>
+        <p:nvGrpSpPr>
+          <p:cNvPr id="8" name="Group 7"/>
+          <p:cNvGrpSpPr/>
+          <p:nvPr/>
+        </p:nvGrpSpPr>
+        <p:grpSpPr>
+          <a:xfrm>
+            <a:off x="6403594" y="74492"/>
+            <a:ext cx="3064481" cy="3011757"/>
+            <a:chOff x="6721074" y="74492"/>
+            <a:chExt cx="3064481" cy="3011757"/>
+          </a:xfrm>
+        </p:grpSpPr>
+        <p:pic>
+          <p:nvPicPr>
+            <p:cNvPr id="127" name="Picture 126" descr="CircleSmash.png"/>
+            <p:cNvPicPr>
+              <a:picLocks noChangeAspect="1"/>
+            </p:cNvPicPr>
+            <p:nvPr/>
+          </p:nvPicPr>
+          <p:blipFill>
+            <a:blip r:embed="rId5">
+              <a:clrChange>
+                <a:clrFrom>
+                  <a:srgbClr val="000000"/>
+                </a:clrFrom>
+                <a:clrTo>
+                  <a:srgbClr val="000000">
+                    <a:alpha val="0"/>
+                  </a:srgbClr>
+                </a:clrTo>
+              </a:clrChange>
+              <a:extLst>
+                <a:ext uri="{28A0092B-C50C-407E-A947-70E740481C1C}">
+                  <a14:useLocalDpi xmlns:a14="http://schemas.microsoft.com/office/drawing/2010/main" val="0"/>
+                </a:ext>
+              </a:extLst>
+            </a:blip>
+            <a:stretch>
+              <a:fillRect/>
+            </a:stretch>
+          </p:blipFill>
+          <p:spPr>
+            <a:xfrm rot="5103180">
+              <a:off x="6729932" y="65634"/>
+              <a:ext cx="3011757" cy="3029473"/>
+            </a:xfrm>
+            <a:prstGeom prst="rect">
+              <a:avLst/>
+            </a:prstGeom>
+          </p:spPr>
+        </p:pic>
+        <p:pic>
+          <p:nvPicPr>
+            <p:cNvPr id="131" name="Picture 130"/>
+            <p:cNvPicPr>
+              <a:picLocks noChangeAspect="1"/>
+            </p:cNvPicPr>
+            <p:nvPr/>
+          </p:nvPicPr>
+          <p:blipFill>
+            <a:blip r:embed="rId6"/>
+            <a:stretch>
+              <a:fillRect/>
+            </a:stretch>
+          </p:blipFill>
+          <p:spPr>
+            <a:xfrm rot="13616732">
+              <a:off x="9221607" y="35927"/>
+              <a:ext cx="506466" cy="621431"/>
+            </a:xfrm>
+            <a:prstGeom prst="rect">
+              <a:avLst/>
+            </a:prstGeom>
+          </p:spPr>
+        </p:pic>
+        <p:cxnSp>
+          <p:nvCxnSpPr>
+            <p:cNvPr id="133" name="Straight Arrow Connector 132"/>
+            <p:cNvCxnSpPr/>
+            <p:nvPr/>
+          </p:nvCxnSpPr>
+          <p:spPr>
+            <a:xfrm flipV="1">
+              <a:off x="7687733" y="1444907"/>
+              <a:ext cx="694267" cy="681868"/>
+            </a:xfrm>
+            <a:prstGeom prst="straightConnector1">
+              <a:avLst/>
+            </a:prstGeom>
+            <a:ln>
+              <a:solidFill>
+                <a:srgbClr val="0000FF"/>
+              </a:solidFill>
+              <a:tailEnd type="stealth" w="med" len="lg"/>
+            </a:ln>
+          </p:spPr>
+          <p:style>
+            <a:lnRef idx="2">
+              <a:schemeClr val="accent1"/>
+            </a:lnRef>
+            <a:fillRef idx="0">
+              <a:schemeClr val="accent1"/>
+            </a:fillRef>
+            <a:effectRef idx="1">
+              <a:schemeClr val="accent1"/>
+            </a:effectRef>
+            <a:fontRef idx="minor">
+              <a:schemeClr val="tx1"/>
+            </a:fontRef>
+          </p:style>
+        </p:cxnSp>
+        <p:sp>
+          <p:nvSpPr>
+            <p:cNvPr id="134" name="TextBox 133"/>
+            <p:cNvSpPr txBox="1"/>
+            <p:nvPr/>
+          </p:nvSpPr>
+          <p:spPr>
+            <a:xfrm rot="18859671">
+              <a:off x="6854118" y="1515094"/>
+              <a:ext cx="1957052" cy="369332"/>
+            </a:xfrm>
+            <a:prstGeom prst="rect">
+              <a:avLst/>
+            </a:prstGeom>
+            <a:noFill/>
+          </p:spPr>
+          <p:txBody>
+            <a:bodyPr wrap="square" rtlCol="0">
+              <a:spAutoFit/>
+            </a:bodyPr>
+            <a:lstStyle/>
+            <a:p>
+              <a:r>
+                <a:rPr lang="en-US" dirty="0" smtClean="0"/>
+                <a:t>Light direction</a:t>
+              </a:r>
+              <a:endParaRPr lang="en-US" dirty="0"/>
+            </a:p>
+          </p:txBody>
+        </p:sp>
+      </p:grpSp>
+      <p:sp>
+        <p:nvSpPr>
+          <p:cNvPr id="3" name="TextBox 2"/>
+          <p:cNvSpPr txBox="1"/>
+          <p:nvPr/>
+        </p:nvSpPr>
+        <p:spPr>
+          <a:xfrm>
+            <a:off x="10342880" y="1931742"/>
+            <a:ext cx="1076960" cy="369332"/>
+          </a:xfrm>
+          <a:prstGeom prst="rect">
+            <a:avLst/>
+          </a:prstGeom>
+          <a:noFill/>
+        </p:spPr>
+        <p:txBody>
+          <a:bodyPr wrap="square" rtlCol="0">
+            <a:spAutoFit/>
+          </a:bodyPr>
+          <a:lstStyle/>
+          <a:p>
+            <a:endParaRPr lang="en-US" dirty="0"/>
+          </a:p>
+        </p:txBody>
+      </p:sp>
+      <p:graphicFrame>
+        <p:nvGraphicFramePr>
+          <p:cNvPr id="33" name="Object 32"/>
+          <p:cNvGraphicFramePr>
+            <a:graphicFrameLocks noChangeAspect="1"/>
+          </p:cNvGraphicFramePr>
+          <p:nvPr>
+            <p:extLst>
+              <p:ext uri="{D42A27DB-BD31-4B8C-83A1-F6EECF244321}">
+                <p14:modId xmlns:p14="http://schemas.microsoft.com/office/powerpoint/2010/main" val="3185435762"/>
+              </p:ext>
+            </p:extLst>
+          </p:nvPr>
+        </p:nvGraphicFramePr>
+        <p:xfrm>
+          <a:off x="11381740" y="3548063"/>
+          <a:ext cx="549275" cy="549275"/>
+        </p:xfrm>
+        <a:graphic>
+          <a:graphicData uri="http://schemas.openxmlformats.org/presentationml/2006/ole">
+            <mc:AlternateContent xmlns:mc="http://schemas.openxmlformats.org/markup-compatibility/2006">
+              <mc:Choice xmlns:v="urn:schemas-microsoft-com:vml" Requires="v">
+                <p:oleObj spid="_x0000_s1041" name="Equation" r:id="rId7" imgW="228600" imgH="228600" progId="Equation.3">
+                  <p:embed/>
+                </p:oleObj>
+              </mc:Choice>
+              <mc:Fallback>
+                <p:oleObj name="Equation" r:id="rId7" imgW="228600" imgH="228600" progId="Equation.3">
+                  <p:embed/>
+                  <p:pic>
+                    <p:nvPicPr>
+                      <p:cNvPr id="0" name=""/>
+                      <p:cNvPicPr/>
+                      <p:nvPr/>
+                    </p:nvPicPr>
+                    <p:blipFill>
+                      <a:blip r:embed="rId8"/>
+                      <a:stretch>
+                        <a:fillRect/>
+                      </a:stretch>
+                    </p:blipFill>
+                    <p:spPr>
+                      <a:xfrm>
+                        <a:off x="11381740" y="3548063"/>
+                        <a:ext cx="549275" cy="549275"/>
+                      </a:xfrm>
+                      <a:prstGeom prst="rect">
+                        <a:avLst/>
+                      </a:prstGeom>
+                    </p:spPr>
+                  </p:pic>
+                </p:oleObj>
+              </mc:Fallback>
+            </mc:AlternateContent>
+          </a:graphicData>
+        </a:graphic>
+      </p:graphicFrame>
+      <p:graphicFrame>
+        <p:nvGraphicFramePr>
+          <p:cNvPr id="35" name="Object 34"/>
+          <p:cNvGraphicFramePr>
+            <a:graphicFrameLocks noChangeAspect="1"/>
+          </p:cNvGraphicFramePr>
+          <p:nvPr>
+            <p:extLst>
+              <p:ext uri="{D42A27DB-BD31-4B8C-83A1-F6EECF244321}">
+                <p14:modId xmlns:p14="http://schemas.microsoft.com/office/powerpoint/2010/main" val="3825891201"/>
+              </p:ext>
+            </p:extLst>
+          </p:nvPr>
+        </p:nvGraphicFramePr>
+        <p:xfrm>
+          <a:off x="11409363" y="84138"/>
+          <a:ext cx="581025" cy="549275"/>
+        </p:xfrm>
+        <a:graphic>
+          <a:graphicData uri="http://schemas.openxmlformats.org/presentationml/2006/ole">
+            <mc:AlternateContent xmlns:mc="http://schemas.openxmlformats.org/markup-compatibility/2006">
+              <mc:Choice xmlns:v="urn:schemas-microsoft-com:vml" Requires="v">
+                <p:oleObj spid="_x0000_s1042" name="Equation" r:id="rId9" imgW="241300" imgH="228600" progId="Equation.3">
+                  <p:embed/>
+                </p:oleObj>
+              </mc:Choice>
+              <mc:Fallback>
+                <p:oleObj name="Equation" r:id="rId9" imgW="241300" imgH="228600" progId="Equation.3">
+                  <p:embed/>
+                  <p:pic>
+                    <p:nvPicPr>
+                      <p:cNvPr id="0" name=""/>
+                      <p:cNvPicPr/>
+                      <p:nvPr/>
+                    </p:nvPicPr>
+                    <p:blipFill>
+                      <a:blip r:embed="rId10"/>
+                      <a:stretch>
+                        <a:fillRect/>
+                      </a:stretch>
+                    </p:blipFill>
+                    <p:spPr>
+                      <a:xfrm>
+                        <a:off x="11409363" y="84138"/>
+                        <a:ext cx="581025" cy="549275"/>
+                      </a:xfrm>
+                      <a:prstGeom prst="rect">
+                        <a:avLst/>
+                      </a:prstGeom>
+                    </p:spPr>
+                  </p:pic>
+                </p:oleObj>
+              </mc:Fallback>
+            </mc:AlternateContent>
+          </a:graphicData>
+        </a:graphic>
+      </p:graphicFrame>
+      <p:graphicFrame>
+        <p:nvGraphicFramePr>
+          <p:cNvPr id="4" name="Object 3"/>
+          <p:cNvGraphicFramePr>
+            <a:graphicFrameLocks noChangeAspect="1"/>
+          </p:cNvGraphicFramePr>
+          <p:nvPr>
+            <p:extLst>
+              <p:ext uri="{D42A27DB-BD31-4B8C-83A1-F6EECF244321}">
+                <p14:modId xmlns:p14="http://schemas.microsoft.com/office/powerpoint/2010/main" val="2130770444"/>
+              </p:ext>
+            </p:extLst>
+          </p:nvPr>
+        </p:nvGraphicFramePr>
+        <p:xfrm>
+          <a:off x="6481320" y="2819267"/>
+          <a:ext cx="488060" cy="579571"/>
+        </p:xfrm>
+        <a:graphic>
+          <a:graphicData uri="http://schemas.openxmlformats.org/presentationml/2006/ole">
+            <mc:AlternateContent xmlns:mc="http://schemas.openxmlformats.org/markup-compatibility/2006">
+              <mc:Choice xmlns:v="urn:schemas-microsoft-com:vml" Requires="v">
+                <p:oleObj spid="_x0000_s1043" name="Equation" r:id="rId11" imgW="203200" imgH="241300" progId="Equation.3">
+                  <p:embed/>
+                </p:oleObj>
+              </mc:Choice>
+              <mc:Fallback>
+                <p:oleObj name="Equation" r:id="rId11" imgW="203200" imgH="241300" progId="Equation.3">
+                  <p:embed/>
+                  <p:pic>
+                    <p:nvPicPr>
+                      <p:cNvPr id="0" name=""/>
+                      <p:cNvPicPr/>
+                      <p:nvPr/>
+                    </p:nvPicPr>
+                    <p:blipFill>
+                      <a:blip r:embed="rId12"/>
+                      <a:stretch>
+                        <a:fillRect/>
+                      </a:stretch>
+                    </p:blipFill>
+                    <p:spPr>
+                      <a:xfrm>
+                        <a:off x="6481320" y="2819267"/>
+                        <a:ext cx="488060" cy="579571"/>
+                      </a:xfrm>
+                      <a:prstGeom prst="rect">
+                        <a:avLst/>
+                      </a:prstGeom>
+                    </p:spPr>
+                  </p:pic>
+                </p:oleObj>
+              </mc:Fallback>
+            </mc:AlternateContent>
+          </a:graphicData>
+        </a:graphic>
+      </p:graphicFrame>
+      <p:graphicFrame>
+        <p:nvGraphicFramePr>
+          <p:cNvPr id="39" name="Object 38"/>
+          <p:cNvGraphicFramePr>
+            <a:graphicFrameLocks noChangeAspect="1"/>
+          </p:cNvGraphicFramePr>
+          <p:nvPr>
+            <p:extLst>
+              <p:ext uri="{D42A27DB-BD31-4B8C-83A1-F6EECF244321}">
+                <p14:modId xmlns:p14="http://schemas.microsoft.com/office/powerpoint/2010/main" val="570085809"/>
+              </p:ext>
+            </p:extLst>
+          </p:nvPr>
+        </p:nvGraphicFramePr>
+        <p:xfrm>
+          <a:off x="15190620" y="899073"/>
+          <a:ext cx="306387" cy="427037"/>
+        </p:xfrm>
+        <a:graphic>
+          <a:graphicData uri="http://schemas.openxmlformats.org/presentationml/2006/ole">
+            <mc:AlternateContent xmlns:mc="http://schemas.openxmlformats.org/markup-compatibility/2006">
+              <mc:Choice xmlns:v="urn:schemas-microsoft-com:vml" Requires="v">
+                <p:oleObj spid="_x0000_s1044" name="Equation" r:id="rId13" imgW="127000" imgH="177800" progId="Equation.3">
+                  <p:embed/>
+                </p:oleObj>
+              </mc:Choice>
+              <mc:Fallback>
+                <p:oleObj name="Equation" r:id="rId13" imgW="127000" imgH="177800" progId="Equation.3">
+                  <p:embed/>
+                  <p:pic>
+                    <p:nvPicPr>
+                      <p:cNvPr id="0" name=""/>
+                      <p:cNvPicPr/>
+                      <p:nvPr/>
+                    </p:nvPicPr>
+                    <p:blipFill>
+                      <a:blip r:embed="rId14"/>
+                      <a:stretch>
+                        <a:fillRect/>
+                      </a:stretch>
+                    </p:blipFill>
+                    <p:spPr>
+                      <a:xfrm>
+                        <a:off x="15190620" y="899073"/>
+                        <a:ext cx="306387" cy="427037"/>
+                      </a:xfrm>
+                      <a:prstGeom prst="rect">
+                        <a:avLst/>
+                      </a:prstGeom>
+                    </p:spPr>
+                  </p:pic>
+                </p:oleObj>
+              </mc:Fallback>
+            </mc:AlternateContent>
+          </a:graphicData>
+        </a:graphic>
+      </p:graphicFrame>
+      <p:graphicFrame>
+        <p:nvGraphicFramePr>
+          <p:cNvPr id="41" name="Object 40"/>
+          <p:cNvGraphicFramePr>
+            <a:graphicFrameLocks noChangeAspect="1"/>
+          </p:cNvGraphicFramePr>
+          <p:nvPr>
+            <p:extLst>
+              <p:ext uri="{D42A27DB-BD31-4B8C-83A1-F6EECF244321}">
+                <p14:modId xmlns:p14="http://schemas.microsoft.com/office/powerpoint/2010/main" val="1917824445"/>
+              </p:ext>
+            </p:extLst>
+          </p:nvPr>
+        </p:nvGraphicFramePr>
+        <p:xfrm>
+          <a:off x="15190620" y="3658877"/>
+          <a:ext cx="306387" cy="427037"/>
+        </p:xfrm>
+        <a:graphic>
+          <a:graphicData uri="http://schemas.openxmlformats.org/presentationml/2006/ole">
+            <mc:AlternateContent xmlns:mc="http://schemas.openxmlformats.org/markup-compatibility/2006">
+              <mc:Choice xmlns:v="urn:schemas-microsoft-com:vml" Requires="v">
+                <p:oleObj spid="_x0000_s1045" name="Equation" r:id="rId15" imgW="127000" imgH="177800" progId="Equation.3">
+                  <p:embed/>
+                </p:oleObj>
+              </mc:Choice>
+              <mc:Fallback>
+                <p:oleObj name="Equation" r:id="rId15" imgW="127000" imgH="177800" progId="Equation.3">
+                  <p:embed/>
+                  <p:pic>
+                    <p:nvPicPr>
+                      <p:cNvPr id="0" name=""/>
+                      <p:cNvPicPr/>
+                      <p:nvPr/>
+                    </p:nvPicPr>
+                    <p:blipFill>
+                      <a:blip r:embed="rId14"/>
+                      <a:stretch>
+                        <a:fillRect/>
+                      </a:stretch>
+                    </p:blipFill>
+                    <p:spPr>
+                      <a:xfrm>
+                        <a:off x="15190620" y="3658877"/>
+                        <a:ext cx="306387" cy="427037"/>
+                      </a:xfrm>
+                      <a:prstGeom prst="rect">
+                        <a:avLst/>
+                      </a:prstGeom>
+                    </p:spPr>
+                  </p:pic>
+                </p:oleObj>
+              </mc:Fallback>
+            </mc:AlternateContent>
+          </a:graphicData>
+        </a:graphic>
+      </p:graphicFrame>
+      <p:graphicFrame>
+        <p:nvGraphicFramePr>
+          <p:cNvPr id="42" name="Object 41"/>
+          <p:cNvGraphicFramePr>
+            <a:graphicFrameLocks noChangeAspect="1"/>
+          </p:cNvGraphicFramePr>
+          <p:nvPr>
+            <p:extLst>
+              <p:ext uri="{D42A27DB-BD31-4B8C-83A1-F6EECF244321}">
+                <p14:modId xmlns:p14="http://schemas.microsoft.com/office/powerpoint/2010/main" val="1316360427"/>
+              </p:ext>
+            </p:extLst>
+          </p:nvPr>
+        </p:nvGraphicFramePr>
+        <p:xfrm>
+          <a:off x="10189686" y="4787586"/>
+          <a:ext cx="306387" cy="427037"/>
+        </p:xfrm>
+        <a:graphic>
+          <a:graphicData uri="http://schemas.openxmlformats.org/presentationml/2006/ole">
+            <mc:AlternateContent xmlns:mc="http://schemas.openxmlformats.org/markup-compatibility/2006">
+              <mc:Choice xmlns:v="urn:schemas-microsoft-com:vml" Requires="v">
+                <p:oleObj spid="_x0000_s1046" name="Equation" r:id="rId16" imgW="127000" imgH="177800" progId="Equation.3">
+                  <p:embed/>
+                </p:oleObj>
+              </mc:Choice>
+              <mc:Fallback>
+                <p:oleObj name="Equation" r:id="rId16" imgW="127000" imgH="177800" progId="Equation.3">
+                  <p:embed/>
+                  <p:pic>
+                    <p:nvPicPr>
+                      <p:cNvPr id="0" name=""/>
+                      <p:cNvPicPr/>
+                      <p:nvPr/>
+                    </p:nvPicPr>
+                    <p:blipFill>
+                      <a:blip r:embed="rId14"/>
+                      <a:stretch>
+                        <a:fillRect/>
+                      </a:stretch>
+                    </p:blipFill>
+                    <p:spPr>
+                      <a:xfrm>
+                        <a:off x="10189686" y="4787586"/>
+                        <a:ext cx="306387" cy="427037"/>
+                      </a:xfrm>
+                      <a:prstGeom prst="rect">
+                        <a:avLst/>
+                      </a:prstGeom>
+                    </p:spPr>
+                  </p:pic>
+                </p:oleObj>
+              </mc:Fallback>
+            </mc:AlternateContent>
+          </a:graphicData>
+        </a:graphic>
+      </p:graphicFrame>
       <p:pic>
         <p:nvPicPr>
-          <p:cNvPr id="127" name="Picture 126" descr="CircleSmash.png"/>
+          <p:cNvPr id="9" name="Picture 8"/>
           <p:cNvPicPr>
             <a:picLocks noChangeAspect="1"/>
           </p:cNvPicPr>
           <p:nvPr/>
         </p:nvPicPr>
         <p:blipFill>
-          <a:blip r:embed="rId5">
-            <a:extLst>
-              <a:ext uri="{28A0092B-C50C-407E-A947-70E740481C1C}">
-                <a14:useLocalDpi xmlns:a14="http://schemas.microsoft.com/office/drawing/2010/main" val="0"/>
-              </a:ext>
-            </a:extLst>
-          </a:blip>
+          <a:blip r:embed="rId17"/>
           <a:stretch>
             <a:fillRect/>
           </a:stretch>
         </p:blipFill>
         <p:spPr>
-          <a:xfrm rot="5103180">
-            <a:off x="6729932" y="65634"/>
-            <a:ext cx="3011757" cy="3029473"/>
+          <a:xfrm>
+            <a:off x="10954000" y="84678"/>
+            <a:ext cx="4572000" cy="2755900"/>
           </a:xfrm>
           <a:prstGeom prst="rect">
             <a:avLst/>
@@ -3856,22 +4324,22 @@
       </p:pic>
       <p:pic>
         <p:nvPicPr>
-          <p:cNvPr id="128" name="Picture 127"/>
+          <p:cNvPr id="11" name="Picture 10"/>
           <p:cNvPicPr>
             <a:picLocks noChangeAspect="1"/>
           </p:cNvPicPr>
           <p:nvPr/>
         </p:nvPicPr>
         <p:blipFill>
-          <a:blip r:embed="rId6"/>
+          <a:blip r:embed="rId18"/>
           <a:stretch>
             <a:fillRect/>
           </a:stretch>
         </p:blipFill>
         <p:spPr>
           <a:xfrm>
-            <a:off x="10955868" y="-27078"/>
-            <a:ext cx="4475747" cy="2834640"/>
+            <a:off x="10972800" y="2870067"/>
+            <a:ext cx="4572000" cy="2667000"/>
           </a:xfrm>
           <a:prstGeom prst="rect">
             <a:avLst/>
@@ -3880,142 +4348,28 @@
       </p:pic>
       <p:pic>
         <p:nvPicPr>
-          <p:cNvPr id="129" name="Picture 128"/>
+          <p:cNvPr id="12" name="Picture 11"/>
           <p:cNvPicPr>
             <a:picLocks noChangeAspect="1"/>
           </p:cNvPicPr>
           <p:nvPr/>
         </p:nvPicPr>
         <p:blipFill>
-          <a:blip r:embed="rId7"/>
+          <a:blip r:embed="rId19"/>
           <a:stretch>
             <a:fillRect/>
           </a:stretch>
         </p:blipFill>
         <p:spPr>
           <a:xfrm>
-            <a:off x="6383867" y="2528789"/>
-            <a:ext cx="4572000" cy="2959100"/>
+            <a:off x="6088890" y="2777060"/>
+            <a:ext cx="4572000" cy="2755900"/>
           </a:xfrm>
           <a:prstGeom prst="rect">
             <a:avLst/>
           </a:prstGeom>
         </p:spPr>
       </p:pic>
-      <p:pic>
-        <p:nvPicPr>
-          <p:cNvPr id="130" name="Picture 129"/>
-          <p:cNvPicPr>
-            <a:picLocks noChangeAspect="1"/>
-          </p:cNvPicPr>
-          <p:nvPr/>
-        </p:nvPicPr>
-        <p:blipFill>
-          <a:blip r:embed="rId8"/>
-          <a:stretch>
-            <a:fillRect/>
-          </a:stretch>
-        </p:blipFill>
-        <p:spPr>
-          <a:xfrm>
-            <a:off x="11016447" y="2734731"/>
-            <a:ext cx="4480560" cy="2812796"/>
-          </a:xfrm>
-          <a:prstGeom prst="rect">
-            <a:avLst/>
-          </a:prstGeom>
-        </p:spPr>
-      </p:pic>
-      <p:pic>
-        <p:nvPicPr>
-          <p:cNvPr id="131" name="Picture 130"/>
-          <p:cNvPicPr>
-            <a:picLocks noChangeAspect="1"/>
-          </p:cNvPicPr>
-          <p:nvPr/>
-        </p:nvPicPr>
-        <p:blipFill>
-          <a:blip r:embed="rId9"/>
-          <a:stretch>
-            <a:fillRect/>
-          </a:stretch>
-        </p:blipFill>
-        <p:spPr>
-          <a:xfrm rot="2607298">
-            <a:off x="9243839" y="-50290"/>
-            <a:ext cx="506466" cy="621431"/>
-          </a:xfrm>
-          <a:prstGeom prst="rect">
-            <a:avLst/>
-          </a:prstGeom>
-        </p:spPr>
-      </p:pic>
-      <p:cxnSp>
-        <p:nvCxnSpPr>
-          <p:cNvPr id="133" name="Straight Arrow Connector 132"/>
-          <p:cNvCxnSpPr/>
-          <p:nvPr/>
-        </p:nvCxnSpPr>
-        <p:spPr>
-          <a:xfrm flipV="1">
-            <a:off x="7687733" y="1444907"/>
-            <a:ext cx="694267" cy="681868"/>
-          </a:xfrm>
-          <a:prstGeom prst="straightConnector1">
-            <a:avLst/>
-          </a:prstGeom>
-          <a:ln>
-            <a:solidFill>
-              <a:srgbClr val="0000FF"/>
-            </a:solidFill>
-            <a:tailEnd type="stealth" w="med" len="lg"/>
-          </a:ln>
-        </p:spPr>
-        <p:style>
-          <a:lnRef idx="2">
-            <a:schemeClr val="accent1"/>
-          </a:lnRef>
-          <a:fillRef idx="0">
-            <a:schemeClr val="accent1"/>
-          </a:fillRef>
-          <a:effectRef idx="1">
-            <a:schemeClr val="accent1"/>
-          </a:effectRef>
-          <a:fontRef idx="minor">
-            <a:schemeClr val="tx1"/>
-          </a:fontRef>
-        </p:style>
-      </p:cxnSp>
-      <p:sp>
-        <p:nvSpPr>
-          <p:cNvPr id="134" name="TextBox 133"/>
-          <p:cNvSpPr txBox="1"/>
-          <p:nvPr/>
-        </p:nvSpPr>
-        <p:spPr>
-          <a:xfrm rot="18859671">
-            <a:off x="6854118" y="1515094"/>
-            <a:ext cx="1957052" cy="369332"/>
-          </a:xfrm>
-          <a:prstGeom prst="rect">
-            <a:avLst/>
-          </a:prstGeom>
-          <a:noFill/>
-        </p:spPr>
-        <p:txBody>
-          <a:bodyPr wrap="square" rtlCol="0">
-            <a:spAutoFit/>
-          </a:bodyPr>
-          <a:lstStyle/>
-          <a:p>
-            <a:r>
-              <a:rPr lang="en-US" dirty="0" smtClean="0"/>
-              <a:t>Light direction</a:t>
-            </a:r>
-            <a:endParaRPr lang="en-US" dirty="0"/>
-          </a:p>
-        </p:txBody>
-      </p:sp>
     </p:spTree>
     <p:extLst>
       <p:ext uri="{BB962C8B-B14F-4D97-AF65-F5344CB8AC3E}">

</xml_diff>

<commit_message>
Reduced the file size to 7.4 MB STILL it should be 6 MB
</commit_message>
<xml_diff>
--- a/RA-L/pictures/pdf/CircleFill.pptx
+++ b/RA-L/pictures/pdf/CircleFill.pptx
@@ -7,14 +7,14 @@
   <p:sldIdLst>
     <p:sldId id="256" r:id="rId2"/>
   </p:sldIdLst>
-  <p:sldSz cx="15544800" cy="5486400"/>
+  <p:sldSz cx="7772400" cy="2743200"/>
   <p:notesSz cx="6858000" cy="9144000"/>
   <p:defaultTextStyle>
     <a:defPPr>
       <a:defRPr lang="en-US"/>
     </a:defPPr>
-    <a:lvl1pPr marL="0" algn="l" defTabSz="457200" rtl="0" eaLnBrk="1" latinLnBrk="0" hangingPunct="1">
-      <a:defRPr sz="1800" kern="1200">
+    <a:lvl1pPr marL="0" algn="l" defTabSz="228600" rtl="0" eaLnBrk="1" latinLnBrk="0" hangingPunct="1">
+      <a:defRPr sz="900" kern="1200">
         <a:solidFill>
           <a:schemeClr val="tx1"/>
         </a:solidFill>
@@ -23,8 +23,8 @@
         <a:cs typeface="+mn-cs"/>
       </a:defRPr>
     </a:lvl1pPr>
-    <a:lvl2pPr marL="457200" algn="l" defTabSz="457200" rtl="0" eaLnBrk="1" latinLnBrk="0" hangingPunct="1">
-      <a:defRPr sz="1800" kern="1200">
+    <a:lvl2pPr marL="228600" algn="l" defTabSz="228600" rtl="0" eaLnBrk="1" latinLnBrk="0" hangingPunct="1">
+      <a:defRPr sz="900" kern="1200">
         <a:solidFill>
           <a:schemeClr val="tx1"/>
         </a:solidFill>
@@ -33,8 +33,8 @@
         <a:cs typeface="+mn-cs"/>
       </a:defRPr>
     </a:lvl2pPr>
-    <a:lvl3pPr marL="914400" algn="l" defTabSz="457200" rtl="0" eaLnBrk="1" latinLnBrk="0" hangingPunct="1">
-      <a:defRPr sz="1800" kern="1200">
+    <a:lvl3pPr marL="457200" algn="l" defTabSz="228600" rtl="0" eaLnBrk="1" latinLnBrk="0" hangingPunct="1">
+      <a:defRPr sz="900" kern="1200">
         <a:solidFill>
           <a:schemeClr val="tx1"/>
         </a:solidFill>
@@ -43,8 +43,8 @@
         <a:cs typeface="+mn-cs"/>
       </a:defRPr>
     </a:lvl3pPr>
-    <a:lvl4pPr marL="1371600" algn="l" defTabSz="457200" rtl="0" eaLnBrk="1" latinLnBrk="0" hangingPunct="1">
-      <a:defRPr sz="1800" kern="1200">
+    <a:lvl4pPr marL="685800" algn="l" defTabSz="228600" rtl="0" eaLnBrk="1" latinLnBrk="0" hangingPunct="1">
+      <a:defRPr sz="900" kern="1200">
         <a:solidFill>
           <a:schemeClr val="tx1"/>
         </a:solidFill>
@@ -53,8 +53,8 @@
         <a:cs typeface="+mn-cs"/>
       </a:defRPr>
     </a:lvl4pPr>
-    <a:lvl5pPr marL="1828800" algn="l" defTabSz="457200" rtl="0" eaLnBrk="1" latinLnBrk="0" hangingPunct="1">
-      <a:defRPr sz="1800" kern="1200">
+    <a:lvl5pPr marL="914400" algn="l" defTabSz="228600" rtl="0" eaLnBrk="1" latinLnBrk="0" hangingPunct="1">
+      <a:defRPr sz="900" kern="1200">
         <a:solidFill>
           <a:schemeClr val="tx1"/>
         </a:solidFill>
@@ -63,8 +63,8 @@
         <a:cs typeface="+mn-cs"/>
       </a:defRPr>
     </a:lvl5pPr>
-    <a:lvl6pPr marL="2286000" algn="l" defTabSz="457200" rtl="0" eaLnBrk="1" latinLnBrk="0" hangingPunct="1">
-      <a:defRPr sz="1800" kern="1200">
+    <a:lvl6pPr marL="1143000" algn="l" defTabSz="228600" rtl="0" eaLnBrk="1" latinLnBrk="0" hangingPunct="1">
+      <a:defRPr sz="900" kern="1200">
         <a:solidFill>
           <a:schemeClr val="tx1"/>
         </a:solidFill>
@@ -73,8 +73,8 @@
         <a:cs typeface="+mn-cs"/>
       </a:defRPr>
     </a:lvl6pPr>
-    <a:lvl7pPr marL="2743200" algn="l" defTabSz="457200" rtl="0" eaLnBrk="1" latinLnBrk="0" hangingPunct="1">
-      <a:defRPr sz="1800" kern="1200">
+    <a:lvl7pPr marL="1371600" algn="l" defTabSz="228600" rtl="0" eaLnBrk="1" latinLnBrk="0" hangingPunct="1">
+      <a:defRPr sz="900" kern="1200">
         <a:solidFill>
           <a:schemeClr val="tx1"/>
         </a:solidFill>
@@ -83,8 +83,8 @@
         <a:cs typeface="+mn-cs"/>
       </a:defRPr>
     </a:lvl7pPr>
-    <a:lvl8pPr marL="3200400" algn="l" defTabSz="457200" rtl="0" eaLnBrk="1" latinLnBrk="0" hangingPunct="1">
-      <a:defRPr sz="1800" kern="1200">
+    <a:lvl8pPr marL="1600200" algn="l" defTabSz="228600" rtl="0" eaLnBrk="1" latinLnBrk="0" hangingPunct="1">
+      <a:defRPr sz="900" kern="1200">
         <a:solidFill>
           <a:schemeClr val="tx1"/>
         </a:solidFill>
@@ -93,8 +93,8 @@
         <a:cs typeface="+mn-cs"/>
       </a:defRPr>
     </a:lvl8pPr>
-    <a:lvl9pPr marL="3657600" algn="l" defTabSz="457200" rtl="0" eaLnBrk="1" latinLnBrk="0" hangingPunct="1">
-      <a:defRPr sz="1800" kern="1200">
+    <a:lvl9pPr marL="1828800" algn="l" defTabSz="228600" rtl="0" eaLnBrk="1" latinLnBrk="0" hangingPunct="1">
+      <a:defRPr sz="900" kern="1200">
         <a:solidFill>
           <a:schemeClr val="tx1"/>
         </a:solidFill>
@@ -136,8 +136,8 @@
         </p:nvSpPr>
         <p:spPr>
           <a:xfrm>
-            <a:off x="1165860" y="1704342"/>
-            <a:ext cx="13213080" cy="1176020"/>
+            <a:off x="582930" y="852171"/>
+            <a:ext cx="6606540" cy="588010"/>
           </a:xfrm>
         </p:spPr>
         <p:txBody>
@@ -164,8 +164,8 @@
         </p:nvSpPr>
         <p:spPr>
           <a:xfrm>
-            <a:off x="2331720" y="3108960"/>
-            <a:ext cx="10881360" cy="1402080"/>
+            <a:off x="1165860" y="1554480"/>
+            <a:ext cx="5440680" cy="701040"/>
           </a:xfrm>
         </p:spPr>
         <p:txBody>
@@ -181,7 +181,7 @@
                 </a:solidFill>
               </a:defRPr>
             </a:lvl1pPr>
-            <a:lvl2pPr marL="457200" indent="0" algn="ctr">
+            <a:lvl2pPr marL="228600" indent="0" algn="ctr">
               <a:buNone/>
               <a:defRPr>
                 <a:solidFill>
@@ -191,7 +191,7 @@
                 </a:solidFill>
               </a:defRPr>
             </a:lvl2pPr>
-            <a:lvl3pPr marL="914400" indent="0" algn="ctr">
+            <a:lvl3pPr marL="457200" indent="0" algn="ctr">
               <a:buNone/>
               <a:defRPr>
                 <a:solidFill>
@@ -201,7 +201,7 @@
                 </a:solidFill>
               </a:defRPr>
             </a:lvl3pPr>
-            <a:lvl4pPr marL="1371600" indent="0" algn="ctr">
+            <a:lvl4pPr marL="685800" indent="0" algn="ctr">
               <a:buNone/>
               <a:defRPr>
                 <a:solidFill>
@@ -211,7 +211,7 @@
                 </a:solidFill>
               </a:defRPr>
             </a:lvl4pPr>
-            <a:lvl5pPr marL="1828800" indent="0" algn="ctr">
+            <a:lvl5pPr marL="914400" indent="0" algn="ctr">
               <a:buNone/>
               <a:defRPr>
                 <a:solidFill>
@@ -221,7 +221,7 @@
                 </a:solidFill>
               </a:defRPr>
             </a:lvl5pPr>
-            <a:lvl6pPr marL="2286000" indent="0" algn="ctr">
+            <a:lvl6pPr marL="1143000" indent="0" algn="ctr">
               <a:buNone/>
               <a:defRPr>
                 <a:solidFill>
@@ -231,7 +231,7 @@
                 </a:solidFill>
               </a:defRPr>
             </a:lvl6pPr>
-            <a:lvl7pPr marL="2743200" indent="0" algn="ctr">
+            <a:lvl7pPr marL="1371600" indent="0" algn="ctr">
               <a:buNone/>
               <a:defRPr>
                 <a:solidFill>
@@ -241,7 +241,7 @@
                 </a:solidFill>
               </a:defRPr>
             </a:lvl7pPr>
-            <a:lvl8pPr marL="3200400" indent="0" algn="ctr">
+            <a:lvl8pPr marL="1600200" indent="0" algn="ctr">
               <a:buNone/>
               <a:defRPr>
                 <a:solidFill>
@@ -251,7 +251,7 @@
                 </a:solidFill>
               </a:defRPr>
             </a:lvl8pPr>
-            <a:lvl9pPr marL="3657600" indent="0" algn="ctr">
+            <a:lvl9pPr marL="1828800" indent="0" algn="ctr">
               <a:buNone/>
               <a:defRPr>
                 <a:solidFill>
@@ -548,8 +548,8 @@
         </p:nvSpPr>
         <p:spPr>
           <a:xfrm>
-            <a:off x="11269980" y="219711"/>
-            <a:ext cx="3497580" cy="4681220"/>
+            <a:off x="5634990" y="109856"/>
+            <a:ext cx="1748790" cy="2340610"/>
           </a:xfrm>
         </p:spPr>
         <p:txBody>
@@ -576,8 +576,8 @@
         </p:nvSpPr>
         <p:spPr>
           <a:xfrm>
-            <a:off x="777240" y="219711"/>
-            <a:ext cx="10233660" cy="4681220"/>
+            <a:off x="388620" y="109856"/>
+            <a:ext cx="5116830" cy="2340610"/>
           </a:xfrm>
         </p:spPr>
         <p:txBody>
@@ -898,15 +898,15 @@
         </p:nvSpPr>
         <p:spPr>
           <a:xfrm>
-            <a:off x="1227933" y="3525521"/>
-            <a:ext cx="13213080" cy="1089660"/>
+            <a:off x="613967" y="1762761"/>
+            <a:ext cx="6606540" cy="544830"/>
           </a:xfrm>
         </p:spPr>
         <p:txBody>
           <a:bodyPr anchor="t"/>
           <a:lstStyle>
             <a:lvl1pPr algn="l">
-              <a:defRPr sz="4000" b="1" cap="all"/>
+              <a:defRPr sz="2000" b="1" cap="all"/>
             </a:lvl1pPr>
           </a:lstStyle>
           <a:p>
@@ -930,8 +930,8 @@
         </p:nvSpPr>
         <p:spPr>
           <a:xfrm>
-            <a:off x="1227933" y="2325371"/>
-            <a:ext cx="13213080" cy="1200150"/>
+            <a:off x="613967" y="1162686"/>
+            <a:ext cx="6606540" cy="600075"/>
           </a:xfrm>
         </p:spPr>
         <p:txBody>
@@ -939,7 +939,7 @@
           <a:lstStyle>
             <a:lvl1pPr marL="0" indent="0">
               <a:buNone/>
-              <a:defRPr sz="2000">
+              <a:defRPr sz="1000">
                 <a:solidFill>
                   <a:schemeClr val="tx1">
                     <a:tint val="75000"/>
@@ -947,9 +947,9 @@
                 </a:solidFill>
               </a:defRPr>
             </a:lvl1pPr>
-            <a:lvl2pPr marL="457200" indent="0">
-              <a:buNone/>
-              <a:defRPr sz="1800">
+            <a:lvl2pPr marL="228600" indent="0">
+              <a:buNone/>
+              <a:defRPr sz="900">
                 <a:solidFill>
                   <a:schemeClr val="tx1">
                     <a:tint val="75000"/>
@@ -957,9 +957,9 @@
                 </a:solidFill>
               </a:defRPr>
             </a:lvl2pPr>
-            <a:lvl3pPr marL="914400" indent="0">
-              <a:buNone/>
-              <a:defRPr sz="1600">
+            <a:lvl3pPr marL="457200" indent="0">
+              <a:buNone/>
+              <a:defRPr sz="800">
                 <a:solidFill>
                   <a:schemeClr val="tx1">
                     <a:tint val="75000"/>
@@ -967,9 +967,9 @@
                 </a:solidFill>
               </a:defRPr>
             </a:lvl3pPr>
-            <a:lvl4pPr marL="1371600" indent="0">
-              <a:buNone/>
-              <a:defRPr sz="1400">
+            <a:lvl4pPr marL="685800" indent="0">
+              <a:buNone/>
+              <a:defRPr sz="700">
                 <a:solidFill>
                   <a:schemeClr val="tx1">
                     <a:tint val="75000"/>
@@ -977,9 +977,9 @@
                 </a:solidFill>
               </a:defRPr>
             </a:lvl4pPr>
-            <a:lvl5pPr marL="1828800" indent="0">
-              <a:buNone/>
-              <a:defRPr sz="1400">
+            <a:lvl5pPr marL="914400" indent="0">
+              <a:buNone/>
+              <a:defRPr sz="700">
                 <a:solidFill>
                   <a:schemeClr val="tx1">
                     <a:tint val="75000"/>
@@ -987,9 +987,9 @@
                 </a:solidFill>
               </a:defRPr>
             </a:lvl5pPr>
-            <a:lvl6pPr marL="2286000" indent="0">
-              <a:buNone/>
-              <a:defRPr sz="1400">
+            <a:lvl6pPr marL="1143000" indent="0">
+              <a:buNone/>
+              <a:defRPr sz="700">
                 <a:solidFill>
                   <a:schemeClr val="tx1">
                     <a:tint val="75000"/>
@@ -997,9 +997,9 @@
                 </a:solidFill>
               </a:defRPr>
             </a:lvl6pPr>
-            <a:lvl7pPr marL="2743200" indent="0">
-              <a:buNone/>
-              <a:defRPr sz="1400">
+            <a:lvl7pPr marL="1371600" indent="0">
+              <a:buNone/>
+              <a:defRPr sz="700">
                 <a:solidFill>
                   <a:schemeClr val="tx1">
                     <a:tint val="75000"/>
@@ -1007,9 +1007,9 @@
                 </a:solidFill>
               </a:defRPr>
             </a:lvl7pPr>
-            <a:lvl8pPr marL="3200400" indent="0">
-              <a:buNone/>
-              <a:defRPr sz="1400">
+            <a:lvl8pPr marL="1600200" indent="0">
+              <a:buNone/>
+              <a:defRPr sz="700">
                 <a:solidFill>
                   <a:schemeClr val="tx1">
                     <a:tint val="75000"/>
@@ -1017,9 +1017,9 @@
                 </a:solidFill>
               </a:defRPr>
             </a:lvl8pPr>
-            <a:lvl9pPr marL="3657600" indent="0">
-              <a:buNone/>
-              <a:defRPr sz="1400">
+            <a:lvl9pPr marL="1828800" indent="0">
+              <a:buNone/>
+              <a:defRPr sz="700">
                 <a:solidFill>
                   <a:schemeClr val="tx1">
                     <a:tint val="75000"/>
@@ -1167,39 +1167,39 @@
         </p:nvSpPr>
         <p:spPr>
           <a:xfrm>
-            <a:off x="777240" y="1280161"/>
-            <a:ext cx="6865620" cy="3620771"/>
+            <a:off x="388620" y="640080"/>
+            <a:ext cx="3432810" cy="1810386"/>
           </a:xfrm>
         </p:spPr>
         <p:txBody>
           <a:bodyPr/>
           <a:lstStyle>
             <a:lvl1pPr>
-              <a:defRPr sz="2800"/>
+              <a:defRPr sz="1400"/>
             </a:lvl1pPr>
             <a:lvl2pPr>
-              <a:defRPr sz="2400"/>
+              <a:defRPr sz="1200"/>
             </a:lvl2pPr>
             <a:lvl3pPr>
-              <a:defRPr sz="2000"/>
+              <a:defRPr sz="1000"/>
             </a:lvl3pPr>
             <a:lvl4pPr>
-              <a:defRPr sz="1800"/>
+              <a:defRPr sz="900"/>
             </a:lvl4pPr>
             <a:lvl5pPr>
-              <a:defRPr sz="1800"/>
+              <a:defRPr sz="900"/>
             </a:lvl5pPr>
             <a:lvl6pPr>
-              <a:defRPr sz="1800"/>
+              <a:defRPr sz="900"/>
             </a:lvl6pPr>
             <a:lvl7pPr>
-              <a:defRPr sz="1800"/>
+              <a:defRPr sz="900"/>
             </a:lvl7pPr>
             <a:lvl8pPr>
-              <a:defRPr sz="1800"/>
+              <a:defRPr sz="900"/>
             </a:lvl8pPr>
             <a:lvl9pPr>
-              <a:defRPr sz="1800"/>
+              <a:defRPr sz="900"/>
             </a:lvl9pPr>
           </a:lstStyle>
           <a:p>
@@ -1252,39 +1252,39 @@
         </p:nvSpPr>
         <p:spPr>
           <a:xfrm>
-            <a:off x="7901940" y="1280161"/>
-            <a:ext cx="6865620" cy="3620771"/>
+            <a:off x="3950970" y="640080"/>
+            <a:ext cx="3432810" cy="1810386"/>
           </a:xfrm>
         </p:spPr>
         <p:txBody>
           <a:bodyPr/>
           <a:lstStyle>
             <a:lvl1pPr>
-              <a:defRPr sz="2800"/>
+              <a:defRPr sz="1400"/>
             </a:lvl1pPr>
             <a:lvl2pPr>
-              <a:defRPr sz="2400"/>
+              <a:defRPr sz="1200"/>
             </a:lvl2pPr>
             <a:lvl3pPr>
-              <a:defRPr sz="2000"/>
+              <a:defRPr sz="1000"/>
             </a:lvl3pPr>
             <a:lvl4pPr>
-              <a:defRPr sz="1800"/>
+              <a:defRPr sz="900"/>
             </a:lvl4pPr>
             <a:lvl5pPr>
-              <a:defRPr sz="1800"/>
+              <a:defRPr sz="900"/>
             </a:lvl5pPr>
             <a:lvl6pPr>
-              <a:defRPr sz="1800"/>
+              <a:defRPr sz="900"/>
             </a:lvl6pPr>
             <a:lvl7pPr>
-              <a:defRPr sz="1800"/>
+              <a:defRPr sz="900"/>
             </a:lvl7pPr>
             <a:lvl8pPr>
-              <a:defRPr sz="1800"/>
+              <a:defRPr sz="900"/>
             </a:lvl8pPr>
             <a:lvl9pPr>
-              <a:defRPr sz="1800"/>
+              <a:defRPr sz="900"/>
             </a:lvl9pPr>
           </a:lstStyle>
           <a:p>
@@ -1459,8 +1459,8 @@
         </p:nvSpPr>
         <p:spPr>
           <a:xfrm>
-            <a:off x="777240" y="1228091"/>
-            <a:ext cx="6868320" cy="511810"/>
+            <a:off x="388620" y="614046"/>
+            <a:ext cx="3434160" cy="255905"/>
           </a:xfrm>
         </p:spPr>
         <p:txBody>
@@ -1468,39 +1468,39 @@
           <a:lstStyle>
             <a:lvl1pPr marL="0" indent="0">
               <a:buNone/>
-              <a:defRPr sz="2400" b="1"/>
+              <a:defRPr sz="1200" b="1"/>
             </a:lvl1pPr>
-            <a:lvl2pPr marL="457200" indent="0">
-              <a:buNone/>
-              <a:defRPr sz="2000" b="1"/>
+            <a:lvl2pPr marL="228600" indent="0">
+              <a:buNone/>
+              <a:defRPr sz="1000" b="1"/>
             </a:lvl2pPr>
-            <a:lvl3pPr marL="914400" indent="0">
-              <a:buNone/>
-              <a:defRPr sz="1800" b="1"/>
+            <a:lvl3pPr marL="457200" indent="0">
+              <a:buNone/>
+              <a:defRPr sz="900" b="1"/>
             </a:lvl3pPr>
-            <a:lvl4pPr marL="1371600" indent="0">
-              <a:buNone/>
-              <a:defRPr sz="1600" b="1"/>
+            <a:lvl4pPr marL="685800" indent="0">
+              <a:buNone/>
+              <a:defRPr sz="800" b="1"/>
             </a:lvl4pPr>
-            <a:lvl5pPr marL="1828800" indent="0">
-              <a:buNone/>
-              <a:defRPr sz="1600" b="1"/>
+            <a:lvl5pPr marL="914400" indent="0">
+              <a:buNone/>
+              <a:defRPr sz="800" b="1"/>
             </a:lvl5pPr>
-            <a:lvl6pPr marL="2286000" indent="0">
-              <a:buNone/>
-              <a:defRPr sz="1600" b="1"/>
+            <a:lvl6pPr marL="1143000" indent="0">
+              <a:buNone/>
+              <a:defRPr sz="800" b="1"/>
             </a:lvl6pPr>
-            <a:lvl7pPr marL="2743200" indent="0">
-              <a:buNone/>
-              <a:defRPr sz="1600" b="1"/>
+            <a:lvl7pPr marL="1371600" indent="0">
+              <a:buNone/>
+              <a:defRPr sz="800" b="1"/>
             </a:lvl7pPr>
-            <a:lvl8pPr marL="3200400" indent="0">
-              <a:buNone/>
-              <a:defRPr sz="1600" b="1"/>
+            <a:lvl8pPr marL="1600200" indent="0">
+              <a:buNone/>
+              <a:defRPr sz="800" b="1"/>
             </a:lvl8pPr>
-            <a:lvl9pPr marL="3657600" indent="0">
-              <a:buNone/>
-              <a:defRPr sz="1600" b="1"/>
+            <a:lvl9pPr marL="1828800" indent="0">
+              <a:buNone/>
+              <a:defRPr sz="800" b="1"/>
             </a:lvl9pPr>
           </a:lstStyle>
           <a:p>
@@ -1524,39 +1524,39 @@
         </p:nvSpPr>
         <p:spPr>
           <a:xfrm>
-            <a:off x="777240" y="1739901"/>
-            <a:ext cx="6868320" cy="3161030"/>
+            <a:off x="388620" y="869950"/>
+            <a:ext cx="3434160" cy="1580515"/>
           </a:xfrm>
         </p:spPr>
         <p:txBody>
           <a:bodyPr/>
           <a:lstStyle>
             <a:lvl1pPr>
-              <a:defRPr sz="2400"/>
+              <a:defRPr sz="1200"/>
             </a:lvl1pPr>
             <a:lvl2pPr>
-              <a:defRPr sz="2000"/>
+              <a:defRPr sz="1000"/>
             </a:lvl2pPr>
             <a:lvl3pPr>
-              <a:defRPr sz="1800"/>
+              <a:defRPr sz="900"/>
             </a:lvl3pPr>
             <a:lvl4pPr>
-              <a:defRPr sz="1600"/>
+              <a:defRPr sz="800"/>
             </a:lvl4pPr>
             <a:lvl5pPr>
-              <a:defRPr sz="1600"/>
+              <a:defRPr sz="800"/>
             </a:lvl5pPr>
             <a:lvl6pPr>
-              <a:defRPr sz="1600"/>
+              <a:defRPr sz="800"/>
             </a:lvl6pPr>
             <a:lvl7pPr>
-              <a:defRPr sz="1600"/>
+              <a:defRPr sz="800"/>
             </a:lvl7pPr>
             <a:lvl8pPr>
-              <a:defRPr sz="1600"/>
+              <a:defRPr sz="800"/>
             </a:lvl8pPr>
             <a:lvl9pPr>
-              <a:defRPr sz="1600"/>
+              <a:defRPr sz="800"/>
             </a:lvl9pPr>
           </a:lstStyle>
           <a:p>
@@ -1609,8 +1609,8 @@
         </p:nvSpPr>
         <p:spPr>
           <a:xfrm>
-            <a:off x="7896547" y="1228091"/>
-            <a:ext cx="6871018" cy="511810"/>
+            <a:off x="3948274" y="614046"/>
+            <a:ext cx="3435509" cy="255905"/>
           </a:xfrm>
         </p:spPr>
         <p:txBody>
@@ -1618,39 +1618,39 @@
           <a:lstStyle>
             <a:lvl1pPr marL="0" indent="0">
               <a:buNone/>
-              <a:defRPr sz="2400" b="1"/>
+              <a:defRPr sz="1200" b="1"/>
             </a:lvl1pPr>
-            <a:lvl2pPr marL="457200" indent="0">
-              <a:buNone/>
-              <a:defRPr sz="2000" b="1"/>
+            <a:lvl2pPr marL="228600" indent="0">
+              <a:buNone/>
+              <a:defRPr sz="1000" b="1"/>
             </a:lvl2pPr>
-            <a:lvl3pPr marL="914400" indent="0">
-              <a:buNone/>
-              <a:defRPr sz="1800" b="1"/>
+            <a:lvl3pPr marL="457200" indent="0">
+              <a:buNone/>
+              <a:defRPr sz="900" b="1"/>
             </a:lvl3pPr>
-            <a:lvl4pPr marL="1371600" indent="0">
-              <a:buNone/>
-              <a:defRPr sz="1600" b="1"/>
+            <a:lvl4pPr marL="685800" indent="0">
+              <a:buNone/>
+              <a:defRPr sz="800" b="1"/>
             </a:lvl4pPr>
-            <a:lvl5pPr marL="1828800" indent="0">
-              <a:buNone/>
-              <a:defRPr sz="1600" b="1"/>
+            <a:lvl5pPr marL="914400" indent="0">
+              <a:buNone/>
+              <a:defRPr sz="800" b="1"/>
             </a:lvl5pPr>
-            <a:lvl6pPr marL="2286000" indent="0">
-              <a:buNone/>
-              <a:defRPr sz="1600" b="1"/>
+            <a:lvl6pPr marL="1143000" indent="0">
+              <a:buNone/>
+              <a:defRPr sz="800" b="1"/>
             </a:lvl6pPr>
-            <a:lvl7pPr marL="2743200" indent="0">
-              <a:buNone/>
-              <a:defRPr sz="1600" b="1"/>
+            <a:lvl7pPr marL="1371600" indent="0">
+              <a:buNone/>
+              <a:defRPr sz="800" b="1"/>
             </a:lvl7pPr>
-            <a:lvl8pPr marL="3200400" indent="0">
-              <a:buNone/>
-              <a:defRPr sz="1600" b="1"/>
+            <a:lvl8pPr marL="1600200" indent="0">
+              <a:buNone/>
+              <a:defRPr sz="800" b="1"/>
             </a:lvl8pPr>
-            <a:lvl9pPr marL="3657600" indent="0">
-              <a:buNone/>
-              <a:defRPr sz="1600" b="1"/>
+            <a:lvl9pPr marL="1828800" indent="0">
+              <a:buNone/>
+              <a:defRPr sz="800" b="1"/>
             </a:lvl9pPr>
           </a:lstStyle>
           <a:p>
@@ -1674,39 +1674,39 @@
         </p:nvSpPr>
         <p:spPr>
           <a:xfrm>
-            <a:off x="7896547" y="1739901"/>
-            <a:ext cx="6871018" cy="3161030"/>
+            <a:off x="3948274" y="869950"/>
+            <a:ext cx="3435509" cy="1580515"/>
           </a:xfrm>
         </p:spPr>
         <p:txBody>
           <a:bodyPr/>
           <a:lstStyle>
             <a:lvl1pPr>
-              <a:defRPr sz="2400"/>
+              <a:defRPr sz="1200"/>
             </a:lvl1pPr>
             <a:lvl2pPr>
-              <a:defRPr sz="2000"/>
+              <a:defRPr sz="1000"/>
             </a:lvl2pPr>
             <a:lvl3pPr>
-              <a:defRPr sz="1800"/>
+              <a:defRPr sz="900"/>
             </a:lvl3pPr>
             <a:lvl4pPr>
-              <a:defRPr sz="1600"/>
+              <a:defRPr sz="800"/>
             </a:lvl4pPr>
             <a:lvl5pPr>
-              <a:defRPr sz="1600"/>
+              <a:defRPr sz="800"/>
             </a:lvl5pPr>
             <a:lvl6pPr>
-              <a:defRPr sz="1600"/>
+              <a:defRPr sz="800"/>
             </a:lvl6pPr>
             <a:lvl7pPr>
-              <a:defRPr sz="1600"/>
+              <a:defRPr sz="800"/>
             </a:lvl7pPr>
             <a:lvl8pPr>
-              <a:defRPr sz="1600"/>
+              <a:defRPr sz="800"/>
             </a:lvl8pPr>
             <a:lvl9pPr>
-              <a:defRPr sz="1600"/>
+              <a:defRPr sz="800"/>
             </a:lvl9pPr>
           </a:lstStyle>
           <a:p>
@@ -2067,15 +2067,15 @@
         </p:nvSpPr>
         <p:spPr>
           <a:xfrm>
-            <a:off x="777244" y="218440"/>
-            <a:ext cx="5114133" cy="929640"/>
+            <a:off x="388622" y="109220"/>
+            <a:ext cx="2557067" cy="464820"/>
           </a:xfrm>
         </p:spPr>
         <p:txBody>
           <a:bodyPr anchor="b"/>
           <a:lstStyle>
             <a:lvl1pPr algn="l">
-              <a:defRPr sz="2000" b="1"/>
+              <a:defRPr sz="1000" b="1"/>
             </a:lvl1pPr>
           </a:lstStyle>
           <a:p>
@@ -2099,39 +2099,39 @@
         </p:nvSpPr>
         <p:spPr>
           <a:xfrm>
-            <a:off x="6077586" y="218441"/>
-            <a:ext cx="8689975" cy="4682490"/>
+            <a:off x="3038793" y="109221"/>
+            <a:ext cx="4344988" cy="2341245"/>
           </a:xfrm>
         </p:spPr>
         <p:txBody>
           <a:bodyPr/>
           <a:lstStyle>
             <a:lvl1pPr>
-              <a:defRPr sz="3200"/>
+              <a:defRPr sz="1600"/>
             </a:lvl1pPr>
             <a:lvl2pPr>
-              <a:defRPr sz="2800"/>
+              <a:defRPr sz="1400"/>
             </a:lvl2pPr>
             <a:lvl3pPr>
-              <a:defRPr sz="2400"/>
+              <a:defRPr sz="1200"/>
             </a:lvl3pPr>
             <a:lvl4pPr>
-              <a:defRPr sz="2000"/>
+              <a:defRPr sz="1000"/>
             </a:lvl4pPr>
             <a:lvl5pPr>
-              <a:defRPr sz="2000"/>
+              <a:defRPr sz="1000"/>
             </a:lvl5pPr>
             <a:lvl6pPr>
-              <a:defRPr sz="2000"/>
+              <a:defRPr sz="1000"/>
             </a:lvl6pPr>
             <a:lvl7pPr>
-              <a:defRPr sz="2000"/>
+              <a:defRPr sz="1000"/>
             </a:lvl7pPr>
             <a:lvl8pPr>
-              <a:defRPr sz="2000"/>
+              <a:defRPr sz="1000"/>
             </a:lvl8pPr>
             <a:lvl9pPr>
-              <a:defRPr sz="2000"/>
+              <a:defRPr sz="1000"/>
             </a:lvl9pPr>
           </a:lstStyle>
           <a:p>
@@ -2184,8 +2184,8 @@
         </p:nvSpPr>
         <p:spPr>
           <a:xfrm>
-            <a:off x="777244" y="1148081"/>
-            <a:ext cx="5114133" cy="3752850"/>
+            <a:off x="388622" y="574041"/>
+            <a:ext cx="2557067" cy="1876425"/>
           </a:xfrm>
         </p:spPr>
         <p:txBody>
@@ -2193,39 +2193,39 @@
           <a:lstStyle>
             <a:lvl1pPr marL="0" indent="0">
               <a:buNone/>
-              <a:defRPr sz="1400"/>
+              <a:defRPr sz="700"/>
             </a:lvl1pPr>
-            <a:lvl2pPr marL="457200" indent="0">
-              <a:buNone/>
-              <a:defRPr sz="1200"/>
+            <a:lvl2pPr marL="228600" indent="0">
+              <a:buNone/>
+              <a:defRPr sz="600"/>
             </a:lvl2pPr>
-            <a:lvl3pPr marL="914400" indent="0">
-              <a:buNone/>
-              <a:defRPr sz="1000"/>
+            <a:lvl3pPr marL="457200" indent="0">
+              <a:buNone/>
+              <a:defRPr sz="500"/>
             </a:lvl3pPr>
-            <a:lvl4pPr marL="1371600" indent="0">
-              <a:buNone/>
-              <a:defRPr sz="900"/>
+            <a:lvl4pPr marL="685800" indent="0">
+              <a:buNone/>
+              <a:defRPr sz="500"/>
             </a:lvl4pPr>
-            <a:lvl5pPr marL="1828800" indent="0">
-              <a:buNone/>
-              <a:defRPr sz="900"/>
+            <a:lvl5pPr marL="914400" indent="0">
+              <a:buNone/>
+              <a:defRPr sz="500"/>
             </a:lvl5pPr>
-            <a:lvl6pPr marL="2286000" indent="0">
-              <a:buNone/>
-              <a:defRPr sz="900"/>
+            <a:lvl6pPr marL="1143000" indent="0">
+              <a:buNone/>
+              <a:defRPr sz="500"/>
             </a:lvl6pPr>
-            <a:lvl7pPr marL="2743200" indent="0">
-              <a:buNone/>
-              <a:defRPr sz="900"/>
+            <a:lvl7pPr marL="1371600" indent="0">
+              <a:buNone/>
+              <a:defRPr sz="500"/>
             </a:lvl7pPr>
-            <a:lvl8pPr marL="3200400" indent="0">
-              <a:buNone/>
-              <a:defRPr sz="900"/>
+            <a:lvl8pPr marL="1600200" indent="0">
+              <a:buNone/>
+              <a:defRPr sz="500"/>
             </a:lvl8pPr>
-            <a:lvl9pPr marL="3657600" indent="0">
-              <a:buNone/>
-              <a:defRPr sz="900"/>
+            <a:lvl9pPr marL="1828800" indent="0">
+              <a:buNone/>
+              <a:defRPr sz="500"/>
             </a:lvl9pPr>
           </a:lstStyle>
           <a:p>
@@ -2344,15 +2344,15 @@
         </p:nvSpPr>
         <p:spPr>
           <a:xfrm>
-            <a:off x="3046890" y="3840481"/>
-            <a:ext cx="9326880" cy="453390"/>
+            <a:off x="1523445" y="1920241"/>
+            <a:ext cx="4663440" cy="226695"/>
           </a:xfrm>
         </p:spPr>
         <p:txBody>
           <a:bodyPr anchor="b"/>
           <a:lstStyle>
             <a:lvl1pPr algn="l">
-              <a:defRPr sz="2000" b="1"/>
+              <a:defRPr sz="1000" b="1"/>
             </a:lvl1pPr>
           </a:lstStyle>
           <a:p>
@@ -2376,8 +2376,8 @@
         </p:nvSpPr>
         <p:spPr>
           <a:xfrm>
-            <a:off x="3046890" y="490220"/>
-            <a:ext cx="9326880" cy="3291840"/>
+            <a:off x="1523445" y="245110"/>
+            <a:ext cx="4663440" cy="1645920"/>
           </a:xfrm>
         </p:spPr>
         <p:txBody>
@@ -2385,39 +2385,39 @@
           <a:lstStyle>
             <a:lvl1pPr marL="0" indent="0">
               <a:buNone/>
-              <a:defRPr sz="3200"/>
+              <a:defRPr sz="1600"/>
             </a:lvl1pPr>
-            <a:lvl2pPr marL="457200" indent="0">
-              <a:buNone/>
-              <a:defRPr sz="2800"/>
+            <a:lvl2pPr marL="228600" indent="0">
+              <a:buNone/>
+              <a:defRPr sz="1400"/>
             </a:lvl2pPr>
-            <a:lvl3pPr marL="914400" indent="0">
-              <a:buNone/>
-              <a:defRPr sz="2400"/>
+            <a:lvl3pPr marL="457200" indent="0">
+              <a:buNone/>
+              <a:defRPr sz="1200"/>
             </a:lvl3pPr>
-            <a:lvl4pPr marL="1371600" indent="0">
-              <a:buNone/>
-              <a:defRPr sz="2000"/>
+            <a:lvl4pPr marL="685800" indent="0">
+              <a:buNone/>
+              <a:defRPr sz="1000"/>
             </a:lvl4pPr>
-            <a:lvl5pPr marL="1828800" indent="0">
-              <a:buNone/>
-              <a:defRPr sz="2000"/>
+            <a:lvl5pPr marL="914400" indent="0">
+              <a:buNone/>
+              <a:defRPr sz="1000"/>
             </a:lvl5pPr>
-            <a:lvl6pPr marL="2286000" indent="0">
-              <a:buNone/>
-              <a:defRPr sz="2000"/>
+            <a:lvl6pPr marL="1143000" indent="0">
+              <a:buNone/>
+              <a:defRPr sz="1000"/>
             </a:lvl6pPr>
-            <a:lvl7pPr marL="2743200" indent="0">
-              <a:buNone/>
-              <a:defRPr sz="2000"/>
+            <a:lvl7pPr marL="1371600" indent="0">
+              <a:buNone/>
+              <a:defRPr sz="1000"/>
             </a:lvl7pPr>
-            <a:lvl8pPr marL="3200400" indent="0">
-              <a:buNone/>
-              <a:defRPr sz="2000"/>
+            <a:lvl8pPr marL="1600200" indent="0">
+              <a:buNone/>
+              <a:defRPr sz="1000"/>
             </a:lvl8pPr>
-            <a:lvl9pPr marL="3657600" indent="0">
-              <a:buNone/>
-              <a:defRPr sz="2000"/>
+            <a:lvl9pPr marL="1828800" indent="0">
+              <a:buNone/>
+              <a:defRPr sz="1000"/>
             </a:lvl9pPr>
           </a:lstStyle>
           <a:p>
@@ -2437,8 +2437,8 @@
         </p:nvSpPr>
         <p:spPr>
           <a:xfrm>
-            <a:off x="3046890" y="4293871"/>
-            <a:ext cx="9326880" cy="643890"/>
+            <a:off x="1523445" y="2146936"/>
+            <a:ext cx="4663440" cy="321945"/>
           </a:xfrm>
         </p:spPr>
         <p:txBody>
@@ -2446,39 +2446,39 @@
           <a:lstStyle>
             <a:lvl1pPr marL="0" indent="0">
               <a:buNone/>
-              <a:defRPr sz="1400"/>
+              <a:defRPr sz="700"/>
             </a:lvl1pPr>
-            <a:lvl2pPr marL="457200" indent="0">
-              <a:buNone/>
-              <a:defRPr sz="1200"/>
+            <a:lvl2pPr marL="228600" indent="0">
+              <a:buNone/>
+              <a:defRPr sz="600"/>
             </a:lvl2pPr>
-            <a:lvl3pPr marL="914400" indent="0">
-              <a:buNone/>
-              <a:defRPr sz="1000"/>
+            <a:lvl3pPr marL="457200" indent="0">
+              <a:buNone/>
+              <a:defRPr sz="500"/>
             </a:lvl3pPr>
-            <a:lvl4pPr marL="1371600" indent="0">
-              <a:buNone/>
-              <a:defRPr sz="900"/>
+            <a:lvl4pPr marL="685800" indent="0">
+              <a:buNone/>
+              <a:defRPr sz="500"/>
             </a:lvl4pPr>
-            <a:lvl5pPr marL="1828800" indent="0">
-              <a:buNone/>
-              <a:defRPr sz="900"/>
+            <a:lvl5pPr marL="914400" indent="0">
+              <a:buNone/>
+              <a:defRPr sz="500"/>
             </a:lvl5pPr>
-            <a:lvl6pPr marL="2286000" indent="0">
-              <a:buNone/>
-              <a:defRPr sz="900"/>
+            <a:lvl6pPr marL="1143000" indent="0">
+              <a:buNone/>
+              <a:defRPr sz="500"/>
             </a:lvl6pPr>
-            <a:lvl7pPr marL="2743200" indent="0">
-              <a:buNone/>
-              <a:defRPr sz="900"/>
+            <a:lvl7pPr marL="1371600" indent="0">
+              <a:buNone/>
+              <a:defRPr sz="500"/>
             </a:lvl7pPr>
-            <a:lvl8pPr marL="3200400" indent="0">
-              <a:buNone/>
-              <a:defRPr sz="900"/>
+            <a:lvl8pPr marL="1600200" indent="0">
+              <a:buNone/>
+              <a:defRPr sz="500"/>
             </a:lvl8pPr>
-            <a:lvl9pPr marL="3657600" indent="0">
-              <a:buNone/>
-              <a:defRPr sz="900"/>
+            <a:lvl9pPr marL="1828800" indent="0">
+              <a:buNone/>
+              <a:defRPr sz="500"/>
             </a:lvl9pPr>
           </a:lstStyle>
           <a:p>
@@ -2602,15 +2602,15 @@
         </p:nvSpPr>
         <p:spPr>
           <a:xfrm>
-            <a:off x="777240" y="219710"/>
-            <a:ext cx="13990320" cy="914400"/>
+            <a:off x="388620" y="109855"/>
+            <a:ext cx="6995160" cy="457200"/>
           </a:xfrm>
           <a:prstGeom prst="rect">
             <a:avLst/>
           </a:prstGeom>
         </p:spPr>
         <p:txBody>
-          <a:bodyPr vert="horz" lIns="91440" tIns="45720" rIns="91440" bIns="45720" rtlCol="0" anchor="ctr">
+          <a:bodyPr vert="horz" lIns="45720" tIns="22860" rIns="45720" bIns="22860" rtlCol="0" anchor="ctr">
             <a:normAutofit/>
           </a:bodyPr>
           <a:lstStyle/>
@@ -2635,15 +2635,15 @@
         </p:nvSpPr>
         <p:spPr>
           <a:xfrm>
-            <a:off x="777240" y="1280161"/>
-            <a:ext cx="13990320" cy="3620771"/>
+            <a:off x="388620" y="640080"/>
+            <a:ext cx="6995160" cy="1810386"/>
           </a:xfrm>
           <a:prstGeom prst="rect">
             <a:avLst/>
           </a:prstGeom>
         </p:spPr>
         <p:txBody>
-          <a:bodyPr vert="horz" lIns="91440" tIns="45720" rIns="91440" bIns="45720" rtlCol="0">
+          <a:bodyPr vert="horz" lIns="45720" tIns="22860" rIns="45720" bIns="22860" rtlCol="0">
             <a:normAutofit/>
           </a:bodyPr>
           <a:lstStyle/>
@@ -2697,18 +2697,18 @@
         </p:nvSpPr>
         <p:spPr>
           <a:xfrm>
-            <a:off x="777240" y="5085081"/>
-            <a:ext cx="3627120" cy="292100"/>
+            <a:off x="388620" y="2542541"/>
+            <a:ext cx="1813560" cy="146050"/>
           </a:xfrm>
           <a:prstGeom prst="rect">
             <a:avLst/>
           </a:prstGeom>
         </p:spPr>
         <p:txBody>
-          <a:bodyPr vert="horz" lIns="91440" tIns="45720" rIns="91440" bIns="45720" rtlCol="0" anchor="ctr"/>
+          <a:bodyPr vert="horz" lIns="45720" tIns="22860" rIns="45720" bIns="22860" rtlCol="0" anchor="ctr"/>
           <a:lstStyle>
             <a:lvl1pPr algn="l">
-              <a:defRPr sz="1200">
+              <a:defRPr sz="600">
                 <a:solidFill>
                   <a:schemeClr val="tx1">
                     <a:tint val="75000"/>
@@ -2738,18 +2738,18 @@
         </p:nvSpPr>
         <p:spPr>
           <a:xfrm>
-            <a:off x="5311140" y="5085081"/>
-            <a:ext cx="4922520" cy="292100"/>
+            <a:off x="2655570" y="2542541"/>
+            <a:ext cx="2461260" cy="146050"/>
           </a:xfrm>
           <a:prstGeom prst="rect">
             <a:avLst/>
           </a:prstGeom>
         </p:spPr>
         <p:txBody>
-          <a:bodyPr vert="horz" lIns="91440" tIns="45720" rIns="91440" bIns="45720" rtlCol="0" anchor="ctr"/>
+          <a:bodyPr vert="horz" lIns="45720" tIns="22860" rIns="45720" bIns="22860" rtlCol="0" anchor="ctr"/>
           <a:lstStyle>
             <a:lvl1pPr algn="ctr">
-              <a:defRPr sz="1200">
+              <a:defRPr sz="600">
                 <a:solidFill>
                   <a:schemeClr val="tx1">
                     <a:tint val="75000"/>
@@ -2775,18 +2775,18 @@
         </p:nvSpPr>
         <p:spPr>
           <a:xfrm>
-            <a:off x="11140440" y="5085081"/>
-            <a:ext cx="3627120" cy="292100"/>
+            <a:off x="5570220" y="2542541"/>
+            <a:ext cx="1813560" cy="146050"/>
           </a:xfrm>
           <a:prstGeom prst="rect">
             <a:avLst/>
           </a:prstGeom>
         </p:spPr>
         <p:txBody>
-          <a:bodyPr vert="horz" lIns="91440" tIns="45720" rIns="91440" bIns="45720" rtlCol="0" anchor="ctr"/>
+          <a:bodyPr vert="horz" lIns="45720" tIns="22860" rIns="45720" bIns="22860" rtlCol="0" anchor="ctr"/>
           <a:lstStyle>
             <a:lvl1pPr algn="r">
-              <a:defRPr sz="1200">
+              <a:defRPr sz="600">
                 <a:solidFill>
                   <a:schemeClr val="tx1">
                     <a:tint val="75000"/>
@@ -2827,12 +2827,12 @@
   </p:sldLayoutIdLst>
   <p:txStyles>
     <p:titleStyle>
-      <a:lvl1pPr algn="ctr" defTabSz="457200" rtl="0" eaLnBrk="1" latinLnBrk="0" hangingPunct="1">
+      <a:lvl1pPr algn="ctr" defTabSz="228600" rtl="0" eaLnBrk="1" latinLnBrk="0" hangingPunct="1">
         <a:spcBef>
           <a:spcPct val="0"/>
         </a:spcBef>
         <a:buNone/>
-        <a:defRPr sz="4400" kern="1200">
+        <a:defRPr sz="2200" kern="1200">
           <a:solidFill>
             <a:schemeClr val="tx1"/>
           </a:solidFill>
@@ -2843,13 +2843,13 @@
       </a:lvl1pPr>
     </p:titleStyle>
     <p:bodyStyle>
-      <a:lvl1pPr marL="342900" indent="-342900" algn="l" defTabSz="457200" rtl="0" eaLnBrk="1" latinLnBrk="0" hangingPunct="1">
+      <a:lvl1pPr marL="171450" indent="-171450" algn="l" defTabSz="228600" rtl="0" eaLnBrk="1" latinLnBrk="0" hangingPunct="1">
         <a:spcBef>
           <a:spcPct val="20000"/>
         </a:spcBef>
         <a:buFont typeface="Arial"/>
         <a:buChar char="•"/>
-        <a:defRPr sz="3200" kern="1200">
+        <a:defRPr sz="1600" kern="1200">
           <a:solidFill>
             <a:schemeClr val="tx1"/>
           </a:solidFill>
@@ -2858,13 +2858,13 @@
           <a:cs typeface="+mn-cs"/>
         </a:defRPr>
       </a:lvl1pPr>
-      <a:lvl2pPr marL="742950" indent="-285750" algn="l" defTabSz="457200" rtl="0" eaLnBrk="1" latinLnBrk="0" hangingPunct="1">
+      <a:lvl2pPr marL="371475" indent="-142875" algn="l" defTabSz="228600" rtl="0" eaLnBrk="1" latinLnBrk="0" hangingPunct="1">
         <a:spcBef>
           <a:spcPct val="20000"/>
         </a:spcBef>
         <a:buFont typeface="Arial"/>
         <a:buChar char="–"/>
-        <a:defRPr sz="2800" kern="1200">
+        <a:defRPr sz="1400" kern="1200">
           <a:solidFill>
             <a:schemeClr val="tx1"/>
           </a:solidFill>
@@ -2873,13 +2873,13 @@
           <a:cs typeface="+mn-cs"/>
         </a:defRPr>
       </a:lvl2pPr>
-      <a:lvl3pPr marL="1143000" indent="-228600" algn="l" defTabSz="457200" rtl="0" eaLnBrk="1" latinLnBrk="0" hangingPunct="1">
+      <a:lvl3pPr marL="571500" indent="-114300" algn="l" defTabSz="228600" rtl="0" eaLnBrk="1" latinLnBrk="0" hangingPunct="1">
         <a:spcBef>
           <a:spcPct val="20000"/>
         </a:spcBef>
         <a:buFont typeface="Arial"/>
         <a:buChar char="•"/>
-        <a:defRPr sz="2400" kern="1200">
+        <a:defRPr sz="1200" kern="1200">
           <a:solidFill>
             <a:schemeClr val="tx1"/>
           </a:solidFill>
@@ -2888,13 +2888,13 @@
           <a:cs typeface="+mn-cs"/>
         </a:defRPr>
       </a:lvl3pPr>
-      <a:lvl4pPr marL="1600200" indent="-228600" algn="l" defTabSz="457200" rtl="0" eaLnBrk="1" latinLnBrk="0" hangingPunct="1">
+      <a:lvl4pPr marL="800100" indent="-114300" algn="l" defTabSz="228600" rtl="0" eaLnBrk="1" latinLnBrk="0" hangingPunct="1">
         <a:spcBef>
           <a:spcPct val="20000"/>
         </a:spcBef>
         <a:buFont typeface="Arial"/>
         <a:buChar char="–"/>
-        <a:defRPr sz="2000" kern="1200">
+        <a:defRPr sz="1000" kern="1200">
           <a:solidFill>
             <a:schemeClr val="tx1"/>
           </a:solidFill>
@@ -2903,13 +2903,13 @@
           <a:cs typeface="+mn-cs"/>
         </a:defRPr>
       </a:lvl4pPr>
-      <a:lvl5pPr marL="2057400" indent="-228600" algn="l" defTabSz="457200" rtl="0" eaLnBrk="1" latinLnBrk="0" hangingPunct="1">
+      <a:lvl5pPr marL="1028700" indent="-114300" algn="l" defTabSz="228600" rtl="0" eaLnBrk="1" latinLnBrk="0" hangingPunct="1">
         <a:spcBef>
           <a:spcPct val="20000"/>
         </a:spcBef>
         <a:buFont typeface="Arial"/>
         <a:buChar char="»"/>
-        <a:defRPr sz="2000" kern="1200">
+        <a:defRPr sz="1000" kern="1200">
           <a:solidFill>
             <a:schemeClr val="tx1"/>
           </a:solidFill>
@@ -2918,13 +2918,13 @@
           <a:cs typeface="+mn-cs"/>
         </a:defRPr>
       </a:lvl5pPr>
-      <a:lvl6pPr marL="2514600" indent="-228600" algn="l" defTabSz="457200" rtl="0" eaLnBrk="1" latinLnBrk="0" hangingPunct="1">
+      <a:lvl6pPr marL="1257300" indent="-114300" algn="l" defTabSz="228600" rtl="0" eaLnBrk="1" latinLnBrk="0" hangingPunct="1">
         <a:spcBef>
           <a:spcPct val="20000"/>
         </a:spcBef>
         <a:buFont typeface="Arial"/>
         <a:buChar char="•"/>
-        <a:defRPr sz="2000" kern="1200">
+        <a:defRPr sz="1000" kern="1200">
           <a:solidFill>
             <a:schemeClr val="tx1"/>
           </a:solidFill>
@@ -2933,13 +2933,13 @@
           <a:cs typeface="+mn-cs"/>
         </a:defRPr>
       </a:lvl6pPr>
-      <a:lvl7pPr marL="2971800" indent="-228600" algn="l" defTabSz="457200" rtl="0" eaLnBrk="1" latinLnBrk="0" hangingPunct="1">
+      <a:lvl7pPr marL="1485900" indent="-114300" algn="l" defTabSz="228600" rtl="0" eaLnBrk="1" latinLnBrk="0" hangingPunct="1">
         <a:spcBef>
           <a:spcPct val="20000"/>
         </a:spcBef>
         <a:buFont typeface="Arial"/>
         <a:buChar char="•"/>
-        <a:defRPr sz="2000" kern="1200">
+        <a:defRPr sz="1000" kern="1200">
           <a:solidFill>
             <a:schemeClr val="tx1"/>
           </a:solidFill>
@@ -2948,13 +2948,13 @@
           <a:cs typeface="+mn-cs"/>
         </a:defRPr>
       </a:lvl7pPr>
-      <a:lvl8pPr marL="3429000" indent="-228600" algn="l" defTabSz="457200" rtl="0" eaLnBrk="1" latinLnBrk="0" hangingPunct="1">
+      <a:lvl8pPr marL="1714500" indent="-114300" algn="l" defTabSz="228600" rtl="0" eaLnBrk="1" latinLnBrk="0" hangingPunct="1">
         <a:spcBef>
           <a:spcPct val="20000"/>
         </a:spcBef>
         <a:buFont typeface="Arial"/>
         <a:buChar char="•"/>
-        <a:defRPr sz="2000" kern="1200">
+        <a:defRPr sz="1000" kern="1200">
           <a:solidFill>
             <a:schemeClr val="tx1"/>
           </a:solidFill>
@@ -2963,13 +2963,13 @@
           <a:cs typeface="+mn-cs"/>
         </a:defRPr>
       </a:lvl8pPr>
-      <a:lvl9pPr marL="3886200" indent="-228600" algn="l" defTabSz="457200" rtl="0" eaLnBrk="1" latinLnBrk="0" hangingPunct="1">
+      <a:lvl9pPr marL="1943100" indent="-114300" algn="l" defTabSz="228600" rtl="0" eaLnBrk="1" latinLnBrk="0" hangingPunct="1">
         <a:spcBef>
           <a:spcPct val="20000"/>
         </a:spcBef>
         <a:buFont typeface="Arial"/>
         <a:buChar char="•"/>
-        <a:defRPr sz="2000" kern="1200">
+        <a:defRPr sz="1000" kern="1200">
           <a:solidFill>
             <a:schemeClr val="tx1"/>
           </a:solidFill>
@@ -2983,8 +2983,8 @@
       <a:defPPr>
         <a:defRPr lang="en-US"/>
       </a:defPPr>
-      <a:lvl1pPr marL="0" algn="l" defTabSz="457200" rtl="0" eaLnBrk="1" latinLnBrk="0" hangingPunct="1">
-        <a:defRPr sz="1800" kern="1200">
+      <a:lvl1pPr marL="0" algn="l" defTabSz="228600" rtl="0" eaLnBrk="1" latinLnBrk="0" hangingPunct="1">
+        <a:defRPr sz="900" kern="1200">
           <a:solidFill>
             <a:schemeClr val="tx1"/>
           </a:solidFill>
@@ -2993,8 +2993,8 @@
           <a:cs typeface="+mn-cs"/>
         </a:defRPr>
       </a:lvl1pPr>
-      <a:lvl2pPr marL="457200" algn="l" defTabSz="457200" rtl="0" eaLnBrk="1" latinLnBrk="0" hangingPunct="1">
-        <a:defRPr sz="1800" kern="1200">
+      <a:lvl2pPr marL="228600" algn="l" defTabSz="228600" rtl="0" eaLnBrk="1" latinLnBrk="0" hangingPunct="1">
+        <a:defRPr sz="900" kern="1200">
           <a:solidFill>
             <a:schemeClr val="tx1"/>
           </a:solidFill>
@@ -3003,8 +3003,8 @@
           <a:cs typeface="+mn-cs"/>
         </a:defRPr>
       </a:lvl2pPr>
-      <a:lvl3pPr marL="914400" algn="l" defTabSz="457200" rtl="0" eaLnBrk="1" latinLnBrk="0" hangingPunct="1">
-        <a:defRPr sz="1800" kern="1200">
+      <a:lvl3pPr marL="457200" algn="l" defTabSz="228600" rtl="0" eaLnBrk="1" latinLnBrk="0" hangingPunct="1">
+        <a:defRPr sz="900" kern="1200">
           <a:solidFill>
             <a:schemeClr val="tx1"/>
           </a:solidFill>
@@ -3013,8 +3013,8 @@
           <a:cs typeface="+mn-cs"/>
         </a:defRPr>
       </a:lvl3pPr>
-      <a:lvl4pPr marL="1371600" algn="l" defTabSz="457200" rtl="0" eaLnBrk="1" latinLnBrk="0" hangingPunct="1">
-        <a:defRPr sz="1800" kern="1200">
+      <a:lvl4pPr marL="685800" algn="l" defTabSz="228600" rtl="0" eaLnBrk="1" latinLnBrk="0" hangingPunct="1">
+        <a:defRPr sz="900" kern="1200">
           <a:solidFill>
             <a:schemeClr val="tx1"/>
           </a:solidFill>
@@ -3023,8 +3023,8 @@
           <a:cs typeface="+mn-cs"/>
         </a:defRPr>
       </a:lvl4pPr>
-      <a:lvl5pPr marL="1828800" algn="l" defTabSz="457200" rtl="0" eaLnBrk="1" latinLnBrk="0" hangingPunct="1">
-        <a:defRPr sz="1800" kern="1200">
+      <a:lvl5pPr marL="914400" algn="l" defTabSz="228600" rtl="0" eaLnBrk="1" latinLnBrk="0" hangingPunct="1">
+        <a:defRPr sz="900" kern="1200">
           <a:solidFill>
             <a:schemeClr val="tx1"/>
           </a:solidFill>
@@ -3033,8 +3033,8 @@
           <a:cs typeface="+mn-cs"/>
         </a:defRPr>
       </a:lvl5pPr>
-      <a:lvl6pPr marL="2286000" algn="l" defTabSz="457200" rtl="0" eaLnBrk="1" latinLnBrk="0" hangingPunct="1">
-        <a:defRPr sz="1800" kern="1200">
+      <a:lvl6pPr marL="1143000" algn="l" defTabSz="228600" rtl="0" eaLnBrk="1" latinLnBrk="0" hangingPunct="1">
+        <a:defRPr sz="900" kern="1200">
           <a:solidFill>
             <a:schemeClr val="tx1"/>
           </a:solidFill>
@@ -3043,8 +3043,8 @@
           <a:cs typeface="+mn-cs"/>
         </a:defRPr>
       </a:lvl6pPr>
-      <a:lvl7pPr marL="2743200" algn="l" defTabSz="457200" rtl="0" eaLnBrk="1" latinLnBrk="0" hangingPunct="1">
-        <a:defRPr sz="1800" kern="1200">
+      <a:lvl7pPr marL="1371600" algn="l" defTabSz="228600" rtl="0" eaLnBrk="1" latinLnBrk="0" hangingPunct="1">
+        <a:defRPr sz="900" kern="1200">
           <a:solidFill>
             <a:schemeClr val="tx1"/>
           </a:solidFill>
@@ -3053,8 +3053,8 @@
           <a:cs typeface="+mn-cs"/>
         </a:defRPr>
       </a:lvl7pPr>
-      <a:lvl8pPr marL="3200400" algn="l" defTabSz="457200" rtl="0" eaLnBrk="1" latinLnBrk="0" hangingPunct="1">
-        <a:defRPr sz="1800" kern="1200">
+      <a:lvl8pPr marL="1600200" algn="l" defTabSz="228600" rtl="0" eaLnBrk="1" latinLnBrk="0" hangingPunct="1">
+        <a:defRPr sz="900" kern="1200">
           <a:solidFill>
             <a:schemeClr val="tx1"/>
           </a:solidFill>
@@ -3063,8 +3063,8 @@
           <a:cs typeface="+mn-cs"/>
         </a:defRPr>
       </a:lvl8pPr>
-      <a:lvl9pPr marL="3657600" algn="l" defTabSz="457200" rtl="0" eaLnBrk="1" latinLnBrk="0" hangingPunct="1">
-        <a:defRPr sz="1800" kern="1200">
+      <a:lvl9pPr marL="1828800" algn="l" defTabSz="228600" rtl="0" eaLnBrk="1" latinLnBrk="0" hangingPunct="1">
+        <a:defRPr sz="900" kern="1200">
           <a:solidFill>
             <a:schemeClr val="tx1"/>
           </a:solidFill>
@@ -3104,15 +3104,21 @@
           <p:nvPr/>
         </p:nvPicPr>
         <p:blipFill>
-          <a:blip r:embed="rId3"/>
+          <a:blip r:embed="rId3" cstate="email">
+            <a:extLst>
+              <a:ext uri="{28A0092B-C50C-407E-A947-70E740481C1C}">
+                <a14:useLocalDpi xmlns:a14="http://schemas.microsoft.com/office/drawing/2010/main"/>
+              </a:ext>
+            </a:extLst>
+          </a:blip>
           <a:stretch>
             <a:fillRect/>
           </a:stretch>
         </p:blipFill>
         <p:spPr>
           <a:xfrm>
-            <a:off x="-78950" y="84678"/>
-            <a:ext cx="5142857" cy="5142857"/>
+            <a:off x="-39475" y="42339"/>
+            <a:ext cx="2571429" cy="2571429"/>
           </a:xfrm>
           <a:prstGeom prst="rect">
             <a:avLst/>
@@ -3127,8 +3133,8 @@
         </p:nvCxnSpPr>
         <p:spPr>
           <a:xfrm>
-            <a:off x="4033303" y="1112592"/>
-            <a:ext cx="2571750" cy="2582333"/>
+            <a:off x="2016652" y="556296"/>
+            <a:ext cx="1285875" cy="1291167"/>
           </a:xfrm>
           <a:prstGeom prst="line">
             <a:avLst/>
@@ -3163,8 +3169,8 @@
         </p:nvCxnSpPr>
         <p:spPr>
           <a:xfrm>
-            <a:off x="4499230" y="1931742"/>
-            <a:ext cx="2571750" cy="2582333"/>
+            <a:off x="2249615" y="965871"/>
+            <a:ext cx="1285875" cy="1291167"/>
           </a:xfrm>
           <a:prstGeom prst="line">
             <a:avLst/>
@@ -3199,8 +3205,8 @@
         </p:nvCxnSpPr>
         <p:spPr>
           <a:xfrm>
-            <a:off x="4312424" y="2941873"/>
-            <a:ext cx="2571750" cy="2582333"/>
+            <a:off x="2156212" y="1470937"/>
+            <a:ext cx="1285875" cy="1291167"/>
           </a:xfrm>
           <a:prstGeom prst="line">
             <a:avLst/>
@@ -3235,8 +3241,8 @@
         </p:nvCxnSpPr>
         <p:spPr>
           <a:xfrm>
-            <a:off x="3527420" y="3688575"/>
-            <a:ext cx="2571750" cy="2582333"/>
+            <a:off x="1763710" y="1844288"/>
+            <a:ext cx="1285875" cy="1291167"/>
           </a:xfrm>
           <a:prstGeom prst="line">
             <a:avLst/>
@@ -3271,8 +3277,8 @@
         </p:nvCxnSpPr>
         <p:spPr>
           <a:xfrm>
-            <a:off x="2765420" y="4450575"/>
-            <a:ext cx="2571750" cy="2582333"/>
+            <a:off x="1382710" y="2225288"/>
+            <a:ext cx="1285875" cy="1291167"/>
           </a:xfrm>
           <a:prstGeom prst="line">
             <a:avLst/>
@@ -3307,8 +3313,8 @@
         </p:nvSpPr>
         <p:spPr>
           <a:xfrm rot="2708122">
-            <a:off x="4381275" y="3308635"/>
-            <a:ext cx="3000364" cy="3656325"/>
+            <a:off x="2190638" y="1654318"/>
+            <a:ext cx="1500182" cy="1828163"/>
           </a:xfrm>
           <a:prstGeom prst="rect">
             <a:avLst/>
@@ -3336,7 +3342,7 @@
           </a:fontRef>
         </p:style>
         <p:txBody>
-          <a:bodyPr rtlCol="0" anchor="ctr"/>
+          <a:bodyPr lIns="45720" tIns="22860" rIns="45720" bIns="22860" rtlCol="0" anchor="ctr"/>
           <a:lstStyle/>
           <a:p>
             <a:pPr algn="ctr"/>
@@ -3352,8 +3358,8 @@
         </p:nvCxnSpPr>
         <p:spPr>
           <a:xfrm flipV="1">
-            <a:off x="4828238" y="2672358"/>
-            <a:ext cx="749423" cy="731249"/>
+            <a:off x="2414119" y="1336179"/>
+            <a:ext cx="374712" cy="365625"/>
           </a:xfrm>
           <a:prstGeom prst="straightConnector1">
             <a:avLst/>
@@ -3389,8 +3395,8 @@
         </p:nvCxnSpPr>
         <p:spPr>
           <a:xfrm flipV="1">
-            <a:off x="5180101" y="2459134"/>
-            <a:ext cx="218524" cy="213224"/>
+            <a:off x="2590051" y="1229567"/>
+            <a:ext cx="109262" cy="106612"/>
           </a:xfrm>
           <a:prstGeom prst="straightConnector1">
             <a:avLst/>
@@ -3426,8 +3432,8 @@
         </p:nvCxnSpPr>
         <p:spPr>
           <a:xfrm flipV="1">
-            <a:off x="4256136" y="2885582"/>
-            <a:ext cx="1559091" cy="1521200"/>
+            <a:off x="2128068" y="1442791"/>
+            <a:ext cx="779546" cy="760600"/>
           </a:xfrm>
           <a:prstGeom prst="straightConnector1">
             <a:avLst/>
@@ -3463,8 +3469,8 @@
         </p:nvCxnSpPr>
         <p:spPr>
           <a:xfrm flipV="1">
-            <a:off x="3658760" y="2972167"/>
-            <a:ext cx="2269067" cy="2242456"/>
+            <a:off x="1829380" y="1486084"/>
+            <a:ext cx="1134534" cy="1121228"/>
           </a:xfrm>
           <a:prstGeom prst="straightConnector1">
             <a:avLst/>
@@ -3500,8 +3506,8 @@
         </p:nvSpPr>
         <p:spPr>
           <a:xfrm rot="2811792">
-            <a:off x="4958043" y="2135436"/>
-            <a:ext cx="924983" cy="369332"/>
+            <a:off x="2479022" y="1067718"/>
+            <a:ext cx="462492" cy="184666"/>
           </a:xfrm>
           <a:prstGeom prst="rect">
             <a:avLst/>
@@ -3509,7 +3515,7 @@
           <a:noFill/>
         </p:spPr>
         <p:txBody>
-          <a:bodyPr wrap="square" rtlCol="0">
+          <a:bodyPr wrap="square" lIns="45720" tIns="22860" rIns="45720" bIns="22860" rtlCol="0">
             <a:spAutoFit/>
           </a:bodyPr>
           <a:lstStyle/>
@@ -3534,8 +3540,8 @@
         </p:nvSpPr>
         <p:spPr>
           <a:xfrm rot="2811792">
-            <a:off x="5095040" y="3860583"/>
-            <a:ext cx="762254" cy="369332"/>
+            <a:off x="2547520" y="1930292"/>
+            <a:ext cx="381127" cy="184666"/>
           </a:xfrm>
           <a:prstGeom prst="rect">
             <a:avLst/>
@@ -3543,7 +3549,7 @@
           <a:noFill/>
         </p:spPr>
         <p:txBody>
-          <a:bodyPr wrap="square" rtlCol="0">
+          <a:bodyPr wrap="square" lIns="45720" tIns="22860" rIns="45720" bIns="22860" rtlCol="0">
             <a:spAutoFit/>
           </a:bodyPr>
           <a:lstStyle/>
@@ -3568,8 +3574,8 @@
         </p:nvSpPr>
         <p:spPr>
           <a:xfrm rot="2811792">
-            <a:off x="4300912" y="4683431"/>
-            <a:ext cx="924983" cy="369332"/>
+            <a:off x="2150456" y="2341716"/>
+            <a:ext cx="462492" cy="184666"/>
           </a:xfrm>
           <a:prstGeom prst="rect">
             <a:avLst/>
@@ -3577,7 +3583,7 @@
           <a:noFill/>
         </p:spPr>
         <p:txBody>
-          <a:bodyPr wrap="square" rtlCol="0">
+          <a:bodyPr wrap="square" lIns="45720" tIns="22860" rIns="45720" bIns="22860" rtlCol="0">
             <a:spAutoFit/>
           </a:bodyPr>
           <a:lstStyle/>
@@ -3602,8 +3608,8 @@
         </p:nvSpPr>
         <p:spPr>
           <a:xfrm rot="2811792">
-            <a:off x="3820708" y="5145461"/>
-            <a:ext cx="924983" cy="369332"/>
+            <a:off x="1910354" y="2572731"/>
+            <a:ext cx="462492" cy="184666"/>
           </a:xfrm>
           <a:prstGeom prst="rect">
             <a:avLst/>
@@ -3611,7 +3617,7 @@
           <a:noFill/>
         </p:spPr>
         <p:txBody>
-          <a:bodyPr wrap="square" rtlCol="0">
+          <a:bodyPr wrap="square" lIns="45720" tIns="22860" rIns="45720" bIns="22860" rtlCol="0">
             <a:spAutoFit/>
           </a:bodyPr>
           <a:lstStyle/>
@@ -3636,15 +3642,15 @@
         </p:nvSpPr>
         <p:spPr>
           <a:xfrm>
-            <a:off x="2984694" y="2126775"/>
-            <a:ext cx="901961" cy="369332"/>
+            <a:off x="1492347" y="1063388"/>
+            <a:ext cx="450981" cy="184666"/>
           </a:xfrm>
           <a:prstGeom prst="rect">
             <a:avLst/>
           </a:prstGeom>
         </p:spPr>
         <p:txBody>
-          <a:bodyPr wrap="square">
+          <a:bodyPr wrap="square" lIns="45720" tIns="22860" rIns="45720" bIns="22860">
             <a:spAutoFit/>
           </a:bodyPr>
           <a:lstStyle/>
@@ -3679,8 +3685,8 @@
         </p:nvSpPr>
         <p:spPr>
           <a:xfrm rot="8316779" flipH="1">
-            <a:off x="1978256" y="1585304"/>
-            <a:ext cx="1397845" cy="1589615"/>
+            <a:off x="989128" y="792652"/>
+            <a:ext cx="698923" cy="794808"/>
           </a:xfrm>
           <a:prstGeom prst="circularArrow">
             <a:avLst>
@@ -3713,7 +3719,7 @@
           </a:fontRef>
         </p:style>
         <p:txBody>
-          <a:bodyPr rtlCol="0" anchor="ctr"/>
+          <a:bodyPr lIns="45720" tIns="22860" rIns="45720" bIns="22860" rtlCol="0" anchor="ctr"/>
           <a:lstStyle/>
           <a:p>
             <a:pPr algn="ctr"/>
@@ -3733,8 +3739,8 @@
         </p:nvCxnSpPr>
         <p:spPr>
           <a:xfrm>
-            <a:off x="2652889" y="2486090"/>
-            <a:ext cx="1233766" cy="0"/>
+            <a:off x="1326445" y="1243045"/>
+            <a:ext cx="616883" cy="0"/>
           </a:xfrm>
           <a:prstGeom prst="line">
             <a:avLst/>
@@ -3769,8 +3775,8 @@
         </p:nvGrpSpPr>
         <p:grpSpPr>
           <a:xfrm>
-            <a:off x="6403594" y="74492"/>
-            <a:ext cx="3064481" cy="3011757"/>
+            <a:off x="3201797" y="37246"/>
+            <a:ext cx="1532241" cy="1505879"/>
             <a:chOff x="6721074" y="74492"/>
             <a:chExt cx="3064481" cy="3011757"/>
           </a:xfrm>
@@ -3889,8 +3895,8 @@
           </p:nvSpPr>
           <p:spPr>
             <a:xfrm rot="18859671">
-              <a:off x="6854118" y="1515094"/>
-              <a:ext cx="1957052" cy="369332"/>
+              <a:off x="6854118" y="1468928"/>
+              <a:ext cx="1957051" cy="461664"/>
             </a:xfrm>
             <a:prstGeom prst="rect">
               <a:avLst/>
@@ -3920,8 +3926,8 @@
         </p:nvSpPr>
         <p:spPr>
           <a:xfrm>
-            <a:off x="10342880" y="1931742"/>
-            <a:ext cx="1076960" cy="369332"/>
+            <a:off x="5171440" y="965871"/>
+            <a:ext cx="538480" cy="184666"/>
           </a:xfrm>
           <a:prstGeom prst="rect">
             <a:avLst/>
@@ -3929,7 +3935,7 @@
           <a:noFill/>
         </p:spPr>
         <p:txBody>
-          <a:bodyPr wrap="square" rtlCol="0">
+          <a:bodyPr wrap="square" lIns="45720" tIns="22860" rIns="45720" bIns="22860" rtlCol="0">
             <a:spAutoFit/>
           </a:bodyPr>
           <a:lstStyle/>
@@ -3953,14 +3959,14 @@
           </p:nvPr>
         </p:nvGraphicFramePr>
         <p:xfrm>
-          <a:off x="11381740" y="3548063"/>
-          <a:ext cx="549275" cy="549275"/>
+          <a:off x="5690870" y="1774032"/>
+          <a:ext cx="274638" cy="274638"/>
         </p:xfrm>
         <a:graphic>
           <a:graphicData uri="http://schemas.openxmlformats.org/presentationml/2006/ole">
             <mc:AlternateContent xmlns:mc="http://schemas.openxmlformats.org/markup-compatibility/2006">
               <mc:Choice xmlns:v="urn:schemas-microsoft-com:vml" Requires="v">
-                <p:oleObj spid="_x0000_s1060" name="Equation" r:id="rId6" imgW="228600" imgH="228600" progId="Equation.3">
+                <p:oleObj spid="_x0000_s1078" name="Equation" r:id="rId6" imgW="228600" imgH="228600" progId="Equation.3">
                   <p:embed/>
                 </p:oleObj>
               </mc:Choice>
@@ -3981,8 +3987,8 @@
                     </p:blipFill>
                     <p:spPr>
                       <a:xfrm>
-                        <a:off x="11381740" y="3548063"/>
-                        <a:ext cx="549275" cy="549275"/>
+                        <a:off x="5690870" y="1774032"/>
+                        <a:ext cx="274638" cy="274638"/>
                       </a:xfrm>
                       <a:prstGeom prst="rect">
                         <a:avLst/>
@@ -4010,14 +4016,14 @@
           </p:nvPr>
         </p:nvGraphicFramePr>
         <p:xfrm>
-          <a:off x="11409363" y="84138"/>
-          <a:ext cx="581025" cy="549275"/>
+          <a:off x="5704682" y="42069"/>
+          <a:ext cx="290513" cy="274638"/>
         </p:xfrm>
         <a:graphic>
           <a:graphicData uri="http://schemas.openxmlformats.org/presentationml/2006/ole">
             <mc:AlternateContent xmlns:mc="http://schemas.openxmlformats.org/markup-compatibility/2006">
               <mc:Choice xmlns:v="urn:schemas-microsoft-com:vml" Requires="v">
-                <p:oleObj spid="_x0000_s1061" name="Equation" r:id="rId8" imgW="241300" imgH="228600" progId="Equation.3">
+                <p:oleObj spid="_x0000_s1079" name="Equation" r:id="rId8" imgW="241300" imgH="228600" progId="Equation.3">
                   <p:embed/>
                 </p:oleObj>
               </mc:Choice>
@@ -4038,8 +4044,8 @@
                     </p:blipFill>
                     <p:spPr>
                       <a:xfrm>
-                        <a:off x="11409363" y="84138"/>
-                        <a:ext cx="581025" cy="549275"/>
+                        <a:off x="5704682" y="42069"/>
+                        <a:ext cx="290513" cy="274638"/>
                       </a:xfrm>
                       <a:prstGeom prst="rect">
                         <a:avLst/>
@@ -4067,14 +4073,14 @@
           </p:nvPr>
         </p:nvGraphicFramePr>
         <p:xfrm>
-          <a:off x="6481320" y="2819267"/>
-          <a:ext cx="488060" cy="579571"/>
+          <a:off x="3240660" y="1409633"/>
+          <a:ext cx="244030" cy="289786"/>
         </p:xfrm>
         <a:graphic>
           <a:graphicData uri="http://schemas.openxmlformats.org/presentationml/2006/ole">
             <mc:AlternateContent xmlns:mc="http://schemas.openxmlformats.org/markup-compatibility/2006">
               <mc:Choice xmlns:v="urn:schemas-microsoft-com:vml" Requires="v">
-                <p:oleObj spid="_x0000_s1062" name="Equation" r:id="rId10" imgW="203200" imgH="241300" progId="Equation.3">
+                <p:oleObj spid="_x0000_s1080" name="Equation" r:id="rId10" imgW="203200" imgH="241300" progId="Equation.3">
                   <p:embed/>
                 </p:oleObj>
               </mc:Choice>
@@ -4095,8 +4101,8 @@
                     </p:blipFill>
                     <p:spPr>
                       <a:xfrm>
-                        <a:off x="6481320" y="2819267"/>
-                        <a:ext cx="488060" cy="579571"/>
+                        <a:off x="3240660" y="1409633"/>
+                        <a:ext cx="244030" cy="289786"/>
                       </a:xfrm>
                       <a:prstGeom prst="rect">
                         <a:avLst/>
@@ -4124,14 +4130,14 @@
           </p:nvPr>
         </p:nvGraphicFramePr>
         <p:xfrm>
-          <a:off x="15190620" y="899073"/>
-          <a:ext cx="306387" cy="427037"/>
+          <a:off x="7595310" y="449537"/>
+          <a:ext cx="153194" cy="213519"/>
         </p:xfrm>
         <a:graphic>
           <a:graphicData uri="http://schemas.openxmlformats.org/presentationml/2006/ole">
             <mc:AlternateContent xmlns:mc="http://schemas.openxmlformats.org/markup-compatibility/2006">
               <mc:Choice xmlns:v="urn:schemas-microsoft-com:vml" Requires="v">
-                <p:oleObj spid="_x0000_s1063" name="Equation" r:id="rId12" imgW="127000" imgH="177800" progId="Equation.3">
+                <p:oleObj spid="_x0000_s1081" name="Equation" r:id="rId12" imgW="127000" imgH="177800" progId="Equation.3">
                   <p:embed/>
                 </p:oleObj>
               </mc:Choice>
@@ -4152,8 +4158,8 @@
                     </p:blipFill>
                     <p:spPr>
                       <a:xfrm>
-                        <a:off x="15190620" y="899073"/>
-                        <a:ext cx="306387" cy="427037"/>
+                        <a:off x="7595310" y="449537"/>
+                        <a:ext cx="153194" cy="213519"/>
                       </a:xfrm>
                       <a:prstGeom prst="rect">
                         <a:avLst/>
@@ -4181,14 +4187,14 @@
           </p:nvPr>
         </p:nvGraphicFramePr>
         <p:xfrm>
-          <a:off x="15190620" y="3658877"/>
-          <a:ext cx="306387" cy="427037"/>
+          <a:off x="7595310" y="1829439"/>
+          <a:ext cx="153194" cy="213519"/>
         </p:xfrm>
         <a:graphic>
           <a:graphicData uri="http://schemas.openxmlformats.org/presentationml/2006/ole">
             <mc:AlternateContent xmlns:mc="http://schemas.openxmlformats.org/markup-compatibility/2006">
               <mc:Choice xmlns:v="urn:schemas-microsoft-com:vml" Requires="v">
-                <p:oleObj spid="_x0000_s1064" name="Equation" r:id="rId14" imgW="127000" imgH="177800" progId="Equation.3">
+                <p:oleObj spid="_x0000_s1082" name="Equation" r:id="rId14" imgW="127000" imgH="177800" progId="Equation.3">
                   <p:embed/>
                 </p:oleObj>
               </mc:Choice>
@@ -4209,8 +4215,8 @@
                     </p:blipFill>
                     <p:spPr>
                       <a:xfrm>
-                        <a:off x="15190620" y="3658877"/>
-                        <a:ext cx="306387" cy="427037"/>
+                        <a:off x="7595310" y="1829439"/>
+                        <a:ext cx="153194" cy="213519"/>
                       </a:xfrm>
                       <a:prstGeom prst="rect">
                         <a:avLst/>
@@ -4238,14 +4244,14 @@
           </p:nvPr>
         </p:nvGraphicFramePr>
         <p:xfrm>
-          <a:off x="10189686" y="4787586"/>
-          <a:ext cx="306387" cy="427037"/>
+          <a:off x="5094843" y="2393793"/>
+          <a:ext cx="153194" cy="213519"/>
         </p:xfrm>
         <a:graphic>
           <a:graphicData uri="http://schemas.openxmlformats.org/presentationml/2006/ole">
             <mc:AlternateContent xmlns:mc="http://schemas.openxmlformats.org/markup-compatibility/2006">
               <mc:Choice xmlns:v="urn:schemas-microsoft-com:vml" Requires="v">
-                <p:oleObj spid="_x0000_s1065" name="Equation" r:id="rId15" imgW="127000" imgH="177800" progId="Equation.3">
+                <p:oleObj spid="_x0000_s1083" name="Equation" r:id="rId15" imgW="127000" imgH="177800" progId="Equation.3">
                   <p:embed/>
                 </p:oleObj>
               </mc:Choice>
@@ -4266,8 +4272,8 @@
                     </p:blipFill>
                     <p:spPr>
                       <a:xfrm>
-                        <a:off x="10189686" y="4787586"/>
-                        <a:ext cx="306387" cy="427037"/>
+                        <a:off x="5094843" y="2393793"/>
+                        <a:ext cx="153194" cy="213519"/>
                       </a:xfrm>
                       <a:prstGeom prst="rect">
                         <a:avLst/>
@@ -4289,15 +4295,21 @@
           <p:nvPr/>
         </p:nvPicPr>
         <p:blipFill>
-          <a:blip r:embed="rId16"/>
+          <a:blip r:embed="rId16" cstate="email">
+            <a:extLst>
+              <a:ext uri="{28A0092B-C50C-407E-A947-70E740481C1C}">
+                <a14:useLocalDpi xmlns:a14="http://schemas.microsoft.com/office/drawing/2010/main"/>
+              </a:ext>
+            </a:extLst>
+          </a:blip>
           <a:stretch>
             <a:fillRect/>
           </a:stretch>
         </p:blipFill>
         <p:spPr>
           <a:xfrm>
-            <a:off x="10954000" y="84678"/>
-            <a:ext cx="4572000" cy="2755900"/>
+            <a:off x="5477000" y="42339"/>
+            <a:ext cx="2286000" cy="1377950"/>
           </a:xfrm>
           <a:prstGeom prst="rect">
             <a:avLst/>
@@ -4313,15 +4325,21 @@
           <p:nvPr/>
         </p:nvPicPr>
         <p:blipFill>
-          <a:blip r:embed="rId17"/>
+          <a:blip r:embed="rId17" cstate="email">
+            <a:extLst>
+              <a:ext uri="{28A0092B-C50C-407E-A947-70E740481C1C}">
+                <a14:useLocalDpi xmlns:a14="http://schemas.microsoft.com/office/drawing/2010/main"/>
+              </a:ext>
+            </a:extLst>
+          </a:blip>
           <a:stretch>
             <a:fillRect/>
           </a:stretch>
         </p:blipFill>
         <p:spPr>
           <a:xfrm>
-            <a:off x="10972800" y="2870067"/>
-            <a:ext cx="4572000" cy="2667000"/>
+            <a:off x="5486400" y="1435034"/>
+            <a:ext cx="2286000" cy="1333500"/>
           </a:xfrm>
           <a:prstGeom prst="rect">
             <a:avLst/>
@@ -4337,15 +4355,21 @@
           <p:nvPr/>
         </p:nvPicPr>
         <p:blipFill>
-          <a:blip r:embed="rId18"/>
+          <a:blip r:embed="rId18" cstate="email">
+            <a:extLst>
+              <a:ext uri="{28A0092B-C50C-407E-A947-70E740481C1C}">
+                <a14:useLocalDpi xmlns:a14="http://schemas.microsoft.com/office/drawing/2010/main"/>
+              </a:ext>
+            </a:extLst>
+          </a:blip>
           <a:stretch>
             <a:fillRect/>
           </a:stretch>
         </p:blipFill>
         <p:spPr>
           <a:xfrm>
-            <a:off x="6088890" y="2777060"/>
-            <a:ext cx="4572000" cy="2755900"/>
+            <a:off x="3044445" y="1388530"/>
+            <a:ext cx="2286000" cy="1377950"/>
           </a:xfrm>
           <a:prstGeom prst="rect">
             <a:avLst/>

</xml_diff>

<commit_message>
Reverted the commit for making size of images small
</commit_message>
<xml_diff>
--- a/RA-L/pictures/pdf/CircleFill.pptx
+++ b/RA-L/pictures/pdf/CircleFill.pptx
@@ -7,14 +7,14 @@
   <p:sldIdLst>
     <p:sldId id="256" r:id="rId2"/>
   </p:sldIdLst>
-  <p:sldSz cx="7772400" cy="2743200"/>
+  <p:sldSz cx="15544800" cy="5486400"/>
   <p:notesSz cx="6858000" cy="9144000"/>
   <p:defaultTextStyle>
     <a:defPPr>
       <a:defRPr lang="en-US"/>
     </a:defPPr>
-    <a:lvl1pPr marL="0" algn="l" defTabSz="228600" rtl="0" eaLnBrk="1" latinLnBrk="0" hangingPunct="1">
-      <a:defRPr sz="900" kern="1200">
+    <a:lvl1pPr marL="0" algn="l" defTabSz="457200" rtl="0" eaLnBrk="1" latinLnBrk="0" hangingPunct="1">
+      <a:defRPr sz="1800" kern="1200">
         <a:solidFill>
           <a:schemeClr val="tx1"/>
         </a:solidFill>
@@ -23,8 +23,8 @@
         <a:cs typeface="+mn-cs"/>
       </a:defRPr>
     </a:lvl1pPr>
-    <a:lvl2pPr marL="228600" algn="l" defTabSz="228600" rtl="0" eaLnBrk="1" latinLnBrk="0" hangingPunct="1">
-      <a:defRPr sz="900" kern="1200">
+    <a:lvl2pPr marL="457200" algn="l" defTabSz="457200" rtl="0" eaLnBrk="1" latinLnBrk="0" hangingPunct="1">
+      <a:defRPr sz="1800" kern="1200">
         <a:solidFill>
           <a:schemeClr val="tx1"/>
         </a:solidFill>
@@ -33,8 +33,8 @@
         <a:cs typeface="+mn-cs"/>
       </a:defRPr>
     </a:lvl2pPr>
-    <a:lvl3pPr marL="457200" algn="l" defTabSz="228600" rtl="0" eaLnBrk="1" latinLnBrk="0" hangingPunct="1">
-      <a:defRPr sz="900" kern="1200">
+    <a:lvl3pPr marL="914400" algn="l" defTabSz="457200" rtl="0" eaLnBrk="1" latinLnBrk="0" hangingPunct="1">
+      <a:defRPr sz="1800" kern="1200">
         <a:solidFill>
           <a:schemeClr val="tx1"/>
         </a:solidFill>
@@ -43,8 +43,8 @@
         <a:cs typeface="+mn-cs"/>
       </a:defRPr>
     </a:lvl3pPr>
-    <a:lvl4pPr marL="685800" algn="l" defTabSz="228600" rtl="0" eaLnBrk="1" latinLnBrk="0" hangingPunct="1">
-      <a:defRPr sz="900" kern="1200">
+    <a:lvl4pPr marL="1371600" algn="l" defTabSz="457200" rtl="0" eaLnBrk="1" latinLnBrk="0" hangingPunct="1">
+      <a:defRPr sz="1800" kern="1200">
         <a:solidFill>
           <a:schemeClr val="tx1"/>
         </a:solidFill>
@@ -53,8 +53,8 @@
         <a:cs typeface="+mn-cs"/>
       </a:defRPr>
     </a:lvl4pPr>
-    <a:lvl5pPr marL="914400" algn="l" defTabSz="228600" rtl="0" eaLnBrk="1" latinLnBrk="0" hangingPunct="1">
-      <a:defRPr sz="900" kern="1200">
+    <a:lvl5pPr marL="1828800" algn="l" defTabSz="457200" rtl="0" eaLnBrk="1" latinLnBrk="0" hangingPunct="1">
+      <a:defRPr sz="1800" kern="1200">
         <a:solidFill>
           <a:schemeClr val="tx1"/>
         </a:solidFill>
@@ -63,8 +63,8 @@
         <a:cs typeface="+mn-cs"/>
       </a:defRPr>
     </a:lvl5pPr>
-    <a:lvl6pPr marL="1143000" algn="l" defTabSz="228600" rtl="0" eaLnBrk="1" latinLnBrk="0" hangingPunct="1">
-      <a:defRPr sz="900" kern="1200">
+    <a:lvl6pPr marL="2286000" algn="l" defTabSz="457200" rtl="0" eaLnBrk="1" latinLnBrk="0" hangingPunct="1">
+      <a:defRPr sz="1800" kern="1200">
         <a:solidFill>
           <a:schemeClr val="tx1"/>
         </a:solidFill>
@@ -73,8 +73,8 @@
         <a:cs typeface="+mn-cs"/>
       </a:defRPr>
     </a:lvl6pPr>
-    <a:lvl7pPr marL="1371600" algn="l" defTabSz="228600" rtl="0" eaLnBrk="1" latinLnBrk="0" hangingPunct="1">
-      <a:defRPr sz="900" kern="1200">
+    <a:lvl7pPr marL="2743200" algn="l" defTabSz="457200" rtl="0" eaLnBrk="1" latinLnBrk="0" hangingPunct="1">
+      <a:defRPr sz="1800" kern="1200">
         <a:solidFill>
           <a:schemeClr val="tx1"/>
         </a:solidFill>
@@ -83,8 +83,8 @@
         <a:cs typeface="+mn-cs"/>
       </a:defRPr>
     </a:lvl7pPr>
-    <a:lvl8pPr marL="1600200" algn="l" defTabSz="228600" rtl="0" eaLnBrk="1" latinLnBrk="0" hangingPunct="1">
-      <a:defRPr sz="900" kern="1200">
+    <a:lvl8pPr marL="3200400" algn="l" defTabSz="457200" rtl="0" eaLnBrk="1" latinLnBrk="0" hangingPunct="1">
+      <a:defRPr sz="1800" kern="1200">
         <a:solidFill>
           <a:schemeClr val="tx1"/>
         </a:solidFill>
@@ -93,8 +93,8 @@
         <a:cs typeface="+mn-cs"/>
       </a:defRPr>
     </a:lvl8pPr>
-    <a:lvl9pPr marL="1828800" algn="l" defTabSz="228600" rtl="0" eaLnBrk="1" latinLnBrk="0" hangingPunct="1">
-      <a:defRPr sz="900" kern="1200">
+    <a:lvl9pPr marL="3657600" algn="l" defTabSz="457200" rtl="0" eaLnBrk="1" latinLnBrk="0" hangingPunct="1">
+      <a:defRPr sz="1800" kern="1200">
         <a:solidFill>
           <a:schemeClr val="tx1"/>
         </a:solidFill>
@@ -136,8 +136,8 @@
         </p:nvSpPr>
         <p:spPr>
           <a:xfrm>
-            <a:off x="582930" y="852171"/>
-            <a:ext cx="6606540" cy="588010"/>
+            <a:off x="1165860" y="1704342"/>
+            <a:ext cx="13213080" cy="1176020"/>
           </a:xfrm>
         </p:spPr>
         <p:txBody>
@@ -164,8 +164,8 @@
         </p:nvSpPr>
         <p:spPr>
           <a:xfrm>
-            <a:off x="1165860" y="1554480"/>
-            <a:ext cx="5440680" cy="701040"/>
+            <a:off x="2331720" y="3108960"/>
+            <a:ext cx="10881360" cy="1402080"/>
           </a:xfrm>
         </p:spPr>
         <p:txBody>
@@ -181,7 +181,7 @@
                 </a:solidFill>
               </a:defRPr>
             </a:lvl1pPr>
-            <a:lvl2pPr marL="228600" indent="0" algn="ctr">
+            <a:lvl2pPr marL="457200" indent="0" algn="ctr">
               <a:buNone/>
               <a:defRPr>
                 <a:solidFill>
@@ -191,7 +191,7 @@
                 </a:solidFill>
               </a:defRPr>
             </a:lvl2pPr>
-            <a:lvl3pPr marL="457200" indent="0" algn="ctr">
+            <a:lvl3pPr marL="914400" indent="0" algn="ctr">
               <a:buNone/>
               <a:defRPr>
                 <a:solidFill>
@@ -201,7 +201,7 @@
                 </a:solidFill>
               </a:defRPr>
             </a:lvl3pPr>
-            <a:lvl4pPr marL="685800" indent="0" algn="ctr">
+            <a:lvl4pPr marL="1371600" indent="0" algn="ctr">
               <a:buNone/>
               <a:defRPr>
                 <a:solidFill>
@@ -211,7 +211,7 @@
                 </a:solidFill>
               </a:defRPr>
             </a:lvl4pPr>
-            <a:lvl5pPr marL="914400" indent="0" algn="ctr">
+            <a:lvl5pPr marL="1828800" indent="0" algn="ctr">
               <a:buNone/>
               <a:defRPr>
                 <a:solidFill>
@@ -221,7 +221,7 @@
                 </a:solidFill>
               </a:defRPr>
             </a:lvl5pPr>
-            <a:lvl6pPr marL="1143000" indent="0" algn="ctr">
+            <a:lvl6pPr marL="2286000" indent="0" algn="ctr">
               <a:buNone/>
               <a:defRPr>
                 <a:solidFill>
@@ -231,7 +231,7 @@
                 </a:solidFill>
               </a:defRPr>
             </a:lvl6pPr>
-            <a:lvl7pPr marL="1371600" indent="0" algn="ctr">
+            <a:lvl7pPr marL="2743200" indent="0" algn="ctr">
               <a:buNone/>
               <a:defRPr>
                 <a:solidFill>
@@ -241,7 +241,7 @@
                 </a:solidFill>
               </a:defRPr>
             </a:lvl7pPr>
-            <a:lvl8pPr marL="1600200" indent="0" algn="ctr">
+            <a:lvl8pPr marL="3200400" indent="0" algn="ctr">
               <a:buNone/>
               <a:defRPr>
                 <a:solidFill>
@@ -251,7 +251,7 @@
                 </a:solidFill>
               </a:defRPr>
             </a:lvl8pPr>
-            <a:lvl9pPr marL="1828800" indent="0" algn="ctr">
+            <a:lvl9pPr marL="3657600" indent="0" algn="ctr">
               <a:buNone/>
               <a:defRPr>
                 <a:solidFill>
@@ -548,8 +548,8 @@
         </p:nvSpPr>
         <p:spPr>
           <a:xfrm>
-            <a:off x="5634990" y="109856"/>
-            <a:ext cx="1748790" cy="2340610"/>
+            <a:off x="11269980" y="219711"/>
+            <a:ext cx="3497580" cy="4681220"/>
           </a:xfrm>
         </p:spPr>
         <p:txBody>
@@ -576,8 +576,8 @@
         </p:nvSpPr>
         <p:spPr>
           <a:xfrm>
-            <a:off x="388620" y="109856"/>
-            <a:ext cx="5116830" cy="2340610"/>
+            <a:off x="777240" y="219711"/>
+            <a:ext cx="10233660" cy="4681220"/>
           </a:xfrm>
         </p:spPr>
         <p:txBody>
@@ -898,15 +898,15 @@
         </p:nvSpPr>
         <p:spPr>
           <a:xfrm>
-            <a:off x="613967" y="1762761"/>
-            <a:ext cx="6606540" cy="544830"/>
+            <a:off x="1227933" y="3525521"/>
+            <a:ext cx="13213080" cy="1089660"/>
           </a:xfrm>
         </p:spPr>
         <p:txBody>
           <a:bodyPr anchor="t"/>
           <a:lstStyle>
             <a:lvl1pPr algn="l">
-              <a:defRPr sz="2000" b="1" cap="all"/>
+              <a:defRPr sz="4000" b="1" cap="all"/>
             </a:lvl1pPr>
           </a:lstStyle>
           <a:p>
@@ -930,8 +930,8 @@
         </p:nvSpPr>
         <p:spPr>
           <a:xfrm>
-            <a:off x="613967" y="1162686"/>
-            <a:ext cx="6606540" cy="600075"/>
+            <a:off x="1227933" y="2325371"/>
+            <a:ext cx="13213080" cy="1200150"/>
           </a:xfrm>
         </p:spPr>
         <p:txBody>
@@ -939,7 +939,7 @@
           <a:lstStyle>
             <a:lvl1pPr marL="0" indent="0">
               <a:buNone/>
-              <a:defRPr sz="1000">
+              <a:defRPr sz="2000">
                 <a:solidFill>
                   <a:schemeClr val="tx1">
                     <a:tint val="75000"/>
@@ -947,9 +947,9 @@
                 </a:solidFill>
               </a:defRPr>
             </a:lvl1pPr>
-            <a:lvl2pPr marL="228600" indent="0">
-              <a:buNone/>
-              <a:defRPr sz="900">
+            <a:lvl2pPr marL="457200" indent="0">
+              <a:buNone/>
+              <a:defRPr sz="1800">
                 <a:solidFill>
                   <a:schemeClr val="tx1">
                     <a:tint val="75000"/>
@@ -957,9 +957,9 @@
                 </a:solidFill>
               </a:defRPr>
             </a:lvl2pPr>
-            <a:lvl3pPr marL="457200" indent="0">
-              <a:buNone/>
-              <a:defRPr sz="800">
+            <a:lvl3pPr marL="914400" indent="0">
+              <a:buNone/>
+              <a:defRPr sz="1600">
                 <a:solidFill>
                   <a:schemeClr val="tx1">
                     <a:tint val="75000"/>
@@ -967,9 +967,9 @@
                 </a:solidFill>
               </a:defRPr>
             </a:lvl3pPr>
-            <a:lvl4pPr marL="685800" indent="0">
-              <a:buNone/>
-              <a:defRPr sz="700">
+            <a:lvl4pPr marL="1371600" indent="0">
+              <a:buNone/>
+              <a:defRPr sz="1400">
                 <a:solidFill>
                   <a:schemeClr val="tx1">
                     <a:tint val="75000"/>
@@ -977,9 +977,9 @@
                 </a:solidFill>
               </a:defRPr>
             </a:lvl4pPr>
-            <a:lvl5pPr marL="914400" indent="0">
-              <a:buNone/>
-              <a:defRPr sz="700">
+            <a:lvl5pPr marL="1828800" indent="0">
+              <a:buNone/>
+              <a:defRPr sz="1400">
                 <a:solidFill>
                   <a:schemeClr val="tx1">
                     <a:tint val="75000"/>
@@ -987,9 +987,9 @@
                 </a:solidFill>
               </a:defRPr>
             </a:lvl5pPr>
-            <a:lvl6pPr marL="1143000" indent="0">
-              <a:buNone/>
-              <a:defRPr sz="700">
+            <a:lvl6pPr marL="2286000" indent="0">
+              <a:buNone/>
+              <a:defRPr sz="1400">
                 <a:solidFill>
                   <a:schemeClr val="tx1">
                     <a:tint val="75000"/>
@@ -997,9 +997,9 @@
                 </a:solidFill>
               </a:defRPr>
             </a:lvl6pPr>
-            <a:lvl7pPr marL="1371600" indent="0">
-              <a:buNone/>
-              <a:defRPr sz="700">
+            <a:lvl7pPr marL="2743200" indent="0">
+              <a:buNone/>
+              <a:defRPr sz="1400">
                 <a:solidFill>
                   <a:schemeClr val="tx1">
                     <a:tint val="75000"/>
@@ -1007,9 +1007,9 @@
                 </a:solidFill>
               </a:defRPr>
             </a:lvl7pPr>
-            <a:lvl8pPr marL="1600200" indent="0">
-              <a:buNone/>
-              <a:defRPr sz="700">
+            <a:lvl8pPr marL="3200400" indent="0">
+              <a:buNone/>
+              <a:defRPr sz="1400">
                 <a:solidFill>
                   <a:schemeClr val="tx1">
                     <a:tint val="75000"/>
@@ -1017,9 +1017,9 @@
                 </a:solidFill>
               </a:defRPr>
             </a:lvl8pPr>
-            <a:lvl9pPr marL="1828800" indent="0">
-              <a:buNone/>
-              <a:defRPr sz="700">
+            <a:lvl9pPr marL="3657600" indent="0">
+              <a:buNone/>
+              <a:defRPr sz="1400">
                 <a:solidFill>
                   <a:schemeClr val="tx1">
                     <a:tint val="75000"/>
@@ -1167,39 +1167,39 @@
         </p:nvSpPr>
         <p:spPr>
           <a:xfrm>
-            <a:off x="388620" y="640080"/>
-            <a:ext cx="3432810" cy="1810386"/>
+            <a:off x="777240" y="1280161"/>
+            <a:ext cx="6865620" cy="3620771"/>
           </a:xfrm>
         </p:spPr>
         <p:txBody>
           <a:bodyPr/>
           <a:lstStyle>
             <a:lvl1pPr>
-              <a:defRPr sz="1400"/>
+              <a:defRPr sz="2800"/>
             </a:lvl1pPr>
             <a:lvl2pPr>
-              <a:defRPr sz="1200"/>
+              <a:defRPr sz="2400"/>
             </a:lvl2pPr>
             <a:lvl3pPr>
-              <a:defRPr sz="1000"/>
+              <a:defRPr sz="2000"/>
             </a:lvl3pPr>
             <a:lvl4pPr>
-              <a:defRPr sz="900"/>
+              <a:defRPr sz="1800"/>
             </a:lvl4pPr>
             <a:lvl5pPr>
-              <a:defRPr sz="900"/>
+              <a:defRPr sz="1800"/>
             </a:lvl5pPr>
             <a:lvl6pPr>
-              <a:defRPr sz="900"/>
+              <a:defRPr sz="1800"/>
             </a:lvl6pPr>
             <a:lvl7pPr>
-              <a:defRPr sz="900"/>
+              <a:defRPr sz="1800"/>
             </a:lvl7pPr>
             <a:lvl8pPr>
-              <a:defRPr sz="900"/>
+              <a:defRPr sz="1800"/>
             </a:lvl8pPr>
             <a:lvl9pPr>
-              <a:defRPr sz="900"/>
+              <a:defRPr sz="1800"/>
             </a:lvl9pPr>
           </a:lstStyle>
           <a:p>
@@ -1252,39 +1252,39 @@
         </p:nvSpPr>
         <p:spPr>
           <a:xfrm>
-            <a:off x="3950970" y="640080"/>
-            <a:ext cx="3432810" cy="1810386"/>
+            <a:off x="7901940" y="1280161"/>
+            <a:ext cx="6865620" cy="3620771"/>
           </a:xfrm>
         </p:spPr>
         <p:txBody>
           <a:bodyPr/>
           <a:lstStyle>
             <a:lvl1pPr>
-              <a:defRPr sz="1400"/>
+              <a:defRPr sz="2800"/>
             </a:lvl1pPr>
             <a:lvl2pPr>
-              <a:defRPr sz="1200"/>
+              <a:defRPr sz="2400"/>
             </a:lvl2pPr>
             <a:lvl3pPr>
-              <a:defRPr sz="1000"/>
+              <a:defRPr sz="2000"/>
             </a:lvl3pPr>
             <a:lvl4pPr>
-              <a:defRPr sz="900"/>
+              <a:defRPr sz="1800"/>
             </a:lvl4pPr>
             <a:lvl5pPr>
-              <a:defRPr sz="900"/>
+              <a:defRPr sz="1800"/>
             </a:lvl5pPr>
             <a:lvl6pPr>
-              <a:defRPr sz="900"/>
+              <a:defRPr sz="1800"/>
             </a:lvl6pPr>
             <a:lvl7pPr>
-              <a:defRPr sz="900"/>
+              <a:defRPr sz="1800"/>
             </a:lvl7pPr>
             <a:lvl8pPr>
-              <a:defRPr sz="900"/>
+              <a:defRPr sz="1800"/>
             </a:lvl8pPr>
             <a:lvl9pPr>
-              <a:defRPr sz="900"/>
+              <a:defRPr sz="1800"/>
             </a:lvl9pPr>
           </a:lstStyle>
           <a:p>
@@ -1459,8 +1459,8 @@
         </p:nvSpPr>
         <p:spPr>
           <a:xfrm>
-            <a:off x="388620" y="614046"/>
-            <a:ext cx="3434160" cy="255905"/>
+            <a:off x="777240" y="1228091"/>
+            <a:ext cx="6868320" cy="511810"/>
           </a:xfrm>
         </p:spPr>
         <p:txBody>
@@ -1468,39 +1468,39 @@
           <a:lstStyle>
             <a:lvl1pPr marL="0" indent="0">
               <a:buNone/>
-              <a:defRPr sz="1200" b="1"/>
+              <a:defRPr sz="2400" b="1"/>
             </a:lvl1pPr>
-            <a:lvl2pPr marL="228600" indent="0">
-              <a:buNone/>
-              <a:defRPr sz="1000" b="1"/>
+            <a:lvl2pPr marL="457200" indent="0">
+              <a:buNone/>
+              <a:defRPr sz="2000" b="1"/>
             </a:lvl2pPr>
-            <a:lvl3pPr marL="457200" indent="0">
-              <a:buNone/>
-              <a:defRPr sz="900" b="1"/>
+            <a:lvl3pPr marL="914400" indent="0">
+              <a:buNone/>
+              <a:defRPr sz="1800" b="1"/>
             </a:lvl3pPr>
-            <a:lvl4pPr marL="685800" indent="0">
-              <a:buNone/>
-              <a:defRPr sz="800" b="1"/>
+            <a:lvl4pPr marL="1371600" indent="0">
+              <a:buNone/>
+              <a:defRPr sz="1600" b="1"/>
             </a:lvl4pPr>
-            <a:lvl5pPr marL="914400" indent="0">
-              <a:buNone/>
-              <a:defRPr sz="800" b="1"/>
+            <a:lvl5pPr marL="1828800" indent="0">
+              <a:buNone/>
+              <a:defRPr sz="1600" b="1"/>
             </a:lvl5pPr>
-            <a:lvl6pPr marL="1143000" indent="0">
-              <a:buNone/>
-              <a:defRPr sz="800" b="1"/>
+            <a:lvl6pPr marL="2286000" indent="0">
+              <a:buNone/>
+              <a:defRPr sz="1600" b="1"/>
             </a:lvl6pPr>
-            <a:lvl7pPr marL="1371600" indent="0">
-              <a:buNone/>
-              <a:defRPr sz="800" b="1"/>
+            <a:lvl7pPr marL="2743200" indent="0">
+              <a:buNone/>
+              <a:defRPr sz="1600" b="1"/>
             </a:lvl7pPr>
-            <a:lvl8pPr marL="1600200" indent="0">
-              <a:buNone/>
-              <a:defRPr sz="800" b="1"/>
+            <a:lvl8pPr marL="3200400" indent="0">
+              <a:buNone/>
+              <a:defRPr sz="1600" b="1"/>
             </a:lvl8pPr>
-            <a:lvl9pPr marL="1828800" indent="0">
-              <a:buNone/>
-              <a:defRPr sz="800" b="1"/>
+            <a:lvl9pPr marL="3657600" indent="0">
+              <a:buNone/>
+              <a:defRPr sz="1600" b="1"/>
             </a:lvl9pPr>
           </a:lstStyle>
           <a:p>
@@ -1524,39 +1524,39 @@
         </p:nvSpPr>
         <p:spPr>
           <a:xfrm>
-            <a:off x="388620" y="869950"/>
-            <a:ext cx="3434160" cy="1580515"/>
+            <a:off x="777240" y="1739901"/>
+            <a:ext cx="6868320" cy="3161030"/>
           </a:xfrm>
         </p:spPr>
         <p:txBody>
           <a:bodyPr/>
           <a:lstStyle>
             <a:lvl1pPr>
-              <a:defRPr sz="1200"/>
+              <a:defRPr sz="2400"/>
             </a:lvl1pPr>
             <a:lvl2pPr>
-              <a:defRPr sz="1000"/>
+              <a:defRPr sz="2000"/>
             </a:lvl2pPr>
             <a:lvl3pPr>
-              <a:defRPr sz="900"/>
+              <a:defRPr sz="1800"/>
             </a:lvl3pPr>
             <a:lvl4pPr>
-              <a:defRPr sz="800"/>
+              <a:defRPr sz="1600"/>
             </a:lvl4pPr>
             <a:lvl5pPr>
-              <a:defRPr sz="800"/>
+              <a:defRPr sz="1600"/>
             </a:lvl5pPr>
             <a:lvl6pPr>
-              <a:defRPr sz="800"/>
+              <a:defRPr sz="1600"/>
             </a:lvl6pPr>
             <a:lvl7pPr>
-              <a:defRPr sz="800"/>
+              <a:defRPr sz="1600"/>
             </a:lvl7pPr>
             <a:lvl8pPr>
-              <a:defRPr sz="800"/>
+              <a:defRPr sz="1600"/>
             </a:lvl8pPr>
             <a:lvl9pPr>
-              <a:defRPr sz="800"/>
+              <a:defRPr sz="1600"/>
             </a:lvl9pPr>
           </a:lstStyle>
           <a:p>
@@ -1609,8 +1609,8 @@
         </p:nvSpPr>
         <p:spPr>
           <a:xfrm>
-            <a:off x="3948274" y="614046"/>
-            <a:ext cx="3435509" cy="255905"/>
+            <a:off x="7896547" y="1228091"/>
+            <a:ext cx="6871018" cy="511810"/>
           </a:xfrm>
         </p:spPr>
         <p:txBody>
@@ -1618,39 +1618,39 @@
           <a:lstStyle>
             <a:lvl1pPr marL="0" indent="0">
               <a:buNone/>
-              <a:defRPr sz="1200" b="1"/>
+              <a:defRPr sz="2400" b="1"/>
             </a:lvl1pPr>
-            <a:lvl2pPr marL="228600" indent="0">
-              <a:buNone/>
-              <a:defRPr sz="1000" b="1"/>
+            <a:lvl2pPr marL="457200" indent="0">
+              <a:buNone/>
+              <a:defRPr sz="2000" b="1"/>
             </a:lvl2pPr>
-            <a:lvl3pPr marL="457200" indent="0">
-              <a:buNone/>
-              <a:defRPr sz="900" b="1"/>
+            <a:lvl3pPr marL="914400" indent="0">
+              <a:buNone/>
+              <a:defRPr sz="1800" b="1"/>
             </a:lvl3pPr>
-            <a:lvl4pPr marL="685800" indent="0">
-              <a:buNone/>
-              <a:defRPr sz="800" b="1"/>
+            <a:lvl4pPr marL="1371600" indent="0">
+              <a:buNone/>
+              <a:defRPr sz="1600" b="1"/>
             </a:lvl4pPr>
-            <a:lvl5pPr marL="914400" indent="0">
-              <a:buNone/>
-              <a:defRPr sz="800" b="1"/>
+            <a:lvl5pPr marL="1828800" indent="0">
+              <a:buNone/>
+              <a:defRPr sz="1600" b="1"/>
             </a:lvl5pPr>
-            <a:lvl6pPr marL="1143000" indent="0">
-              <a:buNone/>
-              <a:defRPr sz="800" b="1"/>
+            <a:lvl6pPr marL="2286000" indent="0">
+              <a:buNone/>
+              <a:defRPr sz="1600" b="1"/>
             </a:lvl6pPr>
-            <a:lvl7pPr marL="1371600" indent="0">
-              <a:buNone/>
-              <a:defRPr sz="800" b="1"/>
+            <a:lvl7pPr marL="2743200" indent="0">
+              <a:buNone/>
+              <a:defRPr sz="1600" b="1"/>
             </a:lvl7pPr>
-            <a:lvl8pPr marL="1600200" indent="0">
-              <a:buNone/>
-              <a:defRPr sz="800" b="1"/>
+            <a:lvl8pPr marL="3200400" indent="0">
+              <a:buNone/>
+              <a:defRPr sz="1600" b="1"/>
             </a:lvl8pPr>
-            <a:lvl9pPr marL="1828800" indent="0">
-              <a:buNone/>
-              <a:defRPr sz="800" b="1"/>
+            <a:lvl9pPr marL="3657600" indent="0">
+              <a:buNone/>
+              <a:defRPr sz="1600" b="1"/>
             </a:lvl9pPr>
           </a:lstStyle>
           <a:p>
@@ -1674,39 +1674,39 @@
         </p:nvSpPr>
         <p:spPr>
           <a:xfrm>
-            <a:off x="3948274" y="869950"/>
-            <a:ext cx="3435509" cy="1580515"/>
+            <a:off x="7896547" y="1739901"/>
+            <a:ext cx="6871018" cy="3161030"/>
           </a:xfrm>
         </p:spPr>
         <p:txBody>
           <a:bodyPr/>
           <a:lstStyle>
             <a:lvl1pPr>
-              <a:defRPr sz="1200"/>
+              <a:defRPr sz="2400"/>
             </a:lvl1pPr>
             <a:lvl2pPr>
-              <a:defRPr sz="1000"/>
+              <a:defRPr sz="2000"/>
             </a:lvl2pPr>
             <a:lvl3pPr>
-              <a:defRPr sz="900"/>
+              <a:defRPr sz="1800"/>
             </a:lvl3pPr>
             <a:lvl4pPr>
-              <a:defRPr sz="800"/>
+              <a:defRPr sz="1600"/>
             </a:lvl4pPr>
             <a:lvl5pPr>
-              <a:defRPr sz="800"/>
+              <a:defRPr sz="1600"/>
             </a:lvl5pPr>
             <a:lvl6pPr>
-              <a:defRPr sz="800"/>
+              <a:defRPr sz="1600"/>
             </a:lvl6pPr>
             <a:lvl7pPr>
-              <a:defRPr sz="800"/>
+              <a:defRPr sz="1600"/>
             </a:lvl7pPr>
             <a:lvl8pPr>
-              <a:defRPr sz="800"/>
+              <a:defRPr sz="1600"/>
             </a:lvl8pPr>
             <a:lvl9pPr>
-              <a:defRPr sz="800"/>
+              <a:defRPr sz="1600"/>
             </a:lvl9pPr>
           </a:lstStyle>
           <a:p>
@@ -2067,15 +2067,15 @@
         </p:nvSpPr>
         <p:spPr>
           <a:xfrm>
-            <a:off x="388622" y="109220"/>
-            <a:ext cx="2557067" cy="464820"/>
+            <a:off x="777244" y="218440"/>
+            <a:ext cx="5114133" cy="929640"/>
           </a:xfrm>
         </p:spPr>
         <p:txBody>
           <a:bodyPr anchor="b"/>
           <a:lstStyle>
             <a:lvl1pPr algn="l">
-              <a:defRPr sz="1000" b="1"/>
+              <a:defRPr sz="2000" b="1"/>
             </a:lvl1pPr>
           </a:lstStyle>
           <a:p>
@@ -2099,39 +2099,39 @@
         </p:nvSpPr>
         <p:spPr>
           <a:xfrm>
-            <a:off x="3038793" y="109221"/>
-            <a:ext cx="4344988" cy="2341245"/>
+            <a:off x="6077586" y="218441"/>
+            <a:ext cx="8689975" cy="4682490"/>
           </a:xfrm>
         </p:spPr>
         <p:txBody>
           <a:bodyPr/>
           <a:lstStyle>
             <a:lvl1pPr>
-              <a:defRPr sz="1600"/>
+              <a:defRPr sz="3200"/>
             </a:lvl1pPr>
             <a:lvl2pPr>
-              <a:defRPr sz="1400"/>
+              <a:defRPr sz="2800"/>
             </a:lvl2pPr>
             <a:lvl3pPr>
-              <a:defRPr sz="1200"/>
+              <a:defRPr sz="2400"/>
             </a:lvl3pPr>
             <a:lvl4pPr>
-              <a:defRPr sz="1000"/>
+              <a:defRPr sz="2000"/>
             </a:lvl4pPr>
             <a:lvl5pPr>
-              <a:defRPr sz="1000"/>
+              <a:defRPr sz="2000"/>
             </a:lvl5pPr>
             <a:lvl6pPr>
-              <a:defRPr sz="1000"/>
+              <a:defRPr sz="2000"/>
             </a:lvl6pPr>
             <a:lvl7pPr>
-              <a:defRPr sz="1000"/>
+              <a:defRPr sz="2000"/>
             </a:lvl7pPr>
             <a:lvl8pPr>
-              <a:defRPr sz="1000"/>
+              <a:defRPr sz="2000"/>
             </a:lvl8pPr>
             <a:lvl9pPr>
-              <a:defRPr sz="1000"/>
+              <a:defRPr sz="2000"/>
             </a:lvl9pPr>
           </a:lstStyle>
           <a:p>
@@ -2184,8 +2184,8 @@
         </p:nvSpPr>
         <p:spPr>
           <a:xfrm>
-            <a:off x="388622" y="574041"/>
-            <a:ext cx="2557067" cy="1876425"/>
+            <a:off x="777244" y="1148081"/>
+            <a:ext cx="5114133" cy="3752850"/>
           </a:xfrm>
         </p:spPr>
         <p:txBody>
@@ -2193,39 +2193,39 @@
           <a:lstStyle>
             <a:lvl1pPr marL="0" indent="0">
               <a:buNone/>
-              <a:defRPr sz="700"/>
+              <a:defRPr sz="1400"/>
             </a:lvl1pPr>
-            <a:lvl2pPr marL="228600" indent="0">
-              <a:buNone/>
-              <a:defRPr sz="600"/>
+            <a:lvl2pPr marL="457200" indent="0">
+              <a:buNone/>
+              <a:defRPr sz="1200"/>
             </a:lvl2pPr>
-            <a:lvl3pPr marL="457200" indent="0">
-              <a:buNone/>
-              <a:defRPr sz="500"/>
+            <a:lvl3pPr marL="914400" indent="0">
+              <a:buNone/>
+              <a:defRPr sz="1000"/>
             </a:lvl3pPr>
-            <a:lvl4pPr marL="685800" indent="0">
-              <a:buNone/>
-              <a:defRPr sz="500"/>
+            <a:lvl4pPr marL="1371600" indent="0">
+              <a:buNone/>
+              <a:defRPr sz="900"/>
             </a:lvl4pPr>
-            <a:lvl5pPr marL="914400" indent="0">
-              <a:buNone/>
-              <a:defRPr sz="500"/>
+            <a:lvl5pPr marL="1828800" indent="0">
+              <a:buNone/>
+              <a:defRPr sz="900"/>
             </a:lvl5pPr>
-            <a:lvl6pPr marL="1143000" indent="0">
-              <a:buNone/>
-              <a:defRPr sz="500"/>
+            <a:lvl6pPr marL="2286000" indent="0">
+              <a:buNone/>
+              <a:defRPr sz="900"/>
             </a:lvl6pPr>
-            <a:lvl7pPr marL="1371600" indent="0">
-              <a:buNone/>
-              <a:defRPr sz="500"/>
+            <a:lvl7pPr marL="2743200" indent="0">
+              <a:buNone/>
+              <a:defRPr sz="900"/>
             </a:lvl7pPr>
-            <a:lvl8pPr marL="1600200" indent="0">
-              <a:buNone/>
-              <a:defRPr sz="500"/>
+            <a:lvl8pPr marL="3200400" indent="0">
+              <a:buNone/>
+              <a:defRPr sz="900"/>
             </a:lvl8pPr>
-            <a:lvl9pPr marL="1828800" indent="0">
-              <a:buNone/>
-              <a:defRPr sz="500"/>
+            <a:lvl9pPr marL="3657600" indent="0">
+              <a:buNone/>
+              <a:defRPr sz="900"/>
             </a:lvl9pPr>
           </a:lstStyle>
           <a:p>
@@ -2344,15 +2344,15 @@
         </p:nvSpPr>
         <p:spPr>
           <a:xfrm>
-            <a:off x="1523445" y="1920241"/>
-            <a:ext cx="4663440" cy="226695"/>
+            <a:off x="3046890" y="3840481"/>
+            <a:ext cx="9326880" cy="453390"/>
           </a:xfrm>
         </p:spPr>
         <p:txBody>
           <a:bodyPr anchor="b"/>
           <a:lstStyle>
             <a:lvl1pPr algn="l">
-              <a:defRPr sz="1000" b="1"/>
+              <a:defRPr sz="2000" b="1"/>
             </a:lvl1pPr>
           </a:lstStyle>
           <a:p>
@@ -2376,8 +2376,8 @@
         </p:nvSpPr>
         <p:spPr>
           <a:xfrm>
-            <a:off x="1523445" y="245110"/>
-            <a:ext cx="4663440" cy="1645920"/>
+            <a:off x="3046890" y="490220"/>
+            <a:ext cx="9326880" cy="3291840"/>
           </a:xfrm>
         </p:spPr>
         <p:txBody>
@@ -2385,39 +2385,39 @@
           <a:lstStyle>
             <a:lvl1pPr marL="0" indent="0">
               <a:buNone/>
-              <a:defRPr sz="1600"/>
+              <a:defRPr sz="3200"/>
             </a:lvl1pPr>
-            <a:lvl2pPr marL="228600" indent="0">
-              <a:buNone/>
-              <a:defRPr sz="1400"/>
+            <a:lvl2pPr marL="457200" indent="0">
+              <a:buNone/>
+              <a:defRPr sz="2800"/>
             </a:lvl2pPr>
-            <a:lvl3pPr marL="457200" indent="0">
-              <a:buNone/>
-              <a:defRPr sz="1200"/>
+            <a:lvl3pPr marL="914400" indent="0">
+              <a:buNone/>
+              <a:defRPr sz="2400"/>
             </a:lvl3pPr>
-            <a:lvl4pPr marL="685800" indent="0">
-              <a:buNone/>
-              <a:defRPr sz="1000"/>
+            <a:lvl4pPr marL="1371600" indent="0">
+              <a:buNone/>
+              <a:defRPr sz="2000"/>
             </a:lvl4pPr>
-            <a:lvl5pPr marL="914400" indent="0">
-              <a:buNone/>
-              <a:defRPr sz="1000"/>
+            <a:lvl5pPr marL="1828800" indent="0">
+              <a:buNone/>
+              <a:defRPr sz="2000"/>
             </a:lvl5pPr>
-            <a:lvl6pPr marL="1143000" indent="0">
-              <a:buNone/>
-              <a:defRPr sz="1000"/>
+            <a:lvl6pPr marL="2286000" indent="0">
+              <a:buNone/>
+              <a:defRPr sz="2000"/>
             </a:lvl6pPr>
-            <a:lvl7pPr marL="1371600" indent="0">
-              <a:buNone/>
-              <a:defRPr sz="1000"/>
+            <a:lvl7pPr marL="2743200" indent="0">
+              <a:buNone/>
+              <a:defRPr sz="2000"/>
             </a:lvl7pPr>
-            <a:lvl8pPr marL="1600200" indent="0">
-              <a:buNone/>
-              <a:defRPr sz="1000"/>
+            <a:lvl8pPr marL="3200400" indent="0">
+              <a:buNone/>
+              <a:defRPr sz="2000"/>
             </a:lvl8pPr>
-            <a:lvl9pPr marL="1828800" indent="0">
-              <a:buNone/>
-              <a:defRPr sz="1000"/>
+            <a:lvl9pPr marL="3657600" indent="0">
+              <a:buNone/>
+              <a:defRPr sz="2000"/>
             </a:lvl9pPr>
           </a:lstStyle>
           <a:p>
@@ -2437,8 +2437,8 @@
         </p:nvSpPr>
         <p:spPr>
           <a:xfrm>
-            <a:off x="1523445" y="2146936"/>
-            <a:ext cx="4663440" cy="321945"/>
+            <a:off x="3046890" y="4293871"/>
+            <a:ext cx="9326880" cy="643890"/>
           </a:xfrm>
         </p:spPr>
         <p:txBody>
@@ -2446,39 +2446,39 @@
           <a:lstStyle>
             <a:lvl1pPr marL="0" indent="0">
               <a:buNone/>
-              <a:defRPr sz="700"/>
+              <a:defRPr sz="1400"/>
             </a:lvl1pPr>
-            <a:lvl2pPr marL="228600" indent="0">
-              <a:buNone/>
-              <a:defRPr sz="600"/>
+            <a:lvl2pPr marL="457200" indent="0">
+              <a:buNone/>
+              <a:defRPr sz="1200"/>
             </a:lvl2pPr>
-            <a:lvl3pPr marL="457200" indent="0">
-              <a:buNone/>
-              <a:defRPr sz="500"/>
+            <a:lvl3pPr marL="914400" indent="0">
+              <a:buNone/>
+              <a:defRPr sz="1000"/>
             </a:lvl3pPr>
-            <a:lvl4pPr marL="685800" indent="0">
-              <a:buNone/>
-              <a:defRPr sz="500"/>
+            <a:lvl4pPr marL="1371600" indent="0">
+              <a:buNone/>
+              <a:defRPr sz="900"/>
             </a:lvl4pPr>
-            <a:lvl5pPr marL="914400" indent="0">
-              <a:buNone/>
-              <a:defRPr sz="500"/>
+            <a:lvl5pPr marL="1828800" indent="0">
+              <a:buNone/>
+              <a:defRPr sz="900"/>
             </a:lvl5pPr>
-            <a:lvl6pPr marL="1143000" indent="0">
-              <a:buNone/>
-              <a:defRPr sz="500"/>
+            <a:lvl6pPr marL="2286000" indent="0">
+              <a:buNone/>
+              <a:defRPr sz="900"/>
             </a:lvl6pPr>
-            <a:lvl7pPr marL="1371600" indent="0">
-              <a:buNone/>
-              <a:defRPr sz="500"/>
+            <a:lvl7pPr marL="2743200" indent="0">
+              <a:buNone/>
+              <a:defRPr sz="900"/>
             </a:lvl7pPr>
-            <a:lvl8pPr marL="1600200" indent="0">
-              <a:buNone/>
-              <a:defRPr sz="500"/>
+            <a:lvl8pPr marL="3200400" indent="0">
+              <a:buNone/>
+              <a:defRPr sz="900"/>
             </a:lvl8pPr>
-            <a:lvl9pPr marL="1828800" indent="0">
-              <a:buNone/>
-              <a:defRPr sz="500"/>
+            <a:lvl9pPr marL="3657600" indent="0">
+              <a:buNone/>
+              <a:defRPr sz="900"/>
             </a:lvl9pPr>
           </a:lstStyle>
           <a:p>
@@ -2602,15 +2602,15 @@
         </p:nvSpPr>
         <p:spPr>
           <a:xfrm>
-            <a:off x="388620" y="109855"/>
-            <a:ext cx="6995160" cy="457200"/>
+            <a:off x="777240" y="219710"/>
+            <a:ext cx="13990320" cy="914400"/>
           </a:xfrm>
           <a:prstGeom prst="rect">
             <a:avLst/>
           </a:prstGeom>
         </p:spPr>
         <p:txBody>
-          <a:bodyPr vert="horz" lIns="45720" tIns="22860" rIns="45720" bIns="22860" rtlCol="0" anchor="ctr">
+          <a:bodyPr vert="horz" lIns="91440" tIns="45720" rIns="91440" bIns="45720" rtlCol="0" anchor="ctr">
             <a:normAutofit/>
           </a:bodyPr>
           <a:lstStyle/>
@@ -2635,15 +2635,15 @@
         </p:nvSpPr>
         <p:spPr>
           <a:xfrm>
-            <a:off x="388620" y="640080"/>
-            <a:ext cx="6995160" cy="1810386"/>
+            <a:off x="777240" y="1280161"/>
+            <a:ext cx="13990320" cy="3620771"/>
           </a:xfrm>
           <a:prstGeom prst="rect">
             <a:avLst/>
           </a:prstGeom>
         </p:spPr>
         <p:txBody>
-          <a:bodyPr vert="horz" lIns="45720" tIns="22860" rIns="45720" bIns="22860" rtlCol="0">
+          <a:bodyPr vert="horz" lIns="91440" tIns="45720" rIns="91440" bIns="45720" rtlCol="0">
             <a:normAutofit/>
           </a:bodyPr>
           <a:lstStyle/>
@@ -2697,18 +2697,18 @@
         </p:nvSpPr>
         <p:spPr>
           <a:xfrm>
-            <a:off x="388620" y="2542541"/>
-            <a:ext cx="1813560" cy="146050"/>
+            <a:off x="777240" y="5085081"/>
+            <a:ext cx="3627120" cy="292100"/>
           </a:xfrm>
           <a:prstGeom prst="rect">
             <a:avLst/>
           </a:prstGeom>
         </p:spPr>
         <p:txBody>
-          <a:bodyPr vert="horz" lIns="45720" tIns="22860" rIns="45720" bIns="22860" rtlCol="0" anchor="ctr"/>
+          <a:bodyPr vert="horz" lIns="91440" tIns="45720" rIns="91440" bIns="45720" rtlCol="0" anchor="ctr"/>
           <a:lstStyle>
             <a:lvl1pPr algn="l">
-              <a:defRPr sz="600">
+              <a:defRPr sz="1200">
                 <a:solidFill>
                   <a:schemeClr val="tx1">
                     <a:tint val="75000"/>
@@ -2738,18 +2738,18 @@
         </p:nvSpPr>
         <p:spPr>
           <a:xfrm>
-            <a:off x="2655570" y="2542541"/>
-            <a:ext cx="2461260" cy="146050"/>
+            <a:off x="5311140" y="5085081"/>
+            <a:ext cx="4922520" cy="292100"/>
           </a:xfrm>
           <a:prstGeom prst="rect">
             <a:avLst/>
           </a:prstGeom>
         </p:spPr>
         <p:txBody>
-          <a:bodyPr vert="horz" lIns="45720" tIns="22860" rIns="45720" bIns="22860" rtlCol="0" anchor="ctr"/>
+          <a:bodyPr vert="horz" lIns="91440" tIns="45720" rIns="91440" bIns="45720" rtlCol="0" anchor="ctr"/>
           <a:lstStyle>
             <a:lvl1pPr algn="ctr">
-              <a:defRPr sz="600">
+              <a:defRPr sz="1200">
                 <a:solidFill>
                   <a:schemeClr val="tx1">
                     <a:tint val="75000"/>
@@ -2775,18 +2775,18 @@
         </p:nvSpPr>
         <p:spPr>
           <a:xfrm>
-            <a:off x="5570220" y="2542541"/>
-            <a:ext cx="1813560" cy="146050"/>
+            <a:off x="11140440" y="5085081"/>
+            <a:ext cx="3627120" cy="292100"/>
           </a:xfrm>
           <a:prstGeom prst="rect">
             <a:avLst/>
           </a:prstGeom>
         </p:spPr>
         <p:txBody>
-          <a:bodyPr vert="horz" lIns="45720" tIns="22860" rIns="45720" bIns="22860" rtlCol="0" anchor="ctr"/>
+          <a:bodyPr vert="horz" lIns="91440" tIns="45720" rIns="91440" bIns="45720" rtlCol="0" anchor="ctr"/>
           <a:lstStyle>
             <a:lvl1pPr algn="r">
-              <a:defRPr sz="600">
+              <a:defRPr sz="1200">
                 <a:solidFill>
                   <a:schemeClr val="tx1">
                     <a:tint val="75000"/>
@@ -2827,12 +2827,12 @@
   </p:sldLayoutIdLst>
   <p:txStyles>
     <p:titleStyle>
-      <a:lvl1pPr algn="ctr" defTabSz="228600" rtl="0" eaLnBrk="1" latinLnBrk="0" hangingPunct="1">
+      <a:lvl1pPr algn="ctr" defTabSz="457200" rtl="0" eaLnBrk="1" latinLnBrk="0" hangingPunct="1">
         <a:spcBef>
           <a:spcPct val="0"/>
         </a:spcBef>
         <a:buNone/>
-        <a:defRPr sz="2200" kern="1200">
+        <a:defRPr sz="4400" kern="1200">
           <a:solidFill>
             <a:schemeClr val="tx1"/>
           </a:solidFill>
@@ -2843,13 +2843,13 @@
       </a:lvl1pPr>
     </p:titleStyle>
     <p:bodyStyle>
-      <a:lvl1pPr marL="171450" indent="-171450" algn="l" defTabSz="228600" rtl="0" eaLnBrk="1" latinLnBrk="0" hangingPunct="1">
+      <a:lvl1pPr marL="342900" indent="-342900" algn="l" defTabSz="457200" rtl="0" eaLnBrk="1" latinLnBrk="0" hangingPunct="1">
         <a:spcBef>
           <a:spcPct val="20000"/>
         </a:spcBef>
         <a:buFont typeface="Arial"/>
         <a:buChar char="•"/>
-        <a:defRPr sz="1600" kern="1200">
+        <a:defRPr sz="3200" kern="1200">
           <a:solidFill>
             <a:schemeClr val="tx1"/>
           </a:solidFill>
@@ -2858,13 +2858,13 @@
           <a:cs typeface="+mn-cs"/>
         </a:defRPr>
       </a:lvl1pPr>
-      <a:lvl2pPr marL="371475" indent="-142875" algn="l" defTabSz="228600" rtl="0" eaLnBrk="1" latinLnBrk="0" hangingPunct="1">
+      <a:lvl2pPr marL="742950" indent="-285750" algn="l" defTabSz="457200" rtl="0" eaLnBrk="1" latinLnBrk="0" hangingPunct="1">
         <a:spcBef>
           <a:spcPct val="20000"/>
         </a:spcBef>
         <a:buFont typeface="Arial"/>
         <a:buChar char="–"/>
-        <a:defRPr sz="1400" kern="1200">
+        <a:defRPr sz="2800" kern="1200">
           <a:solidFill>
             <a:schemeClr val="tx1"/>
           </a:solidFill>
@@ -2873,13 +2873,13 @@
           <a:cs typeface="+mn-cs"/>
         </a:defRPr>
       </a:lvl2pPr>
-      <a:lvl3pPr marL="571500" indent="-114300" algn="l" defTabSz="228600" rtl="0" eaLnBrk="1" latinLnBrk="0" hangingPunct="1">
+      <a:lvl3pPr marL="1143000" indent="-228600" algn="l" defTabSz="457200" rtl="0" eaLnBrk="1" latinLnBrk="0" hangingPunct="1">
         <a:spcBef>
           <a:spcPct val="20000"/>
         </a:spcBef>
         <a:buFont typeface="Arial"/>
         <a:buChar char="•"/>
-        <a:defRPr sz="1200" kern="1200">
+        <a:defRPr sz="2400" kern="1200">
           <a:solidFill>
             <a:schemeClr val="tx1"/>
           </a:solidFill>
@@ -2888,13 +2888,13 @@
           <a:cs typeface="+mn-cs"/>
         </a:defRPr>
       </a:lvl3pPr>
-      <a:lvl4pPr marL="800100" indent="-114300" algn="l" defTabSz="228600" rtl="0" eaLnBrk="1" latinLnBrk="0" hangingPunct="1">
+      <a:lvl4pPr marL="1600200" indent="-228600" algn="l" defTabSz="457200" rtl="0" eaLnBrk="1" latinLnBrk="0" hangingPunct="1">
         <a:spcBef>
           <a:spcPct val="20000"/>
         </a:spcBef>
         <a:buFont typeface="Arial"/>
         <a:buChar char="–"/>
-        <a:defRPr sz="1000" kern="1200">
+        <a:defRPr sz="2000" kern="1200">
           <a:solidFill>
             <a:schemeClr val="tx1"/>
           </a:solidFill>
@@ -2903,13 +2903,13 @@
           <a:cs typeface="+mn-cs"/>
         </a:defRPr>
       </a:lvl4pPr>
-      <a:lvl5pPr marL="1028700" indent="-114300" algn="l" defTabSz="228600" rtl="0" eaLnBrk="1" latinLnBrk="0" hangingPunct="1">
+      <a:lvl5pPr marL="2057400" indent="-228600" algn="l" defTabSz="457200" rtl="0" eaLnBrk="1" latinLnBrk="0" hangingPunct="1">
         <a:spcBef>
           <a:spcPct val="20000"/>
         </a:spcBef>
         <a:buFont typeface="Arial"/>
         <a:buChar char="»"/>
-        <a:defRPr sz="1000" kern="1200">
+        <a:defRPr sz="2000" kern="1200">
           <a:solidFill>
             <a:schemeClr val="tx1"/>
           </a:solidFill>
@@ -2918,13 +2918,13 @@
           <a:cs typeface="+mn-cs"/>
         </a:defRPr>
       </a:lvl5pPr>
-      <a:lvl6pPr marL="1257300" indent="-114300" algn="l" defTabSz="228600" rtl="0" eaLnBrk="1" latinLnBrk="0" hangingPunct="1">
+      <a:lvl6pPr marL="2514600" indent="-228600" algn="l" defTabSz="457200" rtl="0" eaLnBrk="1" latinLnBrk="0" hangingPunct="1">
         <a:spcBef>
           <a:spcPct val="20000"/>
         </a:spcBef>
         <a:buFont typeface="Arial"/>
         <a:buChar char="•"/>
-        <a:defRPr sz="1000" kern="1200">
+        <a:defRPr sz="2000" kern="1200">
           <a:solidFill>
             <a:schemeClr val="tx1"/>
           </a:solidFill>
@@ -2933,13 +2933,13 @@
           <a:cs typeface="+mn-cs"/>
         </a:defRPr>
       </a:lvl6pPr>
-      <a:lvl7pPr marL="1485900" indent="-114300" algn="l" defTabSz="228600" rtl="0" eaLnBrk="1" latinLnBrk="0" hangingPunct="1">
+      <a:lvl7pPr marL="2971800" indent="-228600" algn="l" defTabSz="457200" rtl="0" eaLnBrk="1" latinLnBrk="0" hangingPunct="1">
         <a:spcBef>
           <a:spcPct val="20000"/>
         </a:spcBef>
         <a:buFont typeface="Arial"/>
         <a:buChar char="•"/>
-        <a:defRPr sz="1000" kern="1200">
+        <a:defRPr sz="2000" kern="1200">
           <a:solidFill>
             <a:schemeClr val="tx1"/>
           </a:solidFill>
@@ -2948,13 +2948,13 @@
           <a:cs typeface="+mn-cs"/>
         </a:defRPr>
       </a:lvl7pPr>
-      <a:lvl8pPr marL="1714500" indent="-114300" algn="l" defTabSz="228600" rtl="0" eaLnBrk="1" latinLnBrk="0" hangingPunct="1">
+      <a:lvl8pPr marL="3429000" indent="-228600" algn="l" defTabSz="457200" rtl="0" eaLnBrk="1" latinLnBrk="0" hangingPunct="1">
         <a:spcBef>
           <a:spcPct val="20000"/>
         </a:spcBef>
         <a:buFont typeface="Arial"/>
         <a:buChar char="•"/>
-        <a:defRPr sz="1000" kern="1200">
+        <a:defRPr sz="2000" kern="1200">
           <a:solidFill>
             <a:schemeClr val="tx1"/>
           </a:solidFill>
@@ -2963,13 +2963,13 @@
           <a:cs typeface="+mn-cs"/>
         </a:defRPr>
       </a:lvl8pPr>
-      <a:lvl9pPr marL="1943100" indent="-114300" algn="l" defTabSz="228600" rtl="0" eaLnBrk="1" latinLnBrk="0" hangingPunct="1">
+      <a:lvl9pPr marL="3886200" indent="-228600" algn="l" defTabSz="457200" rtl="0" eaLnBrk="1" latinLnBrk="0" hangingPunct="1">
         <a:spcBef>
           <a:spcPct val="20000"/>
         </a:spcBef>
         <a:buFont typeface="Arial"/>
         <a:buChar char="•"/>
-        <a:defRPr sz="1000" kern="1200">
+        <a:defRPr sz="2000" kern="1200">
           <a:solidFill>
             <a:schemeClr val="tx1"/>
           </a:solidFill>
@@ -2983,8 +2983,8 @@
       <a:defPPr>
         <a:defRPr lang="en-US"/>
       </a:defPPr>
-      <a:lvl1pPr marL="0" algn="l" defTabSz="228600" rtl="0" eaLnBrk="1" latinLnBrk="0" hangingPunct="1">
-        <a:defRPr sz="900" kern="1200">
+      <a:lvl1pPr marL="0" algn="l" defTabSz="457200" rtl="0" eaLnBrk="1" latinLnBrk="0" hangingPunct="1">
+        <a:defRPr sz="1800" kern="1200">
           <a:solidFill>
             <a:schemeClr val="tx1"/>
           </a:solidFill>
@@ -2993,8 +2993,8 @@
           <a:cs typeface="+mn-cs"/>
         </a:defRPr>
       </a:lvl1pPr>
-      <a:lvl2pPr marL="228600" algn="l" defTabSz="228600" rtl="0" eaLnBrk="1" latinLnBrk="0" hangingPunct="1">
-        <a:defRPr sz="900" kern="1200">
+      <a:lvl2pPr marL="457200" algn="l" defTabSz="457200" rtl="0" eaLnBrk="1" latinLnBrk="0" hangingPunct="1">
+        <a:defRPr sz="1800" kern="1200">
           <a:solidFill>
             <a:schemeClr val="tx1"/>
           </a:solidFill>
@@ -3003,8 +3003,8 @@
           <a:cs typeface="+mn-cs"/>
         </a:defRPr>
       </a:lvl2pPr>
-      <a:lvl3pPr marL="457200" algn="l" defTabSz="228600" rtl="0" eaLnBrk="1" latinLnBrk="0" hangingPunct="1">
-        <a:defRPr sz="900" kern="1200">
+      <a:lvl3pPr marL="914400" algn="l" defTabSz="457200" rtl="0" eaLnBrk="1" latinLnBrk="0" hangingPunct="1">
+        <a:defRPr sz="1800" kern="1200">
           <a:solidFill>
             <a:schemeClr val="tx1"/>
           </a:solidFill>
@@ -3013,8 +3013,8 @@
           <a:cs typeface="+mn-cs"/>
         </a:defRPr>
       </a:lvl3pPr>
-      <a:lvl4pPr marL="685800" algn="l" defTabSz="228600" rtl="0" eaLnBrk="1" latinLnBrk="0" hangingPunct="1">
-        <a:defRPr sz="900" kern="1200">
+      <a:lvl4pPr marL="1371600" algn="l" defTabSz="457200" rtl="0" eaLnBrk="1" latinLnBrk="0" hangingPunct="1">
+        <a:defRPr sz="1800" kern="1200">
           <a:solidFill>
             <a:schemeClr val="tx1"/>
           </a:solidFill>
@@ -3023,8 +3023,8 @@
           <a:cs typeface="+mn-cs"/>
         </a:defRPr>
       </a:lvl4pPr>
-      <a:lvl5pPr marL="914400" algn="l" defTabSz="228600" rtl="0" eaLnBrk="1" latinLnBrk="0" hangingPunct="1">
-        <a:defRPr sz="900" kern="1200">
+      <a:lvl5pPr marL="1828800" algn="l" defTabSz="457200" rtl="0" eaLnBrk="1" latinLnBrk="0" hangingPunct="1">
+        <a:defRPr sz="1800" kern="1200">
           <a:solidFill>
             <a:schemeClr val="tx1"/>
           </a:solidFill>
@@ -3033,8 +3033,8 @@
           <a:cs typeface="+mn-cs"/>
         </a:defRPr>
       </a:lvl5pPr>
-      <a:lvl6pPr marL="1143000" algn="l" defTabSz="228600" rtl="0" eaLnBrk="1" latinLnBrk="0" hangingPunct="1">
-        <a:defRPr sz="900" kern="1200">
+      <a:lvl6pPr marL="2286000" algn="l" defTabSz="457200" rtl="0" eaLnBrk="1" latinLnBrk="0" hangingPunct="1">
+        <a:defRPr sz="1800" kern="1200">
           <a:solidFill>
             <a:schemeClr val="tx1"/>
           </a:solidFill>
@@ -3043,8 +3043,8 @@
           <a:cs typeface="+mn-cs"/>
         </a:defRPr>
       </a:lvl6pPr>
-      <a:lvl7pPr marL="1371600" algn="l" defTabSz="228600" rtl="0" eaLnBrk="1" latinLnBrk="0" hangingPunct="1">
-        <a:defRPr sz="900" kern="1200">
+      <a:lvl7pPr marL="2743200" algn="l" defTabSz="457200" rtl="0" eaLnBrk="1" latinLnBrk="0" hangingPunct="1">
+        <a:defRPr sz="1800" kern="1200">
           <a:solidFill>
             <a:schemeClr val="tx1"/>
           </a:solidFill>
@@ -3053,8 +3053,8 @@
           <a:cs typeface="+mn-cs"/>
         </a:defRPr>
       </a:lvl7pPr>
-      <a:lvl8pPr marL="1600200" algn="l" defTabSz="228600" rtl="0" eaLnBrk="1" latinLnBrk="0" hangingPunct="1">
-        <a:defRPr sz="900" kern="1200">
+      <a:lvl8pPr marL="3200400" algn="l" defTabSz="457200" rtl="0" eaLnBrk="1" latinLnBrk="0" hangingPunct="1">
+        <a:defRPr sz="1800" kern="1200">
           <a:solidFill>
             <a:schemeClr val="tx1"/>
           </a:solidFill>
@@ -3063,8 +3063,8 @@
           <a:cs typeface="+mn-cs"/>
         </a:defRPr>
       </a:lvl8pPr>
-      <a:lvl9pPr marL="1828800" algn="l" defTabSz="228600" rtl="0" eaLnBrk="1" latinLnBrk="0" hangingPunct="1">
-        <a:defRPr sz="900" kern="1200">
+      <a:lvl9pPr marL="3657600" algn="l" defTabSz="457200" rtl="0" eaLnBrk="1" latinLnBrk="0" hangingPunct="1">
+        <a:defRPr sz="1800" kern="1200">
           <a:solidFill>
             <a:schemeClr val="tx1"/>
           </a:solidFill>
@@ -3104,21 +3104,15 @@
           <p:nvPr/>
         </p:nvPicPr>
         <p:blipFill>
-          <a:blip r:embed="rId3" cstate="email">
-            <a:extLst>
-              <a:ext uri="{28A0092B-C50C-407E-A947-70E740481C1C}">
-                <a14:useLocalDpi xmlns:a14="http://schemas.microsoft.com/office/drawing/2010/main"/>
-              </a:ext>
-            </a:extLst>
-          </a:blip>
+          <a:blip r:embed="rId3"/>
           <a:stretch>
             <a:fillRect/>
           </a:stretch>
         </p:blipFill>
         <p:spPr>
           <a:xfrm>
-            <a:off x="-39475" y="42339"/>
-            <a:ext cx="2571429" cy="2571429"/>
+            <a:off x="-78950" y="84678"/>
+            <a:ext cx="5142857" cy="5142857"/>
           </a:xfrm>
           <a:prstGeom prst="rect">
             <a:avLst/>
@@ -3133,8 +3127,8 @@
         </p:nvCxnSpPr>
         <p:spPr>
           <a:xfrm>
-            <a:off x="2016652" y="556296"/>
-            <a:ext cx="1285875" cy="1291167"/>
+            <a:off x="4033303" y="1112592"/>
+            <a:ext cx="2571750" cy="2582333"/>
           </a:xfrm>
           <a:prstGeom prst="line">
             <a:avLst/>
@@ -3169,8 +3163,8 @@
         </p:nvCxnSpPr>
         <p:spPr>
           <a:xfrm>
-            <a:off x="2249615" y="965871"/>
-            <a:ext cx="1285875" cy="1291167"/>
+            <a:off x="4499230" y="1931742"/>
+            <a:ext cx="2571750" cy="2582333"/>
           </a:xfrm>
           <a:prstGeom prst="line">
             <a:avLst/>
@@ -3205,8 +3199,8 @@
         </p:nvCxnSpPr>
         <p:spPr>
           <a:xfrm>
-            <a:off x="2156212" y="1470937"/>
-            <a:ext cx="1285875" cy="1291167"/>
+            <a:off x="4312424" y="2941873"/>
+            <a:ext cx="2571750" cy="2582333"/>
           </a:xfrm>
           <a:prstGeom prst="line">
             <a:avLst/>
@@ -3241,8 +3235,8 @@
         </p:nvCxnSpPr>
         <p:spPr>
           <a:xfrm>
-            <a:off x="1763710" y="1844288"/>
-            <a:ext cx="1285875" cy="1291167"/>
+            <a:off x="3527420" y="3688575"/>
+            <a:ext cx="2571750" cy="2582333"/>
           </a:xfrm>
           <a:prstGeom prst="line">
             <a:avLst/>
@@ -3277,8 +3271,8 @@
         </p:nvCxnSpPr>
         <p:spPr>
           <a:xfrm>
-            <a:off x="1382710" y="2225288"/>
-            <a:ext cx="1285875" cy="1291167"/>
+            <a:off x="2765420" y="4450575"/>
+            <a:ext cx="2571750" cy="2582333"/>
           </a:xfrm>
           <a:prstGeom prst="line">
             <a:avLst/>
@@ -3313,8 +3307,8 @@
         </p:nvSpPr>
         <p:spPr>
           <a:xfrm rot="2708122">
-            <a:off x="2190638" y="1654318"/>
-            <a:ext cx="1500182" cy="1828163"/>
+            <a:off x="4381275" y="3308635"/>
+            <a:ext cx="3000364" cy="3656325"/>
           </a:xfrm>
           <a:prstGeom prst="rect">
             <a:avLst/>
@@ -3342,7 +3336,7 @@
           </a:fontRef>
         </p:style>
         <p:txBody>
-          <a:bodyPr lIns="45720" tIns="22860" rIns="45720" bIns="22860" rtlCol="0" anchor="ctr"/>
+          <a:bodyPr rtlCol="0" anchor="ctr"/>
           <a:lstStyle/>
           <a:p>
             <a:pPr algn="ctr"/>
@@ -3358,8 +3352,8 @@
         </p:nvCxnSpPr>
         <p:spPr>
           <a:xfrm flipV="1">
-            <a:off x="2414119" y="1336179"/>
-            <a:ext cx="374712" cy="365625"/>
+            <a:off x="4828238" y="2672358"/>
+            <a:ext cx="749423" cy="731249"/>
           </a:xfrm>
           <a:prstGeom prst="straightConnector1">
             <a:avLst/>
@@ -3395,8 +3389,8 @@
         </p:nvCxnSpPr>
         <p:spPr>
           <a:xfrm flipV="1">
-            <a:off x="2590051" y="1229567"/>
-            <a:ext cx="109262" cy="106612"/>
+            <a:off x="5180101" y="2459134"/>
+            <a:ext cx="218524" cy="213224"/>
           </a:xfrm>
           <a:prstGeom prst="straightConnector1">
             <a:avLst/>
@@ -3432,8 +3426,8 @@
         </p:nvCxnSpPr>
         <p:spPr>
           <a:xfrm flipV="1">
-            <a:off x="2128068" y="1442791"/>
-            <a:ext cx="779546" cy="760600"/>
+            <a:off x="4256136" y="2885582"/>
+            <a:ext cx="1559091" cy="1521200"/>
           </a:xfrm>
           <a:prstGeom prst="straightConnector1">
             <a:avLst/>
@@ -3469,8 +3463,8 @@
         </p:nvCxnSpPr>
         <p:spPr>
           <a:xfrm flipV="1">
-            <a:off x="1829380" y="1486084"/>
-            <a:ext cx="1134534" cy="1121228"/>
+            <a:off x="3658760" y="2972167"/>
+            <a:ext cx="2269067" cy="2242456"/>
           </a:xfrm>
           <a:prstGeom prst="straightConnector1">
             <a:avLst/>
@@ -3506,8 +3500,8 @@
         </p:nvSpPr>
         <p:spPr>
           <a:xfrm rot="2811792">
-            <a:off x="2479022" y="1067718"/>
-            <a:ext cx="462492" cy="184666"/>
+            <a:off x="4958043" y="2135436"/>
+            <a:ext cx="924983" cy="369332"/>
           </a:xfrm>
           <a:prstGeom prst="rect">
             <a:avLst/>
@@ -3515,7 +3509,7 @@
           <a:noFill/>
         </p:spPr>
         <p:txBody>
-          <a:bodyPr wrap="square" lIns="45720" tIns="22860" rIns="45720" bIns="22860" rtlCol="0">
+          <a:bodyPr wrap="square" rtlCol="0">
             <a:spAutoFit/>
           </a:bodyPr>
           <a:lstStyle/>
@@ -3540,8 +3534,8 @@
         </p:nvSpPr>
         <p:spPr>
           <a:xfrm rot="2811792">
-            <a:off x="2547520" y="1930292"/>
-            <a:ext cx="381127" cy="184666"/>
+            <a:off x="5095040" y="3860583"/>
+            <a:ext cx="762254" cy="369332"/>
           </a:xfrm>
           <a:prstGeom prst="rect">
             <a:avLst/>
@@ -3549,7 +3543,7 @@
           <a:noFill/>
         </p:spPr>
         <p:txBody>
-          <a:bodyPr wrap="square" lIns="45720" tIns="22860" rIns="45720" bIns="22860" rtlCol="0">
+          <a:bodyPr wrap="square" rtlCol="0">
             <a:spAutoFit/>
           </a:bodyPr>
           <a:lstStyle/>
@@ -3574,8 +3568,8 @@
         </p:nvSpPr>
         <p:spPr>
           <a:xfrm rot="2811792">
-            <a:off x="2150456" y="2341716"/>
-            <a:ext cx="462492" cy="184666"/>
+            <a:off x="4300912" y="4683431"/>
+            <a:ext cx="924983" cy="369332"/>
           </a:xfrm>
           <a:prstGeom prst="rect">
             <a:avLst/>
@@ -3583,7 +3577,7 @@
           <a:noFill/>
         </p:spPr>
         <p:txBody>
-          <a:bodyPr wrap="square" lIns="45720" tIns="22860" rIns="45720" bIns="22860" rtlCol="0">
+          <a:bodyPr wrap="square" rtlCol="0">
             <a:spAutoFit/>
           </a:bodyPr>
           <a:lstStyle/>
@@ -3608,8 +3602,8 @@
         </p:nvSpPr>
         <p:spPr>
           <a:xfrm rot="2811792">
-            <a:off x="1910354" y="2572731"/>
-            <a:ext cx="462492" cy="184666"/>
+            <a:off x="3820708" y="5145461"/>
+            <a:ext cx="924983" cy="369332"/>
           </a:xfrm>
           <a:prstGeom prst="rect">
             <a:avLst/>
@@ -3617,7 +3611,7 @@
           <a:noFill/>
         </p:spPr>
         <p:txBody>
-          <a:bodyPr wrap="square" lIns="45720" tIns="22860" rIns="45720" bIns="22860" rtlCol="0">
+          <a:bodyPr wrap="square" rtlCol="0">
             <a:spAutoFit/>
           </a:bodyPr>
           <a:lstStyle/>
@@ -3642,15 +3636,15 @@
         </p:nvSpPr>
         <p:spPr>
           <a:xfrm>
-            <a:off x="1492347" y="1063388"/>
-            <a:ext cx="450981" cy="184666"/>
+            <a:off x="2984694" y="2126775"/>
+            <a:ext cx="901961" cy="369332"/>
           </a:xfrm>
           <a:prstGeom prst="rect">
             <a:avLst/>
           </a:prstGeom>
         </p:spPr>
         <p:txBody>
-          <a:bodyPr wrap="square" lIns="45720" tIns="22860" rIns="45720" bIns="22860">
+          <a:bodyPr wrap="square">
             <a:spAutoFit/>
           </a:bodyPr>
           <a:lstStyle/>
@@ -3685,8 +3679,8 @@
         </p:nvSpPr>
         <p:spPr>
           <a:xfrm rot="8316779" flipH="1">
-            <a:off x="989128" y="792652"/>
-            <a:ext cx="698923" cy="794808"/>
+            <a:off x="1978256" y="1585304"/>
+            <a:ext cx="1397845" cy="1589615"/>
           </a:xfrm>
           <a:prstGeom prst="circularArrow">
             <a:avLst>
@@ -3719,7 +3713,7 @@
           </a:fontRef>
         </p:style>
         <p:txBody>
-          <a:bodyPr lIns="45720" tIns="22860" rIns="45720" bIns="22860" rtlCol="0" anchor="ctr"/>
+          <a:bodyPr rtlCol="0" anchor="ctr"/>
           <a:lstStyle/>
           <a:p>
             <a:pPr algn="ctr"/>
@@ -3739,8 +3733,8 @@
         </p:nvCxnSpPr>
         <p:spPr>
           <a:xfrm>
-            <a:off x="1326445" y="1243045"/>
-            <a:ext cx="616883" cy="0"/>
+            <a:off x="2652889" y="2486090"/>
+            <a:ext cx="1233766" cy="0"/>
           </a:xfrm>
           <a:prstGeom prst="line">
             <a:avLst/>
@@ -3775,8 +3769,8 @@
         </p:nvGrpSpPr>
         <p:grpSpPr>
           <a:xfrm>
-            <a:off x="3201797" y="37246"/>
-            <a:ext cx="1532241" cy="1505879"/>
+            <a:off x="6403594" y="74492"/>
+            <a:ext cx="3064481" cy="3011757"/>
             <a:chOff x="6721074" y="74492"/>
             <a:chExt cx="3064481" cy="3011757"/>
           </a:xfrm>
@@ -3895,8 +3889,8 @@
           </p:nvSpPr>
           <p:spPr>
             <a:xfrm rot="18859671">
-              <a:off x="6854118" y="1468928"/>
-              <a:ext cx="1957051" cy="461664"/>
+              <a:off x="6854118" y="1515094"/>
+              <a:ext cx="1957052" cy="369332"/>
             </a:xfrm>
             <a:prstGeom prst="rect">
               <a:avLst/>
@@ -3926,8 +3920,8 @@
         </p:nvSpPr>
         <p:spPr>
           <a:xfrm>
-            <a:off x="5171440" y="965871"/>
-            <a:ext cx="538480" cy="184666"/>
+            <a:off x="10342880" y="1931742"/>
+            <a:ext cx="1076960" cy="369332"/>
           </a:xfrm>
           <a:prstGeom prst="rect">
             <a:avLst/>
@@ -3935,7 +3929,7 @@
           <a:noFill/>
         </p:spPr>
         <p:txBody>
-          <a:bodyPr wrap="square" lIns="45720" tIns="22860" rIns="45720" bIns="22860" rtlCol="0">
+          <a:bodyPr wrap="square" rtlCol="0">
             <a:spAutoFit/>
           </a:bodyPr>
           <a:lstStyle/>
@@ -3959,14 +3953,14 @@
           </p:nvPr>
         </p:nvGraphicFramePr>
         <p:xfrm>
-          <a:off x="5690870" y="1774032"/>
-          <a:ext cx="274638" cy="274638"/>
+          <a:off x="11381740" y="3548063"/>
+          <a:ext cx="549275" cy="549275"/>
         </p:xfrm>
         <a:graphic>
           <a:graphicData uri="http://schemas.openxmlformats.org/presentationml/2006/ole">
             <mc:AlternateContent xmlns:mc="http://schemas.openxmlformats.org/markup-compatibility/2006">
               <mc:Choice xmlns:v="urn:schemas-microsoft-com:vml" Requires="v">
-                <p:oleObj spid="_x0000_s1078" name="Equation" r:id="rId6" imgW="228600" imgH="228600" progId="Equation.3">
+                <p:oleObj spid="_x0000_s1060" name="Equation" r:id="rId6" imgW="228600" imgH="228600" progId="Equation.3">
                   <p:embed/>
                 </p:oleObj>
               </mc:Choice>
@@ -3987,8 +3981,8 @@
                     </p:blipFill>
                     <p:spPr>
                       <a:xfrm>
-                        <a:off x="5690870" y="1774032"/>
-                        <a:ext cx="274638" cy="274638"/>
+                        <a:off x="11381740" y="3548063"/>
+                        <a:ext cx="549275" cy="549275"/>
                       </a:xfrm>
                       <a:prstGeom prst="rect">
                         <a:avLst/>
@@ -4016,14 +4010,14 @@
           </p:nvPr>
         </p:nvGraphicFramePr>
         <p:xfrm>
-          <a:off x="5704682" y="42069"/>
-          <a:ext cx="290513" cy="274638"/>
+          <a:off x="11409363" y="84138"/>
+          <a:ext cx="581025" cy="549275"/>
         </p:xfrm>
         <a:graphic>
           <a:graphicData uri="http://schemas.openxmlformats.org/presentationml/2006/ole">
             <mc:AlternateContent xmlns:mc="http://schemas.openxmlformats.org/markup-compatibility/2006">
               <mc:Choice xmlns:v="urn:schemas-microsoft-com:vml" Requires="v">
-                <p:oleObj spid="_x0000_s1079" name="Equation" r:id="rId8" imgW="241300" imgH="228600" progId="Equation.3">
+                <p:oleObj spid="_x0000_s1061" name="Equation" r:id="rId8" imgW="241300" imgH="228600" progId="Equation.3">
                   <p:embed/>
                 </p:oleObj>
               </mc:Choice>
@@ -4044,8 +4038,8 @@
                     </p:blipFill>
                     <p:spPr>
                       <a:xfrm>
-                        <a:off x="5704682" y="42069"/>
-                        <a:ext cx="290513" cy="274638"/>
+                        <a:off x="11409363" y="84138"/>
+                        <a:ext cx="581025" cy="549275"/>
                       </a:xfrm>
                       <a:prstGeom prst="rect">
                         <a:avLst/>
@@ -4073,14 +4067,14 @@
           </p:nvPr>
         </p:nvGraphicFramePr>
         <p:xfrm>
-          <a:off x="3240660" y="1409633"/>
-          <a:ext cx="244030" cy="289786"/>
+          <a:off x="6481320" y="2819267"/>
+          <a:ext cx="488060" cy="579571"/>
         </p:xfrm>
         <a:graphic>
           <a:graphicData uri="http://schemas.openxmlformats.org/presentationml/2006/ole">
             <mc:AlternateContent xmlns:mc="http://schemas.openxmlformats.org/markup-compatibility/2006">
               <mc:Choice xmlns:v="urn:schemas-microsoft-com:vml" Requires="v">
-                <p:oleObj spid="_x0000_s1080" name="Equation" r:id="rId10" imgW="203200" imgH="241300" progId="Equation.3">
+                <p:oleObj spid="_x0000_s1062" name="Equation" r:id="rId10" imgW="203200" imgH="241300" progId="Equation.3">
                   <p:embed/>
                 </p:oleObj>
               </mc:Choice>
@@ -4101,8 +4095,8 @@
                     </p:blipFill>
                     <p:spPr>
                       <a:xfrm>
-                        <a:off x="3240660" y="1409633"/>
-                        <a:ext cx="244030" cy="289786"/>
+                        <a:off x="6481320" y="2819267"/>
+                        <a:ext cx="488060" cy="579571"/>
                       </a:xfrm>
                       <a:prstGeom prst="rect">
                         <a:avLst/>
@@ -4130,14 +4124,14 @@
           </p:nvPr>
         </p:nvGraphicFramePr>
         <p:xfrm>
-          <a:off x="7595310" y="449537"/>
-          <a:ext cx="153194" cy="213519"/>
+          <a:off x="15190620" y="899073"/>
+          <a:ext cx="306387" cy="427037"/>
         </p:xfrm>
         <a:graphic>
           <a:graphicData uri="http://schemas.openxmlformats.org/presentationml/2006/ole">
             <mc:AlternateContent xmlns:mc="http://schemas.openxmlformats.org/markup-compatibility/2006">
               <mc:Choice xmlns:v="urn:schemas-microsoft-com:vml" Requires="v">
-                <p:oleObj spid="_x0000_s1081" name="Equation" r:id="rId12" imgW="127000" imgH="177800" progId="Equation.3">
+                <p:oleObj spid="_x0000_s1063" name="Equation" r:id="rId12" imgW="127000" imgH="177800" progId="Equation.3">
                   <p:embed/>
                 </p:oleObj>
               </mc:Choice>
@@ -4158,8 +4152,8 @@
                     </p:blipFill>
                     <p:spPr>
                       <a:xfrm>
-                        <a:off x="7595310" y="449537"/>
-                        <a:ext cx="153194" cy="213519"/>
+                        <a:off x="15190620" y="899073"/>
+                        <a:ext cx="306387" cy="427037"/>
                       </a:xfrm>
                       <a:prstGeom prst="rect">
                         <a:avLst/>
@@ -4187,14 +4181,14 @@
           </p:nvPr>
         </p:nvGraphicFramePr>
         <p:xfrm>
-          <a:off x="7595310" y="1829439"/>
-          <a:ext cx="153194" cy="213519"/>
+          <a:off x="15190620" y="3658877"/>
+          <a:ext cx="306387" cy="427037"/>
         </p:xfrm>
         <a:graphic>
           <a:graphicData uri="http://schemas.openxmlformats.org/presentationml/2006/ole">
             <mc:AlternateContent xmlns:mc="http://schemas.openxmlformats.org/markup-compatibility/2006">
               <mc:Choice xmlns:v="urn:schemas-microsoft-com:vml" Requires="v">
-                <p:oleObj spid="_x0000_s1082" name="Equation" r:id="rId14" imgW="127000" imgH="177800" progId="Equation.3">
+                <p:oleObj spid="_x0000_s1064" name="Equation" r:id="rId14" imgW="127000" imgH="177800" progId="Equation.3">
                   <p:embed/>
                 </p:oleObj>
               </mc:Choice>
@@ -4215,8 +4209,8 @@
                     </p:blipFill>
                     <p:spPr>
                       <a:xfrm>
-                        <a:off x="7595310" y="1829439"/>
-                        <a:ext cx="153194" cy="213519"/>
+                        <a:off x="15190620" y="3658877"/>
+                        <a:ext cx="306387" cy="427037"/>
                       </a:xfrm>
                       <a:prstGeom prst="rect">
                         <a:avLst/>
@@ -4244,14 +4238,14 @@
           </p:nvPr>
         </p:nvGraphicFramePr>
         <p:xfrm>
-          <a:off x="5094843" y="2393793"/>
-          <a:ext cx="153194" cy="213519"/>
+          <a:off x="10189686" y="4787586"/>
+          <a:ext cx="306387" cy="427037"/>
         </p:xfrm>
         <a:graphic>
           <a:graphicData uri="http://schemas.openxmlformats.org/presentationml/2006/ole">
             <mc:AlternateContent xmlns:mc="http://schemas.openxmlformats.org/markup-compatibility/2006">
               <mc:Choice xmlns:v="urn:schemas-microsoft-com:vml" Requires="v">
-                <p:oleObj spid="_x0000_s1083" name="Equation" r:id="rId15" imgW="127000" imgH="177800" progId="Equation.3">
+                <p:oleObj spid="_x0000_s1065" name="Equation" r:id="rId15" imgW="127000" imgH="177800" progId="Equation.3">
                   <p:embed/>
                 </p:oleObj>
               </mc:Choice>
@@ -4272,8 +4266,8 @@
                     </p:blipFill>
                     <p:spPr>
                       <a:xfrm>
-                        <a:off x="5094843" y="2393793"/>
-                        <a:ext cx="153194" cy="213519"/>
+                        <a:off x="10189686" y="4787586"/>
+                        <a:ext cx="306387" cy="427037"/>
                       </a:xfrm>
                       <a:prstGeom prst="rect">
                         <a:avLst/>
@@ -4295,21 +4289,15 @@
           <p:nvPr/>
         </p:nvPicPr>
         <p:blipFill>
-          <a:blip r:embed="rId16" cstate="email">
-            <a:extLst>
-              <a:ext uri="{28A0092B-C50C-407E-A947-70E740481C1C}">
-                <a14:useLocalDpi xmlns:a14="http://schemas.microsoft.com/office/drawing/2010/main"/>
-              </a:ext>
-            </a:extLst>
-          </a:blip>
+          <a:blip r:embed="rId16"/>
           <a:stretch>
             <a:fillRect/>
           </a:stretch>
         </p:blipFill>
         <p:spPr>
           <a:xfrm>
-            <a:off x="5477000" y="42339"/>
-            <a:ext cx="2286000" cy="1377950"/>
+            <a:off x="10954000" y="84678"/>
+            <a:ext cx="4572000" cy="2755900"/>
           </a:xfrm>
           <a:prstGeom prst="rect">
             <a:avLst/>
@@ -4325,21 +4313,15 @@
           <p:nvPr/>
         </p:nvPicPr>
         <p:blipFill>
-          <a:blip r:embed="rId17" cstate="email">
-            <a:extLst>
-              <a:ext uri="{28A0092B-C50C-407E-A947-70E740481C1C}">
-                <a14:useLocalDpi xmlns:a14="http://schemas.microsoft.com/office/drawing/2010/main"/>
-              </a:ext>
-            </a:extLst>
-          </a:blip>
+          <a:blip r:embed="rId17"/>
           <a:stretch>
             <a:fillRect/>
           </a:stretch>
         </p:blipFill>
         <p:spPr>
           <a:xfrm>
-            <a:off x="5486400" y="1435034"/>
-            <a:ext cx="2286000" cy="1333500"/>
+            <a:off x="10972800" y="2870067"/>
+            <a:ext cx="4572000" cy="2667000"/>
           </a:xfrm>
           <a:prstGeom prst="rect">
             <a:avLst/>
@@ -4355,21 +4337,15 @@
           <p:nvPr/>
         </p:nvPicPr>
         <p:blipFill>
-          <a:blip r:embed="rId18" cstate="email">
-            <a:extLst>
-              <a:ext uri="{28A0092B-C50C-407E-A947-70E740481C1C}">
-                <a14:useLocalDpi xmlns:a14="http://schemas.microsoft.com/office/drawing/2010/main"/>
-              </a:ext>
-            </a:extLst>
-          </a:blip>
+          <a:blip r:embed="rId18"/>
           <a:stretch>
             <a:fillRect/>
           </a:stretch>
         </p:blipFill>
         <p:spPr>
           <a:xfrm>
-            <a:off x="3044445" y="1388530"/>
-            <a:ext cx="2286000" cy="1377950"/>
+            <a:off x="6088890" y="2777060"/>
+            <a:ext cx="4572000" cy="2755900"/>
           </a:xfrm>
           <a:prstGeom prst="rect">
             <a:avLst/>

</xml_diff>